<commit_message>
added what"s intelligence slide
</commit_message>
<xml_diff>
--- a/slides.pptx
+++ b/slides.pptx
@@ -6,6 +6,7 @@
   </p:sldMasterIdLst>
   <p:sldIdLst>
     <p:sldId id="256" r:id="rId2"/>
+    <p:sldId id="257" r:id="rId3"/>
   </p:sldIdLst>
   <p:sldSz cx="12192000" cy="6858000"/>
   <p:notesSz cx="6858000" cy="9144000"/>
@@ -104,6 +105,11 @@
       </a:defRPr>
     </a:lvl9pPr>
   </p:defaultTextStyle>
+  <p:extLst>
+    <p:ext uri="{EFAFB233-063F-42B5-8137-9DF3F51BA10A}">
+      <p15:sldGuideLst xmlns:p15="http://schemas.microsoft.com/office/powerpoint/2012/main"/>
+    </p:ext>
+  </p:extLst>
 </p:presentation>
 </file>
 
@@ -254,7 +260,7 @@
           <a:p>
             <a:fld id="{C029FC96-3B43-46E3-B211-72F579CCCEF4}" type="datetimeFigureOut">
               <a:rPr lang="en-US" smtClean="0"/>
-              <a:t>5/24/2023</a:t>
+              <a:t>6/23/2023</a:t>
             </a:fld>
             <a:endParaRPr lang="en-US"/>
           </a:p>
@@ -452,7 +458,7 @@
           <a:p>
             <a:fld id="{C029FC96-3B43-46E3-B211-72F579CCCEF4}" type="datetimeFigureOut">
               <a:rPr lang="en-US" smtClean="0"/>
-              <a:t>5/24/2023</a:t>
+              <a:t>6/23/2023</a:t>
             </a:fld>
             <a:endParaRPr lang="en-US"/>
           </a:p>
@@ -660,7 +666,7 @@
           <a:p>
             <a:fld id="{C029FC96-3B43-46E3-B211-72F579CCCEF4}" type="datetimeFigureOut">
               <a:rPr lang="en-US" smtClean="0"/>
-              <a:t>5/24/2023</a:t>
+              <a:t>6/23/2023</a:t>
             </a:fld>
             <a:endParaRPr lang="en-US"/>
           </a:p>
@@ -858,7 +864,7 @@
           <a:p>
             <a:fld id="{C029FC96-3B43-46E3-B211-72F579CCCEF4}" type="datetimeFigureOut">
               <a:rPr lang="en-US" smtClean="0"/>
-              <a:t>5/24/2023</a:t>
+              <a:t>6/23/2023</a:t>
             </a:fld>
             <a:endParaRPr lang="en-US"/>
           </a:p>
@@ -1133,7 +1139,7 @@
           <a:p>
             <a:fld id="{C029FC96-3B43-46E3-B211-72F579CCCEF4}" type="datetimeFigureOut">
               <a:rPr lang="en-US" smtClean="0"/>
-              <a:t>5/24/2023</a:t>
+              <a:t>6/23/2023</a:t>
             </a:fld>
             <a:endParaRPr lang="en-US"/>
           </a:p>
@@ -1398,7 +1404,7 @@
           <a:p>
             <a:fld id="{C029FC96-3B43-46E3-B211-72F579CCCEF4}" type="datetimeFigureOut">
               <a:rPr lang="en-US" smtClean="0"/>
-              <a:t>5/24/2023</a:t>
+              <a:t>6/23/2023</a:t>
             </a:fld>
             <a:endParaRPr lang="en-US"/>
           </a:p>
@@ -1810,7 +1816,7 @@
           <a:p>
             <a:fld id="{C029FC96-3B43-46E3-B211-72F579CCCEF4}" type="datetimeFigureOut">
               <a:rPr lang="en-US" smtClean="0"/>
-              <a:t>5/24/2023</a:t>
+              <a:t>6/23/2023</a:t>
             </a:fld>
             <a:endParaRPr lang="en-US"/>
           </a:p>
@@ -1951,7 +1957,7 @@
           <a:p>
             <a:fld id="{C029FC96-3B43-46E3-B211-72F579CCCEF4}" type="datetimeFigureOut">
               <a:rPr lang="en-US" smtClean="0"/>
-              <a:t>5/24/2023</a:t>
+              <a:t>6/23/2023</a:t>
             </a:fld>
             <a:endParaRPr lang="en-US"/>
           </a:p>
@@ -2064,7 +2070,7 @@
           <a:p>
             <a:fld id="{C029FC96-3B43-46E3-B211-72F579CCCEF4}" type="datetimeFigureOut">
               <a:rPr lang="en-US" smtClean="0"/>
-              <a:t>5/24/2023</a:t>
+              <a:t>6/23/2023</a:t>
             </a:fld>
             <a:endParaRPr lang="en-US"/>
           </a:p>
@@ -2375,7 +2381,7 @@
           <a:p>
             <a:fld id="{C029FC96-3B43-46E3-B211-72F579CCCEF4}" type="datetimeFigureOut">
               <a:rPr lang="en-US" smtClean="0"/>
-              <a:t>5/24/2023</a:t>
+              <a:t>6/23/2023</a:t>
             </a:fld>
             <a:endParaRPr lang="en-US"/>
           </a:p>
@@ -2663,7 +2669,7 @@
           <a:p>
             <a:fld id="{C029FC96-3B43-46E3-B211-72F579CCCEF4}" type="datetimeFigureOut">
               <a:rPr lang="en-US" smtClean="0"/>
-              <a:t>5/24/2023</a:t>
+              <a:t>6/23/2023</a:t>
             </a:fld>
             <a:endParaRPr lang="en-US"/>
           </a:p>
@@ -2904,7 +2910,7 @@
           <a:p>
             <a:fld id="{C029FC96-3B43-46E3-B211-72F579CCCEF4}" type="datetimeFigureOut">
               <a:rPr lang="en-US" smtClean="0"/>
-              <a:t>5/24/2023</a:t>
+              <a:t>6/23/2023</a:t>
             </a:fld>
             <a:endParaRPr lang="en-US"/>
           </a:p>
@@ -3582,6 +3588,179 @@
 </p:sld>
 </file>
 
+<file path=ppt/slides/slide2.xml><?xml version="1.0" encoding="utf-8"?>
+<p:sld xmlns:a="http://schemas.openxmlformats.org/drawingml/2006/main" xmlns:r="http://schemas.openxmlformats.org/officeDocument/2006/relationships" xmlns:p="http://schemas.openxmlformats.org/presentationml/2006/main">
+  <p:cSld>
+    <p:bg>
+      <p:bgPr>
+        <a:solidFill>
+          <a:schemeClr val="bg1"/>
+        </a:solidFill>
+        <a:effectLst/>
+      </p:bgPr>
+    </p:bg>
+    <p:spTree>
+      <p:nvGrpSpPr>
+        <p:cNvPr id="1" name=""/>
+        <p:cNvGrpSpPr/>
+        <p:nvPr/>
+      </p:nvGrpSpPr>
+      <p:grpSpPr>
+        <a:xfrm>
+          <a:off x="0" y="0"/>
+          <a:ext cx="0" cy="0"/>
+          <a:chOff x="0" y="0"/>
+          <a:chExt cx="0" cy="0"/>
+        </a:xfrm>
+      </p:grpSpPr>
+      <p:sp useBgFill="1">
+        <p:nvSpPr>
+          <p:cNvPr id="9" name="Rectangle 8">
+            <a:extLst>
+              <a:ext uri="{FF2B5EF4-FFF2-40B4-BE49-F238E27FC236}">
+                <a16:creationId xmlns:a16="http://schemas.microsoft.com/office/drawing/2014/main" id="{026A84AF-6F58-471A-BF1F-10D8C03511C4}"/>
+              </a:ext>
+              <a:ext uri="{C183D7F6-B498-43B3-948B-1728B52AA6E4}">
+                <adec:decorative xmlns:adec="http://schemas.microsoft.com/office/drawing/2017/decorative" val="1"/>
+              </a:ext>
+            </a:extLst>
+          </p:cNvPr>
+          <p:cNvSpPr>
+            <a:spLocks noGrp="1" noRot="1" noChangeAspect="1" noMove="1" noResize="1" noEditPoints="1" noAdjustHandles="1" noChangeArrowheads="1" noChangeShapeType="1" noTextEdit="1"/>
+          </p:cNvSpPr>
+          <p:nvPr>
+            <p:extLst>
+              <p:ext uri="{386F3935-93C4-4BCD-93E2-E3B085C9AB24}">
+                <p16:designElem xmlns:p16="http://schemas.microsoft.com/office/powerpoint/2015/main" val="1"/>
+              </p:ext>
+            </p:extLst>
+          </p:nvPr>
+        </p:nvSpPr>
+        <p:spPr>
+          <a:xfrm>
+            <a:off x="-1" y="0"/>
+            <a:ext cx="12188952" cy="6858000"/>
+          </a:xfrm>
+          <a:prstGeom prst="rect">
+            <a:avLst/>
+          </a:prstGeom>
+          <a:ln>
+            <a:noFill/>
+          </a:ln>
+        </p:spPr>
+        <p:style>
+          <a:lnRef idx="2">
+            <a:schemeClr val="accent1">
+              <a:shade val="50000"/>
+            </a:schemeClr>
+          </a:lnRef>
+          <a:fillRef idx="1">
+            <a:schemeClr val="accent1"/>
+          </a:fillRef>
+          <a:effectRef idx="0">
+            <a:schemeClr val="accent1"/>
+          </a:effectRef>
+          <a:fontRef idx="minor">
+            <a:schemeClr val="lt1"/>
+          </a:fontRef>
+        </p:style>
+        <p:txBody>
+          <a:bodyPr rtlCol="0" anchor="ctr"/>
+          <a:lstStyle/>
+          <a:p>
+            <a:pPr algn="ctr"/>
+            <a:endParaRPr lang="en-US"/>
+          </a:p>
+        </p:txBody>
+      </p:sp>
+      <p:sp>
+        <p:nvSpPr>
+          <p:cNvPr id="2" name="Title 1">
+            <a:extLst>
+              <a:ext uri="{FF2B5EF4-FFF2-40B4-BE49-F238E27FC236}">
+                <a16:creationId xmlns:a16="http://schemas.microsoft.com/office/drawing/2014/main" id="{5A754A7B-7BCB-E36F-885D-DE34C75A76DB}"/>
+              </a:ext>
+            </a:extLst>
+          </p:cNvPr>
+          <p:cNvSpPr>
+            <a:spLocks noGrp="1"/>
+          </p:cNvSpPr>
+          <p:nvPr>
+            <p:ph type="title"/>
+          </p:nvPr>
+        </p:nvSpPr>
+        <p:spPr>
+          <a:xfrm>
+            <a:off x="838200" y="728662"/>
+            <a:ext cx="3785513" cy="3728853"/>
+          </a:xfrm>
+          <a:noFill/>
+        </p:spPr>
+        <p:txBody>
+          <a:bodyPr vert="horz" lIns="91440" tIns="45720" rIns="91440" bIns="45720" rtlCol="0" anchor="b">
+            <a:normAutofit/>
+          </a:bodyPr>
+          <a:lstStyle/>
+          <a:p>
+            <a:r>
+              <a:rPr lang="fr-FR" sz="4800" dirty="0"/>
+              <a:t>Qu’est-ce que l’intelligence</a:t>
+            </a:r>
+            <a:r>
+              <a:rPr lang="en-US" sz="4800" dirty="0"/>
+              <a:t>?</a:t>
+            </a:r>
+          </a:p>
+        </p:txBody>
+      </p:sp>
+      <p:pic>
+        <p:nvPicPr>
+          <p:cNvPr id="4" name="Picture 3" descr="A statue of a person thinking&#10;&#10;Description automatically generated with low confidence">
+            <a:extLst>
+              <a:ext uri="{FF2B5EF4-FFF2-40B4-BE49-F238E27FC236}">
+                <a16:creationId xmlns:a16="http://schemas.microsoft.com/office/drawing/2014/main" id="{EA0377BE-99BD-FD52-D67F-5D0826AAAE62}"/>
+              </a:ext>
+            </a:extLst>
+          </p:cNvPr>
+          <p:cNvPicPr>
+            <a:picLocks noChangeAspect="1"/>
+          </p:cNvPicPr>
+          <p:nvPr/>
+        </p:nvPicPr>
+        <p:blipFill rotWithShape="1">
+          <a:blip r:embed="rId2">
+            <a:extLst>
+              <a:ext uri="{28A0092B-C50C-407E-A947-70E740481C1C}">
+                <a14:useLocalDpi xmlns:a14="http://schemas.microsoft.com/office/drawing/2010/main" val="0"/>
+              </a:ext>
+            </a:extLst>
+          </a:blip>
+          <a:srcRect t="4857" r="1" b="23533"/>
+          <a:stretch/>
+        </p:blipFill>
+        <p:spPr>
+          <a:xfrm>
+            <a:off x="5009505" y="10"/>
+            <a:ext cx="7182495" cy="6857990"/>
+          </a:xfrm>
+          <a:prstGeom prst="rect">
+            <a:avLst/>
+          </a:prstGeom>
+        </p:spPr>
+      </p:pic>
+    </p:spTree>
+    <p:extLst>
+      <p:ext uri="{BB962C8B-B14F-4D97-AF65-F5344CB8AC3E}">
+        <p14:creationId xmlns:p14="http://schemas.microsoft.com/office/powerpoint/2010/main" val="62597955"/>
+      </p:ext>
+    </p:extLst>
+  </p:cSld>
+  <p:clrMapOvr>
+    <a:masterClrMapping/>
+  </p:clrMapOvr>
+</p:sld>
+</file>
+
 <file path=ppt/theme/theme1.xml><?xml version="1.0" encoding="utf-8"?>
 <a:theme xmlns:a="http://schemas.openxmlformats.org/drawingml/2006/main" name="Office Theme">
   <a:themeElements>

</xml_diff>

<commit_message>
added what is AI slide
</commit_message>
<xml_diff>
--- a/slides.pptx
+++ b/slides.pptx
@@ -7,6 +7,7 @@
   <p:sldIdLst>
     <p:sldId id="256" r:id="rId2"/>
     <p:sldId id="257" r:id="rId3"/>
+    <p:sldId id="258" r:id="rId4"/>
   </p:sldIdLst>
   <p:sldSz cx="12192000" cy="6858000"/>
   <p:notesSz cx="6858000" cy="9144000"/>
@@ -4211,6 +4212,737 @@
     <p:extLst>
       <p:ext uri="{BB962C8B-B14F-4D97-AF65-F5344CB8AC3E}">
         <p14:creationId xmlns:p14="http://schemas.microsoft.com/office/powerpoint/2010/main" val="62597955"/>
+      </p:ext>
+    </p:extLst>
+  </p:cSld>
+  <p:clrMapOvr>
+    <a:masterClrMapping/>
+  </p:clrMapOvr>
+  <p:timing>
+    <p:tnLst>
+      <p:par>
+        <p:cTn id="1" dur="indefinite" restart="never" nodeType="tmRoot">
+          <p:childTnLst>
+            <p:seq concurrent="1" nextAc="seek">
+              <p:cTn id="2" dur="indefinite" nodeType="mainSeq">
+                <p:childTnLst>
+                  <p:par>
+                    <p:cTn id="3" fill="hold">
+                      <p:stCondLst>
+                        <p:cond delay="indefinite"/>
+                        <p:cond evt="onBegin" delay="0">
+                          <p:tn val="2"/>
+                        </p:cond>
+                      </p:stCondLst>
+                      <p:childTnLst>
+                        <p:par>
+                          <p:cTn id="4" fill="hold">
+                            <p:stCondLst>
+                              <p:cond delay="0"/>
+                            </p:stCondLst>
+                            <p:childTnLst>
+                              <p:par>
+                                <p:cTn id="5" presetID="10" presetClass="entr" presetSubtype="0" fill="hold" grpId="0" nodeType="withEffect">
+                                  <p:stCondLst>
+                                    <p:cond delay="1000"/>
+                                  </p:stCondLst>
+                                  <p:iterate>
+                                    <p:tmPct val="10000"/>
+                                  </p:iterate>
+                                  <p:childTnLst>
+                                    <p:set>
+                                      <p:cBhvr>
+                                        <p:cTn id="6" dur="1" fill="hold">
+                                          <p:stCondLst>
+                                            <p:cond delay="0"/>
+                                          </p:stCondLst>
+                                        </p:cTn>
+                                        <p:tgtEl>
+                                          <p:spTgt spid="2"/>
+                                        </p:tgtEl>
+                                        <p:attrNameLst>
+                                          <p:attrName>style.visibility</p:attrName>
+                                        </p:attrNameLst>
+                                      </p:cBhvr>
+                                      <p:to>
+                                        <p:strVal val="visible"/>
+                                      </p:to>
+                                    </p:set>
+                                    <p:animEffect transition="in" filter="fade">
+                                      <p:cBhvr>
+                                        <p:cTn id="7" dur="700"/>
+                                        <p:tgtEl>
+                                          <p:spTgt spid="2"/>
+                                        </p:tgtEl>
+                                      </p:cBhvr>
+                                    </p:animEffect>
+                                  </p:childTnLst>
+                                </p:cTn>
+                              </p:par>
+                            </p:childTnLst>
+                          </p:cTn>
+                        </p:par>
+                      </p:childTnLst>
+                    </p:cTn>
+                  </p:par>
+                </p:childTnLst>
+              </p:cTn>
+              <p:prevCondLst>
+                <p:cond evt="onPrev" delay="0">
+                  <p:tgtEl>
+                    <p:sldTgt/>
+                  </p:tgtEl>
+                </p:cond>
+              </p:prevCondLst>
+              <p:nextCondLst>
+                <p:cond evt="onNext" delay="0">
+                  <p:tgtEl>
+                    <p:sldTgt/>
+                  </p:tgtEl>
+                </p:cond>
+              </p:nextCondLst>
+            </p:seq>
+          </p:childTnLst>
+        </p:cTn>
+      </p:par>
+    </p:tnLst>
+    <p:bldLst>
+      <p:bldP spid="2" grpId="0"/>
+    </p:bldLst>
+  </p:timing>
+</p:sld>
+</file>
+
+<file path=ppt/slides/slide3.xml><?xml version="1.0" encoding="utf-8"?>
+<p:sld xmlns:a="http://schemas.openxmlformats.org/drawingml/2006/main" xmlns:r="http://schemas.openxmlformats.org/officeDocument/2006/relationships" xmlns:p="http://schemas.openxmlformats.org/presentationml/2006/main">
+  <p:cSld>
+    <p:bg>
+      <p:bgPr>
+        <a:solidFill>
+          <a:schemeClr val="bg1"/>
+        </a:solidFill>
+        <a:effectLst/>
+      </p:bgPr>
+    </p:bg>
+    <p:spTree>
+      <p:nvGrpSpPr>
+        <p:cNvPr id="1" name=""/>
+        <p:cNvGrpSpPr/>
+        <p:nvPr/>
+      </p:nvGrpSpPr>
+      <p:grpSpPr>
+        <a:xfrm>
+          <a:off x="0" y="0"/>
+          <a:ext cx="0" cy="0"/>
+          <a:chOff x="0" y="0"/>
+          <a:chExt cx="0" cy="0"/>
+        </a:xfrm>
+      </p:grpSpPr>
+      <p:sp useBgFill="1">
+        <p:nvSpPr>
+          <p:cNvPr id="14" name="Rectangle 13">
+            <a:extLst>
+              <a:ext uri="{FF2B5EF4-FFF2-40B4-BE49-F238E27FC236}">
+                <a16:creationId xmlns:a16="http://schemas.microsoft.com/office/drawing/2014/main" id="{06DA9DF9-31F7-4056-B42E-878CC92417B8}"/>
+              </a:ext>
+              <a:ext uri="{C183D7F6-B498-43B3-948B-1728B52AA6E4}">
+                <adec:decorative xmlns:adec="http://schemas.microsoft.com/office/drawing/2017/decorative" val="1"/>
+              </a:ext>
+            </a:extLst>
+          </p:cNvPr>
+          <p:cNvSpPr>
+            <a:spLocks noGrp="1" noRot="1" noChangeAspect="1" noMove="1" noResize="1" noEditPoints="1" noAdjustHandles="1" noChangeArrowheads="1" noChangeShapeType="1" noTextEdit="1"/>
+          </p:cNvSpPr>
+          <p:nvPr>
+            <p:extLst>
+              <p:ext uri="{386F3935-93C4-4BCD-93E2-E3B085C9AB24}">
+                <p16:designElem xmlns:p16="http://schemas.microsoft.com/office/powerpoint/2015/main" val="1"/>
+              </p:ext>
+            </p:extLst>
+          </p:nvPr>
+        </p:nvSpPr>
+        <p:spPr>
+          <a:xfrm>
+            <a:off x="0" y="0"/>
+            <a:ext cx="12188952" cy="6858000"/>
+          </a:xfrm>
+          <a:prstGeom prst="rect">
+            <a:avLst/>
+          </a:prstGeom>
+          <a:ln>
+            <a:noFill/>
+          </a:ln>
+        </p:spPr>
+        <p:style>
+          <a:lnRef idx="2">
+            <a:schemeClr val="accent1">
+              <a:shade val="50000"/>
+            </a:schemeClr>
+          </a:lnRef>
+          <a:fillRef idx="1">
+            <a:schemeClr val="accent1"/>
+          </a:fillRef>
+          <a:effectRef idx="0">
+            <a:schemeClr val="accent1"/>
+          </a:effectRef>
+          <a:fontRef idx="minor">
+            <a:schemeClr val="lt1"/>
+          </a:fontRef>
+        </p:style>
+        <p:txBody>
+          <a:bodyPr rtlCol="0" anchor="ctr"/>
+          <a:lstStyle/>
+          <a:p>
+            <a:pPr algn="ctr"/>
+            <a:endParaRPr lang="en-US"/>
+          </a:p>
+        </p:txBody>
+      </p:sp>
+      <p:pic>
+        <p:nvPicPr>
+          <p:cNvPr id="4" name="Picture 3" descr="A picture containing art, light&#10;&#10;Description automatically generated">
+            <a:extLst>
+              <a:ext uri="{FF2B5EF4-FFF2-40B4-BE49-F238E27FC236}">
+                <a16:creationId xmlns:a16="http://schemas.microsoft.com/office/drawing/2014/main" id="{8D022C9D-0D1E-6529-90E0-54991AE22A0C}"/>
+              </a:ext>
+            </a:extLst>
+          </p:cNvPr>
+          <p:cNvPicPr>
+            <a:picLocks noChangeAspect="1"/>
+          </p:cNvPicPr>
+          <p:nvPr/>
+        </p:nvPicPr>
+        <p:blipFill rotWithShape="1">
+          <a:blip r:embed="rId2">
+            <a:extLst>
+              <a:ext uri="{28A0092B-C50C-407E-A947-70E740481C1C}">
+                <a14:useLocalDpi xmlns:a14="http://schemas.microsoft.com/office/drawing/2010/main" val="0"/>
+              </a:ext>
+            </a:extLst>
+          </a:blip>
+          <a:srcRect l="13053"/>
+          <a:stretch/>
+        </p:blipFill>
+        <p:spPr>
+          <a:xfrm flipH="1">
+            <a:off x="0" y="0"/>
+            <a:ext cx="5962785" cy="6857990"/>
+          </a:xfrm>
+          <a:custGeom>
+            <a:avLst/>
+            <a:gdLst/>
+            <a:ahLst/>
+            <a:cxnLst/>
+            <a:rect l="l" t="t" r="r" b="b"/>
+            <a:pathLst>
+              <a:path w="5962785" h="6858000">
+                <a:moveTo>
+                  <a:pt x="1044839" y="0"/>
+                </a:moveTo>
+                <a:lnTo>
+                  <a:pt x="5962785" y="0"/>
+                </a:lnTo>
+                <a:lnTo>
+                  <a:pt x="5962785" y="6858000"/>
+                </a:lnTo>
+                <a:lnTo>
+                  <a:pt x="1469886" y="6858000"/>
+                </a:lnTo>
+                <a:lnTo>
+                  <a:pt x="1416006" y="6823984"/>
+                </a:lnTo>
+                <a:cubicBezTo>
+                  <a:pt x="1356767" y="6787940"/>
+                  <a:pt x="1296437" y="6755500"/>
+                  <a:pt x="1232473" y="6733873"/>
+                </a:cubicBezTo>
+                <a:cubicBezTo>
+                  <a:pt x="1145250" y="6705037"/>
+                  <a:pt x="1060933" y="6654575"/>
+                  <a:pt x="1075471" y="6503186"/>
+                </a:cubicBezTo>
+                <a:cubicBezTo>
+                  <a:pt x="1078378" y="6459932"/>
+                  <a:pt x="1055118" y="6427493"/>
+                  <a:pt x="1020229" y="6438306"/>
+                </a:cubicBezTo>
+                <a:cubicBezTo>
+                  <a:pt x="953358" y="6459932"/>
+                  <a:pt x="921375" y="6398656"/>
+                  <a:pt x="883579" y="6351798"/>
+                </a:cubicBezTo>
+                <a:cubicBezTo>
+                  <a:pt x="816707" y="6268895"/>
+                  <a:pt x="752743" y="6182387"/>
+                  <a:pt x="645167" y="6167969"/>
+                </a:cubicBezTo>
+                <a:cubicBezTo>
+                  <a:pt x="665519" y="6103088"/>
+                  <a:pt x="700408" y="6110298"/>
+                  <a:pt x="732391" y="6124716"/>
+                </a:cubicBezTo>
+                <a:cubicBezTo>
+                  <a:pt x="816707" y="6160761"/>
+                  <a:pt x="901023" y="6200410"/>
+                  <a:pt x="985339" y="6236455"/>
+                </a:cubicBezTo>
+                <a:cubicBezTo>
+                  <a:pt x="1040581" y="6258081"/>
+                  <a:pt x="1095822" y="6290522"/>
+                  <a:pt x="1168509" y="6265291"/>
+                </a:cubicBezTo>
+                <a:cubicBezTo>
+                  <a:pt x="1104545" y="6135530"/>
+                  <a:pt x="996969" y="6110298"/>
+                  <a:pt x="909746" y="6070649"/>
+                </a:cubicBezTo>
+                <a:cubicBezTo>
+                  <a:pt x="802169" y="6020185"/>
+                  <a:pt x="738206" y="5926470"/>
+                  <a:pt x="659704" y="5818335"/>
+                </a:cubicBezTo>
+                <a:cubicBezTo>
+                  <a:pt x="738206" y="5789500"/>
+                  <a:pt x="787632" y="5868798"/>
+                  <a:pt x="851597" y="5865193"/>
+                </a:cubicBezTo>
+                <a:cubicBezTo>
+                  <a:pt x="854504" y="5854380"/>
+                  <a:pt x="860319" y="5832753"/>
+                  <a:pt x="860319" y="5832753"/>
+                </a:cubicBezTo>
+                <a:cubicBezTo>
+                  <a:pt x="755650" y="5775081"/>
+                  <a:pt x="709132" y="5666947"/>
+                  <a:pt x="691686" y="5533581"/>
+                </a:cubicBezTo>
+                <a:cubicBezTo>
+                  <a:pt x="685872" y="5465095"/>
+                  <a:pt x="648075" y="5443468"/>
+                  <a:pt x="610278" y="5411029"/>
+                </a:cubicBezTo>
+                <a:cubicBezTo>
+                  <a:pt x="482350" y="5299289"/>
+                  <a:pt x="345700" y="5198364"/>
+                  <a:pt x="238123" y="5046976"/>
+                </a:cubicBezTo>
+                <a:cubicBezTo>
+                  <a:pt x="363144" y="5064998"/>
+                  <a:pt x="461997" y="5165924"/>
+                  <a:pt x="592833" y="5209177"/>
+                </a:cubicBezTo>
+                <a:cubicBezTo>
+                  <a:pt x="488165" y="5043371"/>
+                  <a:pt x="351514" y="4956864"/>
+                  <a:pt x="226494" y="4855939"/>
+                </a:cubicBezTo>
+                <a:cubicBezTo>
+                  <a:pt x="168344" y="4809081"/>
+                  <a:pt x="116011" y="4751408"/>
+                  <a:pt x="49139" y="4726177"/>
+                </a:cubicBezTo>
+                <a:cubicBezTo>
+                  <a:pt x="25879" y="4718968"/>
+                  <a:pt x="-14825" y="4700947"/>
+                  <a:pt x="5527" y="4650483"/>
+                </a:cubicBezTo>
+                <a:cubicBezTo>
+                  <a:pt x="22972" y="4607230"/>
+                  <a:pt x="54954" y="4621648"/>
+                  <a:pt x="84029" y="4632460"/>
+                </a:cubicBezTo>
+                <a:cubicBezTo>
+                  <a:pt x="153807" y="4661296"/>
+                  <a:pt x="229401" y="4661296"/>
+                  <a:pt x="325347" y="4661296"/>
+                </a:cubicBezTo>
+                <a:cubicBezTo>
+                  <a:pt x="243939" y="4524326"/>
+                  <a:pt x="95658" y="4567580"/>
+                  <a:pt x="25879" y="4423401"/>
+                </a:cubicBezTo>
+                <a:cubicBezTo>
+                  <a:pt x="113103" y="4398170"/>
+                  <a:pt x="179975" y="4448632"/>
+                  <a:pt x="249753" y="4459446"/>
+                </a:cubicBezTo>
+                <a:cubicBezTo>
+                  <a:pt x="313718" y="4470259"/>
+                  <a:pt x="328254" y="4445028"/>
+                  <a:pt x="313718" y="4365729"/>
+                </a:cubicBezTo>
+                <a:cubicBezTo>
+                  <a:pt x="290458" y="4243177"/>
+                  <a:pt x="325347" y="4181900"/>
+                  <a:pt x="418386" y="4214341"/>
+                </a:cubicBezTo>
+                <a:cubicBezTo>
+                  <a:pt x="505609" y="4246781"/>
+                  <a:pt x="514332" y="4199922"/>
+                  <a:pt x="491072" y="4131438"/>
+                </a:cubicBezTo>
+                <a:cubicBezTo>
+                  <a:pt x="456183" y="4030512"/>
+                  <a:pt x="493979" y="3951214"/>
+                  <a:pt x="520147" y="3864706"/>
+                </a:cubicBezTo>
+                <a:cubicBezTo>
+                  <a:pt x="560851" y="3734945"/>
+                  <a:pt x="543407" y="3670064"/>
+                  <a:pt x="459090" y="3572743"/>
+                </a:cubicBezTo>
+                <a:cubicBezTo>
+                  <a:pt x="409664" y="3518676"/>
+                  <a:pt x="360236" y="3471818"/>
+                  <a:pt x="290458" y="3424959"/>
+                </a:cubicBezTo>
+                <a:cubicBezTo>
+                  <a:pt x="450368" y="3399728"/>
+                  <a:pt x="284643" y="3313221"/>
+                  <a:pt x="339884" y="3259153"/>
+                </a:cubicBezTo>
+                <a:cubicBezTo>
+                  <a:pt x="453275" y="3237527"/>
+                  <a:pt x="543407" y="3410542"/>
+                  <a:pt x="697501" y="3360078"/>
+                </a:cubicBezTo>
+                <a:cubicBezTo>
+                  <a:pt x="511425" y="3212294"/>
+                  <a:pt x="302087" y="3165436"/>
+                  <a:pt x="165437" y="2967190"/>
+                </a:cubicBezTo>
+                <a:cubicBezTo>
+                  <a:pt x="197419" y="2923937"/>
+                  <a:pt x="229401" y="2967190"/>
+                  <a:pt x="255568" y="2949167"/>
+                </a:cubicBezTo>
+                <a:cubicBezTo>
+                  <a:pt x="255568" y="2938354"/>
+                  <a:pt x="560851" y="3006840"/>
+                  <a:pt x="578296" y="2725691"/>
+                </a:cubicBezTo>
+                <a:cubicBezTo>
+                  <a:pt x="584111" y="2725691"/>
+                  <a:pt x="589926" y="2725691"/>
+                  <a:pt x="595740" y="2714876"/>
+                </a:cubicBezTo>
+                <a:cubicBezTo>
+                  <a:pt x="627722" y="2675228"/>
+                  <a:pt x="598648" y="2581510"/>
+                  <a:pt x="650982" y="2574301"/>
+                </a:cubicBezTo>
+                <a:cubicBezTo>
+                  <a:pt x="709132" y="2567092"/>
+                  <a:pt x="764373" y="2534653"/>
+                  <a:pt x="825429" y="2552674"/>
+                </a:cubicBezTo>
+                <a:cubicBezTo>
+                  <a:pt x="871949" y="2567092"/>
+                  <a:pt x="921375" y="2585115"/>
+                  <a:pt x="970802" y="2585115"/>
+                </a:cubicBezTo>
+                <a:cubicBezTo>
+                  <a:pt x="1023136" y="2585115"/>
+                  <a:pt x="1095822" y="2707668"/>
+                  <a:pt x="1127805" y="2545465"/>
+                </a:cubicBezTo>
+                <a:cubicBezTo>
+                  <a:pt x="1127805" y="2538257"/>
+                  <a:pt x="1217936" y="2556280"/>
+                  <a:pt x="1267362" y="2563488"/>
+                </a:cubicBezTo>
+                <a:cubicBezTo>
+                  <a:pt x="1308067" y="2570698"/>
+                  <a:pt x="1357494" y="2603137"/>
+                  <a:pt x="1386568" y="2538257"/>
+                </a:cubicBezTo>
+                <a:cubicBezTo>
+                  <a:pt x="1401105" y="2498607"/>
+                  <a:pt x="1331326" y="2426518"/>
+                  <a:pt x="1270270" y="2419309"/>
+                </a:cubicBezTo>
+                <a:cubicBezTo>
+                  <a:pt x="1215029" y="2412101"/>
+                  <a:pt x="1159787" y="2404892"/>
+                  <a:pt x="1107453" y="2419309"/>
+                </a:cubicBezTo>
+                <a:cubicBezTo>
+                  <a:pt x="1043489" y="2437331"/>
+                  <a:pt x="1008599" y="2408495"/>
+                  <a:pt x="991154" y="2343615"/>
+                </a:cubicBezTo>
+                <a:cubicBezTo>
+                  <a:pt x="970802" y="2275131"/>
+                  <a:pt x="933005" y="2239085"/>
+                  <a:pt x="880671" y="2206645"/>
+                </a:cubicBezTo>
+                <a:cubicBezTo>
+                  <a:pt x="752743" y="2127346"/>
+                  <a:pt x="630630" y="2033629"/>
+                  <a:pt x="491072" y="1986771"/>
+                </a:cubicBezTo>
+                <a:cubicBezTo>
+                  <a:pt x="464905" y="1979562"/>
+                  <a:pt x="432923" y="1965145"/>
+                  <a:pt x="421293" y="1903868"/>
+                </a:cubicBezTo>
+                <a:cubicBezTo>
+                  <a:pt x="799262" y="1997584"/>
+                  <a:pt x="1142342" y="2239085"/>
+                  <a:pt x="1531941" y="2224667"/>
+                </a:cubicBezTo>
+                <a:cubicBezTo>
+                  <a:pt x="1427272" y="2148974"/>
+                  <a:pt x="1302252" y="2145369"/>
+                  <a:pt x="1188861" y="2091301"/>
+                </a:cubicBezTo>
+                <a:cubicBezTo>
+                  <a:pt x="1270270" y="2051652"/>
+                  <a:pt x="1345864" y="2094906"/>
+                  <a:pt x="1421458" y="2116532"/>
+                </a:cubicBezTo>
+                <a:cubicBezTo>
+                  <a:pt x="1485422" y="2134554"/>
+                  <a:pt x="1543571" y="2138160"/>
+                  <a:pt x="1549386" y="2026420"/>
+                </a:cubicBezTo>
+                <a:cubicBezTo>
+                  <a:pt x="1549386" y="2015607"/>
+                  <a:pt x="1549386" y="2008398"/>
+                  <a:pt x="1549386" y="1997584"/>
+                </a:cubicBezTo>
+                <a:cubicBezTo>
+                  <a:pt x="1526126" y="1950727"/>
+                  <a:pt x="1494144" y="1929099"/>
+                  <a:pt x="1453440" y="1914682"/>
+                </a:cubicBezTo>
+                <a:cubicBezTo>
+                  <a:pt x="1430180" y="1907473"/>
+                  <a:pt x="1398198" y="1893056"/>
+                  <a:pt x="1398198" y="1860614"/>
+                </a:cubicBezTo>
+                <a:cubicBezTo>
+                  <a:pt x="1401105" y="1738063"/>
+                  <a:pt x="1322604" y="1702018"/>
+                  <a:pt x="1247011" y="1665972"/>
+                </a:cubicBezTo>
+                <a:cubicBezTo>
+                  <a:pt x="1287715" y="1604696"/>
+                  <a:pt x="1322604" y="1647950"/>
+                  <a:pt x="1354586" y="1644345"/>
+                </a:cubicBezTo>
+                <a:cubicBezTo>
+                  <a:pt x="1374939" y="1640741"/>
+                  <a:pt x="1395290" y="1637138"/>
+                  <a:pt x="1395290" y="1604696"/>
+                </a:cubicBezTo>
+                <a:cubicBezTo>
+                  <a:pt x="1395290" y="1579465"/>
+                  <a:pt x="1386568" y="1547025"/>
+                  <a:pt x="1366216" y="1547025"/>
+                </a:cubicBezTo>
+                <a:cubicBezTo>
+                  <a:pt x="1238288" y="1543420"/>
+                  <a:pt x="1165601" y="1370405"/>
+                  <a:pt x="1031858" y="1370405"/>
+                </a:cubicBezTo>
+                <a:cubicBezTo>
+                  <a:pt x="950450" y="1370405"/>
+                  <a:pt x="1072563" y="1273083"/>
+                  <a:pt x="1005692" y="1233435"/>
+                </a:cubicBezTo>
+                <a:cubicBezTo>
+                  <a:pt x="991154" y="1222621"/>
+                  <a:pt x="1046396" y="1208203"/>
+                  <a:pt x="1069655" y="1211808"/>
+                </a:cubicBezTo>
+                <a:cubicBezTo>
+                  <a:pt x="1092915" y="1215412"/>
+                  <a:pt x="1113268" y="1240644"/>
+                  <a:pt x="1142342" y="1222621"/>
+                </a:cubicBezTo>
+                <a:cubicBezTo>
+                  <a:pt x="1156879" y="1157741"/>
+                  <a:pt x="1119082" y="1132510"/>
+                  <a:pt x="1084193" y="1114487"/>
+                </a:cubicBezTo>
+                <a:cubicBezTo>
+                  <a:pt x="1008599" y="1071234"/>
+                  <a:pt x="933005" y="1020771"/>
+                  <a:pt x="848689" y="1006353"/>
+                </a:cubicBezTo>
+                <a:cubicBezTo>
+                  <a:pt x="819615" y="1002748"/>
+                  <a:pt x="802169" y="984726"/>
+                  <a:pt x="805077" y="948681"/>
+                </a:cubicBezTo>
+                <a:cubicBezTo>
+                  <a:pt x="810892" y="901822"/>
+                  <a:pt x="839967" y="916240"/>
+                  <a:pt x="863226" y="919844"/>
+                </a:cubicBezTo>
+                <a:cubicBezTo>
+                  <a:pt x="877764" y="923450"/>
+                  <a:pt x="892301" y="934263"/>
+                  <a:pt x="906838" y="909031"/>
+                </a:cubicBezTo>
+                <a:cubicBezTo>
+                  <a:pt x="566666" y="653113"/>
+                  <a:pt x="386404" y="667532"/>
+                  <a:pt x="5527" y="458471"/>
+                </a:cubicBezTo>
+                <a:cubicBezTo>
+                  <a:pt x="89843" y="418822"/>
+                  <a:pt x="150900" y="447658"/>
+                  <a:pt x="209049" y="454867"/>
+                </a:cubicBezTo>
+                <a:cubicBezTo>
+                  <a:pt x="354422" y="472890"/>
+                  <a:pt x="264290" y="505329"/>
+                  <a:pt x="409664" y="526956"/>
+                </a:cubicBezTo>
+                <a:cubicBezTo>
+                  <a:pt x="479443" y="537770"/>
+                  <a:pt x="543407" y="573815"/>
+                  <a:pt x="621908" y="516143"/>
+                </a:cubicBezTo>
+                <a:cubicBezTo>
+                  <a:pt x="674242" y="476494"/>
+                  <a:pt x="758558" y="519747"/>
+                  <a:pt x="822522" y="552188"/>
+                </a:cubicBezTo>
+                <a:cubicBezTo>
+                  <a:pt x="874856" y="581024"/>
+                  <a:pt x="927190" y="588232"/>
+                  <a:pt x="996969" y="552188"/>
+                </a:cubicBezTo>
+                <a:cubicBezTo>
+                  <a:pt x="933005" y="530562"/>
+                  <a:pt x="883579" y="512539"/>
+                  <a:pt x="834151" y="498120"/>
+                </a:cubicBezTo>
+                <a:cubicBezTo>
+                  <a:pt x="793447" y="487307"/>
+                  <a:pt x="770187" y="462076"/>
+                  <a:pt x="773095" y="408008"/>
+                </a:cubicBezTo>
+                <a:cubicBezTo>
+                  <a:pt x="773095" y="379172"/>
+                  <a:pt x="764373" y="339523"/>
+                  <a:pt x="793447" y="325106"/>
+                </a:cubicBezTo>
+                <a:cubicBezTo>
+                  <a:pt x="816707" y="310688"/>
+                  <a:pt x="848689" y="325106"/>
+                  <a:pt x="860319" y="350336"/>
+                </a:cubicBezTo>
+                <a:cubicBezTo>
+                  <a:pt x="874856" y="397195"/>
+                  <a:pt x="889393" y="440449"/>
+                  <a:pt x="938820" y="444054"/>
+                </a:cubicBezTo>
+                <a:cubicBezTo>
+                  <a:pt x="1005692" y="451262"/>
+                  <a:pt x="967894" y="422426"/>
+                  <a:pt x="956265" y="386381"/>
+                </a:cubicBezTo>
+                <a:cubicBezTo>
+                  <a:pt x="944635" y="346733"/>
+                  <a:pt x="979525" y="335919"/>
+                  <a:pt x="1002784" y="343127"/>
+                </a:cubicBezTo>
+                <a:cubicBezTo>
+                  <a:pt x="1090008" y="375569"/>
+                  <a:pt x="1180139" y="317897"/>
+                  <a:pt x="1270270" y="364755"/>
+                </a:cubicBezTo>
+                <a:cubicBezTo>
+                  <a:pt x="1247011" y="249411"/>
+                  <a:pt x="1197583" y="198949"/>
+                  <a:pt x="1092915" y="180926"/>
+                </a:cubicBezTo>
+                <a:cubicBezTo>
+                  <a:pt x="1055118" y="177322"/>
+                  <a:pt x="1014414" y="184530"/>
+                  <a:pt x="979525" y="152090"/>
+                </a:cubicBezTo>
+                <a:cubicBezTo>
+                  <a:pt x="959172" y="134068"/>
+                  <a:pt x="938820" y="112441"/>
+                  <a:pt x="953358" y="76396"/>
+                </a:cubicBezTo>
+                <a:cubicBezTo>
+                  <a:pt x="962080" y="51165"/>
+                  <a:pt x="985339" y="51165"/>
+                  <a:pt x="1005692" y="58373"/>
+                </a:cubicBezTo>
+                <a:cubicBezTo>
+                  <a:pt x="1090008" y="98023"/>
+                  <a:pt x="1180139" y="108837"/>
+                  <a:pt x="1267362" y="123254"/>
+                </a:cubicBezTo>
+                <a:cubicBezTo>
+                  <a:pt x="1281900" y="126859"/>
+                  <a:pt x="1296437" y="134068"/>
+                  <a:pt x="1310975" y="98023"/>
+                </a:cubicBezTo>
+                <a:cubicBezTo>
+                  <a:pt x="1260095" y="81803"/>
+                  <a:pt x="1209941" y="62879"/>
+                  <a:pt x="1159787" y="43505"/>
+                </a:cubicBezTo>
+                <a:close/>
+              </a:path>
+            </a:pathLst>
+          </a:custGeom>
+        </p:spPr>
+      </p:pic>
+      <p:sp>
+        <p:nvSpPr>
+          <p:cNvPr id="2" name="Title 1">
+            <a:extLst>
+              <a:ext uri="{FF2B5EF4-FFF2-40B4-BE49-F238E27FC236}">
+                <a16:creationId xmlns:a16="http://schemas.microsoft.com/office/drawing/2014/main" id="{112F25C3-FA7D-4C30-78C0-82AED96156B2}"/>
+              </a:ext>
+            </a:extLst>
+          </p:cNvPr>
+          <p:cNvSpPr>
+            <a:spLocks noGrp="1"/>
+          </p:cNvSpPr>
+          <p:nvPr>
+            <p:ph type="title"/>
+          </p:nvPr>
+        </p:nvSpPr>
+        <p:spPr>
+          <a:xfrm>
+            <a:off x="6739468" y="643467"/>
+            <a:ext cx="4620584" cy="4567137"/>
+          </a:xfrm>
+        </p:spPr>
+        <p:txBody>
+          <a:bodyPr vert="horz" lIns="91440" tIns="45720" rIns="91440" bIns="45720" rtlCol="0" anchor="b">
+            <a:normAutofit/>
+          </a:bodyPr>
+          <a:lstStyle/>
+          <a:p>
+            <a:r>
+              <a:rPr lang="fr-FR" dirty="0"/>
+              <a:t>Qu’est-ce que l’intelligence</a:t>
+            </a:r>
+            <a:br>
+              <a:rPr lang="fr-FR" dirty="0"/>
+            </a:br>
+            <a:r>
+              <a:rPr lang="fr-FR" dirty="0"/>
+              <a:t> « artificielle » ?</a:t>
+            </a:r>
+          </a:p>
+        </p:txBody>
+      </p:sp>
+    </p:spTree>
+    <p:extLst>
+      <p:ext uri="{BB962C8B-B14F-4D97-AF65-F5344CB8AC3E}">
+        <p14:creationId xmlns:p14="http://schemas.microsoft.com/office/powerpoint/2010/main" val="3179988239"/>
       </p:ext>
     </p:extLst>
   </p:cSld>

</xml_diff>

<commit_message>
added formal def slide
</commit_message>
<xml_diff>
--- a/slides.pptx
+++ b/slides.pptx
@@ -9,7 +9,8 @@
     <p:sldId id="257" r:id="rId3"/>
     <p:sldId id="258" r:id="rId4"/>
     <p:sldId id="259" r:id="rId5"/>
-    <p:sldId id="260" r:id="rId6"/>
+    <p:sldId id="261" r:id="rId6"/>
+    <p:sldId id="260" r:id="rId7"/>
   </p:sldIdLst>
   <p:sldSz cx="12192000" cy="6858000"/>
   <p:notesSz cx="6858000" cy="9144000"/>
@@ -4923,6 +4924,1965 @@
 </file>
 
 <file path=ppt/slides/slide5.xml><?xml version="1.0" encoding="utf-8"?>
+<p:sld xmlns:a="http://schemas.openxmlformats.org/drawingml/2006/main" xmlns:r="http://schemas.openxmlformats.org/officeDocument/2006/relationships" xmlns:p="http://schemas.openxmlformats.org/presentationml/2006/main">
+  <p:cSld>
+    <p:bg>
+      <p:bgPr>
+        <a:solidFill>
+          <a:schemeClr val="bg1"/>
+        </a:solidFill>
+        <a:effectLst/>
+      </p:bgPr>
+    </p:bg>
+    <p:spTree>
+      <p:nvGrpSpPr>
+        <p:cNvPr id="1" name=""/>
+        <p:cNvGrpSpPr/>
+        <p:nvPr/>
+      </p:nvGrpSpPr>
+      <p:grpSpPr>
+        <a:xfrm>
+          <a:off x="0" y="0"/>
+          <a:ext cx="0" cy="0"/>
+          <a:chOff x="0" y="0"/>
+          <a:chExt cx="0" cy="0"/>
+        </a:xfrm>
+      </p:grpSpPr>
+      <p:sp useBgFill="1">
+        <p:nvSpPr>
+          <p:cNvPr id="15" name="Rectangle 8">
+            <a:extLst>
+              <a:ext uri="{FF2B5EF4-FFF2-40B4-BE49-F238E27FC236}">
+                <a16:creationId xmlns:a16="http://schemas.microsoft.com/office/drawing/2014/main" id="{0741393E-C764-4C6F-8886-35CFF2E48351}"/>
+              </a:ext>
+              <a:ext uri="{C183D7F6-B498-43B3-948B-1728B52AA6E4}">
+                <adec:decorative xmlns:adec="http://schemas.microsoft.com/office/drawing/2017/decorative" val="1"/>
+              </a:ext>
+            </a:extLst>
+          </p:cNvPr>
+          <p:cNvSpPr>
+            <a:spLocks noGrp="1" noRot="1" noChangeAspect="1" noMove="1" noResize="1" noEditPoints="1" noAdjustHandles="1" noChangeArrowheads="1" noChangeShapeType="1" noTextEdit="1"/>
+          </p:cNvSpPr>
+          <p:nvPr>
+            <p:extLst>
+              <p:ext uri="{386F3935-93C4-4BCD-93E2-E3B085C9AB24}">
+                <p16:designElem xmlns:p16="http://schemas.microsoft.com/office/powerpoint/2015/main" val="1"/>
+              </p:ext>
+            </p:extLst>
+          </p:nvPr>
+        </p:nvSpPr>
+        <p:spPr>
+          <a:xfrm>
+            <a:off x="0" y="0"/>
+            <a:ext cx="12192000" cy="6858000"/>
+          </a:xfrm>
+          <a:prstGeom prst="rect">
+            <a:avLst/>
+          </a:prstGeom>
+          <a:ln w="12700" cap="flat" cmpd="sng" algn="ctr">
+            <a:noFill/>
+            <a:prstDash val="solid"/>
+            <a:miter lim="800000"/>
+          </a:ln>
+          <a:effectLst/>
+          <a:extLst>
+            <a:ext uri="{91240B29-F687-4F45-9708-019B960494DF}">
+              <a14:hiddenLine xmlns:a14="http://schemas.microsoft.com/office/drawing/2010/main" w="12700" cap="flat" cmpd="sng" algn="ctr">
+                <a:solidFill>
+                  <a:schemeClr val="accent1">
+                    <a:shade val="50000"/>
+                  </a:schemeClr>
+                </a:solidFill>
+                <a:prstDash val="solid"/>
+                <a:miter lim="800000"/>
+              </a14:hiddenLine>
+            </a:ext>
+          </a:extLst>
+        </p:spPr>
+        <p:style>
+          <a:lnRef idx="2">
+            <a:schemeClr val="accent1">
+              <a:shade val="50000"/>
+            </a:schemeClr>
+          </a:lnRef>
+          <a:fillRef idx="1">
+            <a:schemeClr val="accent1"/>
+          </a:fillRef>
+          <a:effectRef idx="0">
+            <a:schemeClr val="accent1"/>
+          </a:effectRef>
+          <a:fontRef idx="minor">
+            <a:schemeClr val="lt1"/>
+          </a:fontRef>
+        </p:style>
+        <p:txBody>
+          <a:bodyPr rtlCol="0" anchor="ctr"/>
+          <a:lstStyle/>
+          <a:p>
+            <a:pPr algn="ctr"/>
+            <a:endParaRPr lang="en-US"/>
+          </a:p>
+        </p:txBody>
+      </p:sp>
+      <p:sp>
+        <p:nvSpPr>
+          <p:cNvPr id="16" name="Freeform: Shape 10">
+            <a:extLst>
+              <a:ext uri="{FF2B5EF4-FFF2-40B4-BE49-F238E27FC236}">
+                <a16:creationId xmlns:a16="http://schemas.microsoft.com/office/drawing/2014/main" id="{390890DC-37FF-4B49-BD4C-FE4232F69B37}"/>
+              </a:ext>
+              <a:ext uri="{C183D7F6-B498-43B3-948B-1728B52AA6E4}">
+                <adec:decorative xmlns:adec="http://schemas.microsoft.com/office/drawing/2017/decorative" val="1"/>
+              </a:ext>
+            </a:extLst>
+          </p:cNvPr>
+          <p:cNvSpPr>
+            <a:spLocks noGrp="1" noRot="1" noChangeAspect="1" noMove="1" noResize="1" noEditPoints="1" noAdjustHandles="1" noChangeArrowheads="1" noChangeShapeType="1" noTextEdit="1"/>
+          </p:cNvSpPr>
+          <p:nvPr>
+            <p:extLst>
+              <p:ext uri="{386F3935-93C4-4BCD-93E2-E3B085C9AB24}">
+                <p16:designElem xmlns:p16="http://schemas.microsoft.com/office/powerpoint/2015/main" val="1"/>
+              </p:ext>
+            </p:extLst>
+          </p:nvPr>
+        </p:nvSpPr>
+        <p:spPr>
+          <a:xfrm>
+            <a:off x="0" y="0"/>
+            <a:ext cx="5552708" cy="6858000"/>
+          </a:xfrm>
+          <a:custGeom>
+            <a:avLst/>
+            <a:gdLst>
+              <a:gd name="connsiteX0" fmla="*/ 0 w 5552708"/>
+              <a:gd name="connsiteY0" fmla="*/ 0 h 6858000"/>
+              <a:gd name="connsiteX1" fmla="*/ 5443651 w 5552708"/>
+              <a:gd name="connsiteY1" fmla="*/ 0 h 6858000"/>
+              <a:gd name="connsiteX2" fmla="*/ 5443781 w 5552708"/>
+              <a:gd name="connsiteY2" fmla="*/ 512 h 6858000"/>
+              <a:gd name="connsiteX3" fmla="*/ 5444033 w 5552708"/>
+              <a:gd name="connsiteY3" fmla="*/ 20501 h 6858000"/>
+              <a:gd name="connsiteX4" fmla="*/ 5439390 w 5552708"/>
+              <a:gd name="connsiteY4" fmla="*/ 44768 h 6858000"/>
+              <a:gd name="connsiteX5" fmla="*/ 5443913 w 5552708"/>
+              <a:gd name="connsiteY5" fmla="*/ 104988 h 6858000"/>
+              <a:gd name="connsiteX6" fmla="*/ 5458241 w 5552708"/>
+              <a:gd name="connsiteY6" fmla="*/ 204162 h 6858000"/>
+              <a:gd name="connsiteX7" fmla="*/ 5459763 w 5552708"/>
+              <a:gd name="connsiteY7" fmla="*/ 225360 h 6858000"/>
+              <a:gd name="connsiteX8" fmla="*/ 5454996 w 5552708"/>
+              <a:gd name="connsiteY8" fmla="*/ 243902 h 6858000"/>
+              <a:gd name="connsiteX9" fmla="*/ 5448597 w 5552708"/>
+              <a:gd name="connsiteY9" fmla="*/ 248483 h 6858000"/>
+              <a:gd name="connsiteX10" fmla="*/ 5448458 w 5552708"/>
+              <a:gd name="connsiteY10" fmla="*/ 260196 h 6858000"/>
+              <a:gd name="connsiteX11" fmla="*/ 5447150 w 5552708"/>
+              <a:gd name="connsiteY11" fmla="*/ 263377 h 6858000"/>
+              <a:gd name="connsiteX12" fmla="*/ 5459187 w 5552708"/>
+              <a:gd name="connsiteY12" fmla="*/ 318691 h 6858000"/>
+              <a:gd name="connsiteX13" fmla="*/ 5455708 w 5552708"/>
+              <a:gd name="connsiteY13" fmla="*/ 365759 h 6858000"/>
+              <a:gd name="connsiteX14" fmla="*/ 5473651 w 5552708"/>
+              <a:gd name="connsiteY14" fmla="*/ 492182 h 6858000"/>
+              <a:gd name="connsiteX15" fmla="*/ 5481453 w 5552708"/>
+              <a:gd name="connsiteY15" fmla="*/ 689666 h 6858000"/>
+              <a:gd name="connsiteX16" fmla="*/ 5488233 w 5552708"/>
+              <a:gd name="connsiteY16" fmla="*/ 816332 h 6858000"/>
+              <a:gd name="connsiteX17" fmla="*/ 5529718 w 5552708"/>
+              <a:gd name="connsiteY17" fmla="*/ 891550 h 6858000"/>
+              <a:gd name="connsiteX18" fmla="*/ 5536104 w 5552708"/>
+              <a:gd name="connsiteY18" fmla="*/ 903318 h 6858000"/>
+              <a:gd name="connsiteX19" fmla="*/ 5535257 w 5552708"/>
+              <a:gd name="connsiteY19" fmla="*/ 905308 h 6858000"/>
+              <a:gd name="connsiteX20" fmla="*/ 5537840 w 5552708"/>
+              <a:gd name="connsiteY20" fmla="*/ 920621 h 6858000"/>
+              <a:gd name="connsiteX21" fmla="*/ 5541663 w 5552708"/>
+              <a:gd name="connsiteY21" fmla="*/ 922876 h 6858000"/>
+              <a:gd name="connsiteX22" fmla="*/ 5544456 w 5552708"/>
+              <a:gd name="connsiteY22" fmla="*/ 933037 h 6858000"/>
+              <a:gd name="connsiteX23" fmla="*/ 5552708 w 5552708"/>
+              <a:gd name="connsiteY23" fmla="*/ 952132 h 6858000"/>
+              <a:gd name="connsiteX24" fmla="*/ 5551675 w 5552708"/>
+              <a:gd name="connsiteY24" fmla="*/ 956570 h 6858000"/>
+              <a:gd name="connsiteX25" fmla="*/ 5531341 w 5552708"/>
+              <a:gd name="connsiteY25" fmla="*/ 1064863 h 6858000"/>
+              <a:gd name="connsiteX26" fmla="*/ 5539998 w 5552708"/>
+              <a:gd name="connsiteY26" fmla="*/ 1096340 h 6858000"/>
+              <a:gd name="connsiteX27" fmla="*/ 5541075 w 5552708"/>
+              <a:gd name="connsiteY27" fmla="*/ 1102915 h 6858000"/>
+              <a:gd name="connsiteX28" fmla="*/ 5540822 w 5552708"/>
+              <a:gd name="connsiteY28" fmla="*/ 1103143 h 6858000"/>
+              <a:gd name="connsiteX29" fmla="*/ 5541413 w 5552708"/>
+              <a:gd name="connsiteY29" fmla="*/ 1110274 h 6858000"/>
+              <a:gd name="connsiteX30" fmla="*/ 5543038 w 5552708"/>
+              <a:gd name="connsiteY30" fmla="*/ 1114901 h 6858000"/>
+              <a:gd name="connsiteX31" fmla="*/ 5545128 w 5552708"/>
+              <a:gd name="connsiteY31" fmla="*/ 1127652 h 6858000"/>
+              <a:gd name="connsiteX32" fmla="*/ 5544028 w 5552708"/>
+              <a:gd name="connsiteY32" fmla="*/ 1132698 h 6858000"/>
+              <a:gd name="connsiteX33" fmla="*/ 5514811 w 5552708"/>
+              <a:gd name="connsiteY33" fmla="*/ 1177140 h 6858000"/>
+              <a:gd name="connsiteX34" fmla="*/ 5496402 w 5552708"/>
+              <a:gd name="connsiteY34" fmla="*/ 1265293 h 6858000"/>
+              <a:gd name="connsiteX35" fmla="*/ 5481620 w 5552708"/>
+              <a:gd name="connsiteY35" fmla="*/ 1353039 h 6858000"/>
+              <a:gd name="connsiteX36" fmla="*/ 5477938 w 5552708"/>
+              <a:gd name="connsiteY36" fmla="*/ 1385038 h 6858000"/>
+              <a:gd name="connsiteX37" fmla="*/ 5464009 w 5552708"/>
+              <a:gd name="connsiteY37" fmla="*/ 1441067 h 6858000"/>
+              <a:gd name="connsiteX38" fmla="*/ 5453063 w 5552708"/>
+              <a:gd name="connsiteY38" fmla="*/ 1466104 h 6858000"/>
+              <a:gd name="connsiteX39" fmla="*/ 5453368 w 5552708"/>
+              <a:gd name="connsiteY39" fmla="*/ 1467310 h 6858000"/>
+              <a:gd name="connsiteX40" fmla="*/ 5449849 w 5552708"/>
+              <a:gd name="connsiteY40" fmla="*/ 1469198 h 6858000"/>
+              <a:gd name="connsiteX41" fmla="*/ 5447717 w 5552708"/>
+              <a:gd name="connsiteY41" fmla="*/ 1473816 h 6858000"/>
+              <a:gd name="connsiteX42" fmla="*/ 5446906 w 5552708"/>
+              <a:gd name="connsiteY42" fmla="*/ 1487106 h 6858000"/>
+              <a:gd name="connsiteX43" fmla="*/ 5447429 w 5552708"/>
+              <a:gd name="connsiteY43" fmla="*/ 1492218 h 6858000"/>
+              <a:gd name="connsiteX44" fmla="*/ 5446434 w 5552708"/>
+              <a:gd name="connsiteY44" fmla="*/ 1499455 h 6858000"/>
+              <a:gd name="connsiteX45" fmla="*/ 5446146 w 5552708"/>
+              <a:gd name="connsiteY45" fmla="*/ 1499600 h 6858000"/>
+              <a:gd name="connsiteX46" fmla="*/ 5445728 w 5552708"/>
+              <a:gd name="connsiteY46" fmla="*/ 1506449 h 6858000"/>
+              <a:gd name="connsiteX47" fmla="*/ 5447013 w 5552708"/>
+              <a:gd name="connsiteY47" fmla="*/ 1540420 h 6858000"/>
+              <a:gd name="connsiteX48" fmla="*/ 5416036 w 5552708"/>
+              <a:gd name="connsiteY48" fmla="*/ 1580834 h 6858000"/>
+              <a:gd name="connsiteX49" fmla="*/ 5409252 w 5552708"/>
+              <a:gd name="connsiteY49" fmla="*/ 1598373 h 6858000"/>
+              <a:gd name="connsiteX50" fmla="*/ 5404223 w 5552708"/>
+              <a:gd name="connsiteY50" fmla="*/ 1607549 h 6858000"/>
+              <a:gd name="connsiteX51" fmla="*/ 5403003 w 5552708"/>
+              <a:gd name="connsiteY51" fmla="*/ 1607994 h 6858000"/>
+              <a:gd name="connsiteX52" fmla="*/ 5404366 w 5552708"/>
+              <a:gd name="connsiteY52" fmla="*/ 1640580 h 6858000"/>
+              <a:gd name="connsiteX53" fmla="*/ 5402429 w 5552708"/>
+              <a:gd name="connsiteY53" fmla="*/ 1644617 h 6858000"/>
+              <a:gd name="connsiteX54" fmla="*/ 5406027 w 5552708"/>
+              <a:gd name="connsiteY54" fmla="*/ 1666228 h 6858000"/>
+              <a:gd name="connsiteX55" fmla="*/ 5409538 w 5552708"/>
+              <a:gd name="connsiteY55" fmla="*/ 1680703 h 6858000"/>
+              <a:gd name="connsiteX56" fmla="*/ 5405582 w 5552708"/>
+              <a:gd name="connsiteY56" fmla="*/ 1870222 h 6858000"/>
+              <a:gd name="connsiteX57" fmla="*/ 5418948 w 5552708"/>
+              <a:gd name="connsiteY57" fmla="*/ 1979530 h 6858000"/>
+              <a:gd name="connsiteX58" fmla="*/ 5405060 w 5552708"/>
+              <a:gd name="connsiteY58" fmla="*/ 2051964 h 6858000"/>
+              <a:gd name="connsiteX59" fmla="*/ 5378701 w 5552708"/>
+              <a:gd name="connsiteY59" fmla="*/ 2073120 h 6858000"/>
+              <a:gd name="connsiteX60" fmla="*/ 5366006 w 5552708"/>
+              <a:gd name="connsiteY60" fmla="*/ 2256053 h 6858000"/>
+              <a:gd name="connsiteX61" fmla="*/ 5352501 w 5552708"/>
+              <a:gd name="connsiteY61" fmla="*/ 2301374 h 6858000"/>
+              <a:gd name="connsiteX62" fmla="*/ 5361572 w 5552708"/>
+              <a:gd name="connsiteY62" fmla="*/ 2344135 h 6858000"/>
+              <a:gd name="connsiteX63" fmla="*/ 5351776 w 5552708"/>
+              <a:gd name="connsiteY63" fmla="*/ 2360013 h 6858000"/>
+              <a:gd name="connsiteX64" fmla="*/ 5349856 w 5552708"/>
+              <a:gd name="connsiteY64" fmla="*/ 2362723 h 6858000"/>
+              <a:gd name="connsiteX65" fmla="*/ 5347182 w 5552708"/>
+              <a:gd name="connsiteY65" fmla="*/ 2374239 h 6858000"/>
+              <a:gd name="connsiteX66" fmla="*/ 5340172 w 5552708"/>
+              <a:gd name="connsiteY66" fmla="*/ 2376629 h 6858000"/>
+              <a:gd name="connsiteX67" fmla="*/ 5331662 w 5552708"/>
+              <a:gd name="connsiteY67" fmla="*/ 2393351 h 6858000"/>
+              <a:gd name="connsiteX68" fmla="*/ 5328482 w 5552708"/>
+              <a:gd name="connsiteY68" fmla="*/ 2414790 h 6858000"/>
+              <a:gd name="connsiteX69" fmla="*/ 5316501 w 5552708"/>
+              <a:gd name="connsiteY69" fmla="*/ 2490864 h 6858000"/>
+              <a:gd name="connsiteX70" fmla="*/ 5318378 w 5552708"/>
+              <a:gd name="connsiteY70" fmla="*/ 2503797 h 6858000"/>
+              <a:gd name="connsiteX71" fmla="*/ 5307008 w 5552708"/>
+              <a:gd name="connsiteY71" fmla="*/ 2543608 h 6858000"/>
+              <a:gd name="connsiteX72" fmla="*/ 5300817 w 5552708"/>
+              <a:gd name="connsiteY72" fmla="*/ 2579627 h 6858000"/>
+              <a:gd name="connsiteX73" fmla="*/ 5300491 w 5552708"/>
+              <a:gd name="connsiteY73" fmla="*/ 2603469 h 6858000"/>
+              <a:gd name="connsiteX74" fmla="*/ 5297327 w 5552708"/>
+              <a:gd name="connsiteY74" fmla="*/ 2609298 h 6858000"/>
+              <a:gd name="connsiteX75" fmla="*/ 5292648 w 5552708"/>
+              <a:gd name="connsiteY75" fmla="*/ 2632709 h 6858000"/>
+              <a:gd name="connsiteX76" fmla="*/ 5294499 w 5552708"/>
+              <a:gd name="connsiteY76" fmla="*/ 2645215 h 6858000"/>
+              <a:gd name="connsiteX77" fmla="*/ 5284921 w 5552708"/>
+              <a:gd name="connsiteY77" fmla="*/ 2655995 h 6858000"/>
+              <a:gd name="connsiteX78" fmla="*/ 5278681 w 5552708"/>
+              <a:gd name="connsiteY78" fmla="*/ 2658097 h 6858000"/>
+              <a:gd name="connsiteX79" fmla="*/ 5279052 w 5552708"/>
+              <a:gd name="connsiteY79" fmla="*/ 2675265 h 6858000"/>
+              <a:gd name="connsiteX80" fmla="*/ 5271485 w 5552708"/>
+              <a:gd name="connsiteY80" fmla="*/ 2688260 h 6858000"/>
+              <a:gd name="connsiteX81" fmla="*/ 5273609 w 5552708"/>
+              <a:gd name="connsiteY81" fmla="*/ 2700785 h 6858000"/>
+              <a:gd name="connsiteX82" fmla="*/ 5272098 w 5552708"/>
+              <a:gd name="connsiteY82" fmla="*/ 2705655 h 6858000"/>
+              <a:gd name="connsiteX83" fmla="*/ 5267605 w 5552708"/>
+              <a:gd name="connsiteY83" fmla="*/ 2717660 h 6858000"/>
+              <a:gd name="connsiteX84" fmla="*/ 5258449 w 5552708"/>
+              <a:gd name="connsiteY84" fmla="*/ 2738177 h 6858000"/>
+              <a:gd name="connsiteX85" fmla="*/ 5256679 w 5552708"/>
+              <a:gd name="connsiteY85" fmla="*/ 2744727 h 6858000"/>
+              <a:gd name="connsiteX86" fmla="*/ 5245116 w 5552708"/>
+              <a:gd name="connsiteY86" fmla="*/ 2757932 h 6858000"/>
+              <a:gd name="connsiteX87" fmla="*/ 5233122 w 5552708"/>
+              <a:gd name="connsiteY87" fmla="*/ 2784915 h 6858000"/>
+              <a:gd name="connsiteX88" fmla="*/ 5197792 w 5552708"/>
+              <a:gd name="connsiteY88" fmla="*/ 2830475 h 6858000"/>
+              <a:gd name="connsiteX89" fmla="*/ 5180199 w 5552708"/>
+              <a:gd name="connsiteY89" fmla="*/ 2857691 h 6858000"/>
+              <a:gd name="connsiteX90" fmla="*/ 5164940 w 5552708"/>
+              <a:gd name="connsiteY90" fmla="*/ 2875644 h 6858000"/>
+              <a:gd name="connsiteX91" fmla="*/ 5139323 w 5552708"/>
+              <a:gd name="connsiteY91" fmla="*/ 2931296 h 6858000"/>
+              <a:gd name="connsiteX92" fmla="*/ 5102390 w 5552708"/>
+              <a:gd name="connsiteY92" fmla="*/ 3027705 h 6858000"/>
+              <a:gd name="connsiteX93" fmla="*/ 5093321 w 5552708"/>
+              <a:gd name="connsiteY93" fmla="*/ 3047244 h 6858000"/>
+              <a:gd name="connsiteX94" fmla="*/ 5080729 w 5552708"/>
+              <a:gd name="connsiteY94" fmla="*/ 3060118 h 6858000"/>
+              <a:gd name="connsiteX95" fmla="*/ 5073626 w 5552708"/>
+              <a:gd name="connsiteY95" fmla="*/ 3059690 h 6858000"/>
+              <a:gd name="connsiteX96" fmla="*/ 5067867 w 5552708"/>
+              <a:gd name="connsiteY96" fmla="*/ 3069806 h 6858000"/>
+              <a:gd name="connsiteX97" fmla="*/ 5065335 w 5552708"/>
+              <a:gd name="connsiteY97" fmla="*/ 3071678 h 6858000"/>
+              <a:gd name="connsiteX98" fmla="*/ 5051806 w 5552708"/>
+              <a:gd name="connsiteY98" fmla="*/ 3083233 h 6858000"/>
+              <a:gd name="connsiteX99" fmla="*/ 5047824 w 5552708"/>
+              <a:gd name="connsiteY99" fmla="*/ 3128247 h 6858000"/>
+              <a:gd name="connsiteX100" fmla="*/ 5022444 w 5552708"/>
+              <a:gd name="connsiteY100" fmla="*/ 3166893 h 6858000"/>
+              <a:gd name="connsiteX101" fmla="*/ 4961916 w 5552708"/>
+              <a:gd name="connsiteY101" fmla="*/ 3312149 h 6858000"/>
+              <a:gd name="connsiteX102" fmla="*/ 4928070 w 5552708"/>
+              <a:gd name="connsiteY102" fmla="*/ 3349450 h 6858000"/>
+              <a:gd name="connsiteX103" fmla="*/ 4858652 w 5552708"/>
+              <a:gd name="connsiteY103" fmla="*/ 3443841 h 6858000"/>
+              <a:gd name="connsiteX104" fmla="*/ 4821392 w 5552708"/>
+              <a:gd name="connsiteY104" fmla="*/ 3661714 h 6858000"/>
+              <a:gd name="connsiteX105" fmla="*/ 4825147 w 5552708"/>
+              <a:gd name="connsiteY105" fmla="*/ 3676668 h 6858000"/>
+              <a:gd name="connsiteX106" fmla="*/ 4824341 w 5552708"/>
+              <a:gd name="connsiteY106" fmla="*/ 3691352 h 6858000"/>
+              <a:gd name="connsiteX107" fmla="*/ 4822735 w 5552708"/>
+              <a:gd name="connsiteY107" fmla="*/ 3692500 h 6858000"/>
+              <a:gd name="connsiteX108" fmla="*/ 4817318 w 5552708"/>
+              <a:gd name="connsiteY108" fmla="*/ 3707640 h 6858000"/>
+              <a:gd name="connsiteX109" fmla="*/ 4819146 w 5552708"/>
+              <a:gd name="connsiteY109" fmla="*/ 3712253 h 6858000"/>
+              <a:gd name="connsiteX110" fmla="*/ 4816373 w 5552708"/>
+              <a:gd name="connsiteY110" fmla="*/ 3723048 h 6858000"/>
+              <a:gd name="connsiteX111" fmla="*/ 4813460 w 5552708"/>
+              <a:gd name="connsiteY111" fmla="*/ 3745409 h 6858000"/>
+              <a:gd name="connsiteX112" fmla="*/ 4810527 w 5552708"/>
+              <a:gd name="connsiteY112" fmla="*/ 3748566 h 6858000"/>
+              <a:gd name="connsiteX113" fmla="*/ 4742720 w 5552708"/>
+              <a:gd name="connsiteY113" fmla="*/ 3828954 h 6858000"/>
+              <a:gd name="connsiteX114" fmla="*/ 4731784 w 5552708"/>
+              <a:gd name="connsiteY114" fmla="*/ 3868871 h 6858000"/>
+              <a:gd name="connsiteX115" fmla="*/ 4731481 w 5552708"/>
+              <a:gd name="connsiteY115" fmla="*/ 3868898 h 6858000"/>
+              <a:gd name="connsiteX116" fmla="*/ 4728490 w 5552708"/>
+              <a:gd name="connsiteY116" fmla="*/ 3875525 h 6858000"/>
+              <a:gd name="connsiteX117" fmla="*/ 4727500 w 5552708"/>
+              <a:gd name="connsiteY117" fmla="*/ 3880683 h 6858000"/>
+              <a:gd name="connsiteX118" fmla="*/ 4719663 w 5552708"/>
+              <a:gd name="connsiteY118" fmla="*/ 3896892 h 6858000"/>
+              <a:gd name="connsiteX119" fmla="*/ 4715899 w 5552708"/>
+              <a:gd name="connsiteY119" fmla="*/ 3897345 h 6858000"/>
+              <a:gd name="connsiteX120" fmla="*/ 4715832 w 5552708"/>
+              <a:gd name="connsiteY120" fmla="*/ 3898632 h 6858000"/>
+              <a:gd name="connsiteX121" fmla="*/ 4618476 w 5552708"/>
+              <a:gd name="connsiteY121" fmla="*/ 4076334 h 6858000"/>
+              <a:gd name="connsiteX122" fmla="*/ 4576303 w 5552708"/>
+              <a:gd name="connsiteY122" fmla="*/ 4154580 h 6858000"/>
+              <a:gd name="connsiteX123" fmla="*/ 4536795 w 5552708"/>
+              <a:gd name="connsiteY123" fmla="*/ 4186216 h 6858000"/>
+              <a:gd name="connsiteX124" fmla="*/ 4534335 w 5552708"/>
+              <a:gd name="connsiteY124" fmla="*/ 4190678 h 6858000"/>
+              <a:gd name="connsiteX125" fmla="*/ 4532585 w 5552708"/>
+              <a:gd name="connsiteY125" fmla="*/ 4203860 h 6858000"/>
+              <a:gd name="connsiteX126" fmla="*/ 4532745 w 5552708"/>
+              <a:gd name="connsiteY126" fmla="*/ 4208983 h 6858000"/>
+              <a:gd name="connsiteX127" fmla="*/ 4531239 w 5552708"/>
+              <a:gd name="connsiteY127" fmla="*/ 4216126 h 6858000"/>
+              <a:gd name="connsiteX128" fmla="*/ 4530941 w 5552708"/>
+              <a:gd name="connsiteY128" fmla="*/ 4216251 h 6858000"/>
+              <a:gd name="connsiteX129" fmla="*/ 4530039 w 5552708"/>
+              <a:gd name="connsiteY129" fmla="*/ 4223045 h 6858000"/>
+              <a:gd name="connsiteX130" fmla="*/ 4528920 w 5552708"/>
+              <a:gd name="connsiteY130" fmla="*/ 4256957 h 6858000"/>
+              <a:gd name="connsiteX131" fmla="*/ 4495092 w 5552708"/>
+              <a:gd name="connsiteY131" fmla="*/ 4295227 h 6858000"/>
+              <a:gd name="connsiteX132" fmla="*/ 4487069 w 5552708"/>
+              <a:gd name="connsiteY132" fmla="*/ 4312260 h 6858000"/>
+              <a:gd name="connsiteX133" fmla="*/ 4481391 w 5552708"/>
+              <a:gd name="connsiteY133" fmla="*/ 4321074 h 6858000"/>
+              <a:gd name="connsiteX134" fmla="*/ 4480140 w 5552708"/>
+              <a:gd name="connsiteY134" fmla="*/ 4321443 h 6858000"/>
+              <a:gd name="connsiteX135" fmla="*/ 4479199 w 5552708"/>
+              <a:gd name="connsiteY135" fmla="*/ 4353976 h 6858000"/>
+              <a:gd name="connsiteX136" fmla="*/ 4476976 w 5552708"/>
+              <a:gd name="connsiteY136" fmla="*/ 4357874 h 6858000"/>
+              <a:gd name="connsiteX137" fmla="*/ 4479044 w 5552708"/>
+              <a:gd name="connsiteY137" fmla="*/ 4379621 h 6858000"/>
+              <a:gd name="connsiteX138" fmla="*/ 4478683 w 5552708"/>
+              <a:gd name="connsiteY138" fmla="*/ 4390568 h 6858000"/>
+              <a:gd name="connsiteX139" fmla="*/ 4481532 w 5552708"/>
+              <a:gd name="connsiteY139" fmla="*/ 4394254 h 6858000"/>
+              <a:gd name="connsiteX140" fmla="*/ 4479499 w 5552708"/>
+              <a:gd name="connsiteY140" fmla="*/ 4410114 h 6858000"/>
+              <a:gd name="connsiteX141" fmla="*/ 4478153 w 5552708"/>
+              <a:gd name="connsiteY141" fmla="*/ 4411710 h 6858000"/>
+              <a:gd name="connsiteX142" fmla="*/ 4480616 w 5552708"/>
+              <a:gd name="connsiteY142" fmla="*/ 4425622 h 6858000"/>
+              <a:gd name="connsiteX143" fmla="*/ 4487688 w 5552708"/>
+              <a:gd name="connsiteY143" fmla="*/ 4438292 h 6858000"/>
+              <a:gd name="connsiteX144" fmla="*/ 4454727 w 5552708"/>
+              <a:gd name="connsiteY144" fmla="*/ 4569970 h 6858000"/>
+              <a:gd name="connsiteX145" fmla="*/ 4469804 w 5552708"/>
+              <a:gd name="connsiteY145" fmla="*/ 4692415 h 6858000"/>
+              <a:gd name="connsiteX146" fmla="*/ 4450795 w 5552708"/>
+              <a:gd name="connsiteY146" fmla="*/ 4763659 h 6858000"/>
+              <a:gd name="connsiteX147" fmla="*/ 4422945 w 5552708"/>
+              <a:gd name="connsiteY147" fmla="*/ 4783049 h 6858000"/>
+              <a:gd name="connsiteX148" fmla="*/ 4397314 w 5552708"/>
+              <a:gd name="connsiteY148" fmla="*/ 4964397 h 6858000"/>
+              <a:gd name="connsiteX149" fmla="*/ 4380606 w 5552708"/>
+              <a:gd name="connsiteY149" fmla="*/ 5008665 h 6858000"/>
+              <a:gd name="connsiteX150" fmla="*/ 4386649 w 5552708"/>
+              <a:gd name="connsiteY150" fmla="*/ 5051823 h 6858000"/>
+              <a:gd name="connsiteX151" fmla="*/ 4375733 w 5552708"/>
+              <a:gd name="connsiteY151" fmla="*/ 5067011 h 6858000"/>
+              <a:gd name="connsiteX152" fmla="*/ 4373624 w 5552708"/>
+              <a:gd name="connsiteY152" fmla="*/ 5069584 h 6858000"/>
+              <a:gd name="connsiteX153" fmla="*/ 4370134 w 5552708"/>
+              <a:gd name="connsiteY153" fmla="*/ 5080883 h 6858000"/>
+              <a:gd name="connsiteX154" fmla="*/ 4362957 w 5552708"/>
+              <a:gd name="connsiteY154" fmla="*/ 5082819 h 6858000"/>
+              <a:gd name="connsiteX155" fmla="*/ 4333195 w 5552708"/>
+              <a:gd name="connsiteY155" fmla="*/ 5221840 h 6858000"/>
+              <a:gd name="connsiteX156" fmla="*/ 4320037 w 5552708"/>
+              <a:gd name="connsiteY156" fmla="*/ 5281999 h 6858000"/>
+              <a:gd name="connsiteX157" fmla="*/ 4308816 w 5552708"/>
+              <a:gd name="connsiteY157" fmla="*/ 5303704 h 6858000"/>
+              <a:gd name="connsiteX158" fmla="*/ 4272244 w 5552708"/>
+              <a:gd name="connsiteY158" fmla="*/ 5388756 h 6858000"/>
+              <a:gd name="connsiteX159" fmla="*/ 4246915 w 5552708"/>
+              <a:gd name="connsiteY159" fmla="*/ 5462809 h 6858000"/>
+              <a:gd name="connsiteX160" fmla="*/ 4255030 w 5552708"/>
+              <a:gd name="connsiteY160" fmla="*/ 5521632 h 6858000"/>
+              <a:gd name="connsiteX161" fmla="*/ 4249277 w 5552708"/>
+              <a:gd name="connsiteY161" fmla="*/ 5525636 h 6858000"/>
+              <a:gd name="connsiteX162" fmla="*/ 4241924 w 5552708"/>
+              <a:gd name="connsiteY162" fmla="*/ 5563850 h 6858000"/>
+              <a:gd name="connsiteX163" fmla="*/ 4248240 w 5552708"/>
+              <a:gd name="connsiteY163" fmla="*/ 5703386 h 6858000"/>
+              <a:gd name="connsiteX164" fmla="*/ 4232982 w 5552708"/>
+              <a:gd name="connsiteY164" fmla="*/ 5777907 h 6858000"/>
+              <a:gd name="connsiteX165" fmla="*/ 4222394 w 5552708"/>
+              <a:gd name="connsiteY165" fmla="*/ 5803443 h 6858000"/>
+              <a:gd name="connsiteX166" fmla="*/ 4204974 w 5552708"/>
+              <a:gd name="connsiteY166" fmla="*/ 5846279 h 6858000"/>
+              <a:gd name="connsiteX167" fmla="*/ 4179217 w 5552708"/>
+              <a:gd name="connsiteY167" fmla="*/ 5876046 h 6858000"/>
+              <a:gd name="connsiteX168" fmla="*/ 4169698 w 5552708"/>
+              <a:gd name="connsiteY168" fmla="*/ 5912761 h 6858000"/>
+              <a:gd name="connsiteX169" fmla="*/ 4183963 w 5552708"/>
+              <a:gd name="connsiteY169" fmla="*/ 5924201 h 6858000"/>
+              <a:gd name="connsiteX170" fmla="*/ 4143073 w 5552708"/>
+              <a:gd name="connsiteY170" fmla="*/ 6020347 h 6858000"/>
+              <a:gd name="connsiteX171" fmla="*/ 4132699 w 5552708"/>
+              <a:gd name="connsiteY171" fmla="*/ 6054447 h 6858000"/>
+              <a:gd name="connsiteX172" fmla="*/ 4099744 w 5552708"/>
+              <a:gd name="connsiteY172" fmla="*/ 6146773 h 6858000"/>
+              <a:gd name="connsiteX173" fmla="*/ 4063216 w 5552708"/>
+              <a:gd name="connsiteY173" fmla="*/ 6238624 h 6858000"/>
+              <a:gd name="connsiteX174" fmla="*/ 4021696 w 5552708"/>
+              <a:gd name="connsiteY174" fmla="*/ 6289517 h 6858000"/>
+              <a:gd name="connsiteX175" fmla="*/ 3993817 w 5552708"/>
+              <a:gd name="connsiteY175" fmla="*/ 6365399 h 6858000"/>
+              <a:gd name="connsiteX176" fmla="*/ 3986236 w 5552708"/>
+              <a:gd name="connsiteY176" fmla="*/ 6377584 h 6858000"/>
+              <a:gd name="connsiteX177" fmla="*/ 3911599 w 5552708"/>
+              <a:gd name="connsiteY177" fmla="*/ 6509659 h 6858000"/>
+              <a:gd name="connsiteX178" fmla="*/ 3858869 w 5552708"/>
+              <a:gd name="connsiteY178" fmla="*/ 6582751 h 6858000"/>
+              <a:gd name="connsiteX179" fmla="*/ 3770950 w 5552708"/>
+              <a:gd name="connsiteY179" fmla="*/ 6757987 h 6858000"/>
+              <a:gd name="connsiteX180" fmla="*/ 3749766 w 5552708"/>
+              <a:gd name="connsiteY180" fmla="*/ 6858000 h 6858000"/>
+              <a:gd name="connsiteX181" fmla="*/ 12348 w 5552708"/>
+              <a:gd name="connsiteY181" fmla="*/ 6858000 h 6858000"/>
+              <a:gd name="connsiteX182" fmla="*/ 0 w 5552708"/>
+              <a:gd name="connsiteY182" fmla="*/ 6725668 h 6858000"/>
+            </a:gdLst>
+            <a:ahLst/>
+            <a:cxnLst>
+              <a:cxn ang="0">
+                <a:pos x="connsiteX0" y="connsiteY0"/>
+              </a:cxn>
+              <a:cxn ang="0">
+                <a:pos x="connsiteX1" y="connsiteY1"/>
+              </a:cxn>
+              <a:cxn ang="0">
+                <a:pos x="connsiteX2" y="connsiteY2"/>
+              </a:cxn>
+              <a:cxn ang="0">
+                <a:pos x="connsiteX3" y="connsiteY3"/>
+              </a:cxn>
+              <a:cxn ang="0">
+                <a:pos x="connsiteX4" y="connsiteY4"/>
+              </a:cxn>
+              <a:cxn ang="0">
+                <a:pos x="connsiteX5" y="connsiteY5"/>
+              </a:cxn>
+              <a:cxn ang="0">
+                <a:pos x="connsiteX6" y="connsiteY6"/>
+              </a:cxn>
+              <a:cxn ang="0">
+                <a:pos x="connsiteX7" y="connsiteY7"/>
+              </a:cxn>
+              <a:cxn ang="0">
+                <a:pos x="connsiteX8" y="connsiteY8"/>
+              </a:cxn>
+              <a:cxn ang="0">
+                <a:pos x="connsiteX9" y="connsiteY9"/>
+              </a:cxn>
+              <a:cxn ang="0">
+                <a:pos x="connsiteX10" y="connsiteY10"/>
+              </a:cxn>
+              <a:cxn ang="0">
+                <a:pos x="connsiteX11" y="connsiteY11"/>
+              </a:cxn>
+              <a:cxn ang="0">
+                <a:pos x="connsiteX12" y="connsiteY12"/>
+              </a:cxn>
+              <a:cxn ang="0">
+                <a:pos x="connsiteX13" y="connsiteY13"/>
+              </a:cxn>
+              <a:cxn ang="0">
+                <a:pos x="connsiteX14" y="connsiteY14"/>
+              </a:cxn>
+              <a:cxn ang="0">
+                <a:pos x="connsiteX15" y="connsiteY15"/>
+              </a:cxn>
+              <a:cxn ang="0">
+                <a:pos x="connsiteX16" y="connsiteY16"/>
+              </a:cxn>
+              <a:cxn ang="0">
+                <a:pos x="connsiteX17" y="connsiteY17"/>
+              </a:cxn>
+              <a:cxn ang="0">
+                <a:pos x="connsiteX18" y="connsiteY18"/>
+              </a:cxn>
+              <a:cxn ang="0">
+                <a:pos x="connsiteX19" y="connsiteY19"/>
+              </a:cxn>
+              <a:cxn ang="0">
+                <a:pos x="connsiteX20" y="connsiteY20"/>
+              </a:cxn>
+              <a:cxn ang="0">
+                <a:pos x="connsiteX21" y="connsiteY21"/>
+              </a:cxn>
+              <a:cxn ang="0">
+                <a:pos x="connsiteX22" y="connsiteY22"/>
+              </a:cxn>
+              <a:cxn ang="0">
+                <a:pos x="connsiteX23" y="connsiteY23"/>
+              </a:cxn>
+              <a:cxn ang="0">
+                <a:pos x="connsiteX24" y="connsiteY24"/>
+              </a:cxn>
+              <a:cxn ang="0">
+                <a:pos x="connsiteX25" y="connsiteY25"/>
+              </a:cxn>
+              <a:cxn ang="0">
+                <a:pos x="connsiteX26" y="connsiteY26"/>
+              </a:cxn>
+              <a:cxn ang="0">
+                <a:pos x="connsiteX27" y="connsiteY27"/>
+              </a:cxn>
+              <a:cxn ang="0">
+                <a:pos x="connsiteX28" y="connsiteY28"/>
+              </a:cxn>
+              <a:cxn ang="0">
+                <a:pos x="connsiteX29" y="connsiteY29"/>
+              </a:cxn>
+              <a:cxn ang="0">
+                <a:pos x="connsiteX30" y="connsiteY30"/>
+              </a:cxn>
+              <a:cxn ang="0">
+                <a:pos x="connsiteX31" y="connsiteY31"/>
+              </a:cxn>
+              <a:cxn ang="0">
+                <a:pos x="connsiteX32" y="connsiteY32"/>
+              </a:cxn>
+              <a:cxn ang="0">
+                <a:pos x="connsiteX33" y="connsiteY33"/>
+              </a:cxn>
+              <a:cxn ang="0">
+                <a:pos x="connsiteX34" y="connsiteY34"/>
+              </a:cxn>
+              <a:cxn ang="0">
+                <a:pos x="connsiteX35" y="connsiteY35"/>
+              </a:cxn>
+              <a:cxn ang="0">
+                <a:pos x="connsiteX36" y="connsiteY36"/>
+              </a:cxn>
+              <a:cxn ang="0">
+                <a:pos x="connsiteX37" y="connsiteY37"/>
+              </a:cxn>
+              <a:cxn ang="0">
+                <a:pos x="connsiteX38" y="connsiteY38"/>
+              </a:cxn>
+              <a:cxn ang="0">
+                <a:pos x="connsiteX39" y="connsiteY39"/>
+              </a:cxn>
+              <a:cxn ang="0">
+                <a:pos x="connsiteX40" y="connsiteY40"/>
+              </a:cxn>
+              <a:cxn ang="0">
+                <a:pos x="connsiteX41" y="connsiteY41"/>
+              </a:cxn>
+              <a:cxn ang="0">
+                <a:pos x="connsiteX42" y="connsiteY42"/>
+              </a:cxn>
+              <a:cxn ang="0">
+                <a:pos x="connsiteX43" y="connsiteY43"/>
+              </a:cxn>
+              <a:cxn ang="0">
+                <a:pos x="connsiteX44" y="connsiteY44"/>
+              </a:cxn>
+              <a:cxn ang="0">
+                <a:pos x="connsiteX45" y="connsiteY45"/>
+              </a:cxn>
+              <a:cxn ang="0">
+                <a:pos x="connsiteX46" y="connsiteY46"/>
+              </a:cxn>
+              <a:cxn ang="0">
+                <a:pos x="connsiteX47" y="connsiteY47"/>
+              </a:cxn>
+              <a:cxn ang="0">
+                <a:pos x="connsiteX48" y="connsiteY48"/>
+              </a:cxn>
+              <a:cxn ang="0">
+                <a:pos x="connsiteX49" y="connsiteY49"/>
+              </a:cxn>
+              <a:cxn ang="0">
+                <a:pos x="connsiteX50" y="connsiteY50"/>
+              </a:cxn>
+              <a:cxn ang="0">
+                <a:pos x="connsiteX51" y="connsiteY51"/>
+              </a:cxn>
+              <a:cxn ang="0">
+                <a:pos x="connsiteX52" y="connsiteY52"/>
+              </a:cxn>
+              <a:cxn ang="0">
+                <a:pos x="connsiteX53" y="connsiteY53"/>
+              </a:cxn>
+              <a:cxn ang="0">
+                <a:pos x="connsiteX54" y="connsiteY54"/>
+              </a:cxn>
+              <a:cxn ang="0">
+                <a:pos x="connsiteX55" y="connsiteY55"/>
+              </a:cxn>
+              <a:cxn ang="0">
+                <a:pos x="connsiteX56" y="connsiteY56"/>
+              </a:cxn>
+              <a:cxn ang="0">
+                <a:pos x="connsiteX57" y="connsiteY57"/>
+              </a:cxn>
+              <a:cxn ang="0">
+                <a:pos x="connsiteX58" y="connsiteY58"/>
+              </a:cxn>
+              <a:cxn ang="0">
+                <a:pos x="connsiteX59" y="connsiteY59"/>
+              </a:cxn>
+              <a:cxn ang="0">
+                <a:pos x="connsiteX60" y="connsiteY60"/>
+              </a:cxn>
+              <a:cxn ang="0">
+                <a:pos x="connsiteX61" y="connsiteY61"/>
+              </a:cxn>
+              <a:cxn ang="0">
+                <a:pos x="connsiteX62" y="connsiteY62"/>
+              </a:cxn>
+              <a:cxn ang="0">
+                <a:pos x="connsiteX63" y="connsiteY63"/>
+              </a:cxn>
+              <a:cxn ang="0">
+                <a:pos x="connsiteX64" y="connsiteY64"/>
+              </a:cxn>
+              <a:cxn ang="0">
+                <a:pos x="connsiteX65" y="connsiteY65"/>
+              </a:cxn>
+              <a:cxn ang="0">
+                <a:pos x="connsiteX66" y="connsiteY66"/>
+              </a:cxn>
+              <a:cxn ang="0">
+                <a:pos x="connsiteX67" y="connsiteY67"/>
+              </a:cxn>
+              <a:cxn ang="0">
+                <a:pos x="connsiteX68" y="connsiteY68"/>
+              </a:cxn>
+              <a:cxn ang="0">
+                <a:pos x="connsiteX69" y="connsiteY69"/>
+              </a:cxn>
+              <a:cxn ang="0">
+                <a:pos x="connsiteX70" y="connsiteY70"/>
+              </a:cxn>
+              <a:cxn ang="0">
+                <a:pos x="connsiteX71" y="connsiteY71"/>
+              </a:cxn>
+              <a:cxn ang="0">
+                <a:pos x="connsiteX72" y="connsiteY72"/>
+              </a:cxn>
+              <a:cxn ang="0">
+                <a:pos x="connsiteX73" y="connsiteY73"/>
+              </a:cxn>
+              <a:cxn ang="0">
+                <a:pos x="connsiteX74" y="connsiteY74"/>
+              </a:cxn>
+              <a:cxn ang="0">
+                <a:pos x="connsiteX75" y="connsiteY75"/>
+              </a:cxn>
+              <a:cxn ang="0">
+                <a:pos x="connsiteX76" y="connsiteY76"/>
+              </a:cxn>
+              <a:cxn ang="0">
+                <a:pos x="connsiteX77" y="connsiteY77"/>
+              </a:cxn>
+              <a:cxn ang="0">
+                <a:pos x="connsiteX78" y="connsiteY78"/>
+              </a:cxn>
+              <a:cxn ang="0">
+                <a:pos x="connsiteX79" y="connsiteY79"/>
+              </a:cxn>
+              <a:cxn ang="0">
+                <a:pos x="connsiteX80" y="connsiteY80"/>
+              </a:cxn>
+              <a:cxn ang="0">
+                <a:pos x="connsiteX81" y="connsiteY81"/>
+              </a:cxn>
+              <a:cxn ang="0">
+                <a:pos x="connsiteX82" y="connsiteY82"/>
+              </a:cxn>
+              <a:cxn ang="0">
+                <a:pos x="connsiteX83" y="connsiteY83"/>
+              </a:cxn>
+              <a:cxn ang="0">
+                <a:pos x="connsiteX84" y="connsiteY84"/>
+              </a:cxn>
+              <a:cxn ang="0">
+                <a:pos x="connsiteX85" y="connsiteY85"/>
+              </a:cxn>
+              <a:cxn ang="0">
+                <a:pos x="connsiteX86" y="connsiteY86"/>
+              </a:cxn>
+              <a:cxn ang="0">
+                <a:pos x="connsiteX87" y="connsiteY87"/>
+              </a:cxn>
+              <a:cxn ang="0">
+                <a:pos x="connsiteX88" y="connsiteY88"/>
+              </a:cxn>
+              <a:cxn ang="0">
+                <a:pos x="connsiteX89" y="connsiteY89"/>
+              </a:cxn>
+              <a:cxn ang="0">
+                <a:pos x="connsiteX90" y="connsiteY90"/>
+              </a:cxn>
+              <a:cxn ang="0">
+                <a:pos x="connsiteX91" y="connsiteY91"/>
+              </a:cxn>
+              <a:cxn ang="0">
+                <a:pos x="connsiteX92" y="connsiteY92"/>
+              </a:cxn>
+              <a:cxn ang="0">
+                <a:pos x="connsiteX93" y="connsiteY93"/>
+              </a:cxn>
+              <a:cxn ang="0">
+                <a:pos x="connsiteX94" y="connsiteY94"/>
+              </a:cxn>
+              <a:cxn ang="0">
+                <a:pos x="connsiteX95" y="connsiteY95"/>
+              </a:cxn>
+              <a:cxn ang="0">
+                <a:pos x="connsiteX96" y="connsiteY96"/>
+              </a:cxn>
+              <a:cxn ang="0">
+                <a:pos x="connsiteX97" y="connsiteY97"/>
+              </a:cxn>
+              <a:cxn ang="0">
+                <a:pos x="connsiteX98" y="connsiteY98"/>
+              </a:cxn>
+              <a:cxn ang="0">
+                <a:pos x="connsiteX99" y="connsiteY99"/>
+              </a:cxn>
+              <a:cxn ang="0">
+                <a:pos x="connsiteX100" y="connsiteY100"/>
+              </a:cxn>
+              <a:cxn ang="0">
+                <a:pos x="connsiteX101" y="connsiteY101"/>
+              </a:cxn>
+              <a:cxn ang="0">
+                <a:pos x="connsiteX102" y="connsiteY102"/>
+              </a:cxn>
+              <a:cxn ang="0">
+                <a:pos x="connsiteX103" y="connsiteY103"/>
+              </a:cxn>
+              <a:cxn ang="0">
+                <a:pos x="connsiteX104" y="connsiteY104"/>
+              </a:cxn>
+              <a:cxn ang="0">
+                <a:pos x="connsiteX105" y="connsiteY105"/>
+              </a:cxn>
+              <a:cxn ang="0">
+                <a:pos x="connsiteX106" y="connsiteY106"/>
+              </a:cxn>
+              <a:cxn ang="0">
+                <a:pos x="connsiteX107" y="connsiteY107"/>
+              </a:cxn>
+              <a:cxn ang="0">
+                <a:pos x="connsiteX108" y="connsiteY108"/>
+              </a:cxn>
+              <a:cxn ang="0">
+                <a:pos x="connsiteX109" y="connsiteY109"/>
+              </a:cxn>
+              <a:cxn ang="0">
+                <a:pos x="connsiteX110" y="connsiteY110"/>
+              </a:cxn>
+              <a:cxn ang="0">
+                <a:pos x="connsiteX111" y="connsiteY111"/>
+              </a:cxn>
+              <a:cxn ang="0">
+                <a:pos x="connsiteX112" y="connsiteY112"/>
+              </a:cxn>
+              <a:cxn ang="0">
+                <a:pos x="connsiteX113" y="connsiteY113"/>
+              </a:cxn>
+              <a:cxn ang="0">
+                <a:pos x="connsiteX114" y="connsiteY114"/>
+              </a:cxn>
+              <a:cxn ang="0">
+                <a:pos x="connsiteX115" y="connsiteY115"/>
+              </a:cxn>
+              <a:cxn ang="0">
+                <a:pos x="connsiteX116" y="connsiteY116"/>
+              </a:cxn>
+              <a:cxn ang="0">
+                <a:pos x="connsiteX117" y="connsiteY117"/>
+              </a:cxn>
+              <a:cxn ang="0">
+                <a:pos x="connsiteX118" y="connsiteY118"/>
+              </a:cxn>
+              <a:cxn ang="0">
+                <a:pos x="connsiteX119" y="connsiteY119"/>
+              </a:cxn>
+              <a:cxn ang="0">
+                <a:pos x="connsiteX120" y="connsiteY120"/>
+              </a:cxn>
+              <a:cxn ang="0">
+                <a:pos x="connsiteX121" y="connsiteY121"/>
+              </a:cxn>
+              <a:cxn ang="0">
+                <a:pos x="connsiteX122" y="connsiteY122"/>
+              </a:cxn>
+              <a:cxn ang="0">
+                <a:pos x="connsiteX123" y="connsiteY123"/>
+              </a:cxn>
+              <a:cxn ang="0">
+                <a:pos x="connsiteX124" y="connsiteY124"/>
+              </a:cxn>
+              <a:cxn ang="0">
+                <a:pos x="connsiteX125" y="connsiteY125"/>
+              </a:cxn>
+              <a:cxn ang="0">
+                <a:pos x="connsiteX126" y="connsiteY126"/>
+              </a:cxn>
+              <a:cxn ang="0">
+                <a:pos x="connsiteX127" y="connsiteY127"/>
+              </a:cxn>
+              <a:cxn ang="0">
+                <a:pos x="connsiteX128" y="connsiteY128"/>
+              </a:cxn>
+              <a:cxn ang="0">
+                <a:pos x="connsiteX129" y="connsiteY129"/>
+              </a:cxn>
+              <a:cxn ang="0">
+                <a:pos x="connsiteX130" y="connsiteY130"/>
+              </a:cxn>
+              <a:cxn ang="0">
+                <a:pos x="connsiteX131" y="connsiteY131"/>
+              </a:cxn>
+              <a:cxn ang="0">
+                <a:pos x="connsiteX132" y="connsiteY132"/>
+              </a:cxn>
+              <a:cxn ang="0">
+                <a:pos x="connsiteX133" y="connsiteY133"/>
+              </a:cxn>
+              <a:cxn ang="0">
+                <a:pos x="connsiteX134" y="connsiteY134"/>
+              </a:cxn>
+              <a:cxn ang="0">
+                <a:pos x="connsiteX135" y="connsiteY135"/>
+              </a:cxn>
+              <a:cxn ang="0">
+                <a:pos x="connsiteX136" y="connsiteY136"/>
+              </a:cxn>
+              <a:cxn ang="0">
+                <a:pos x="connsiteX137" y="connsiteY137"/>
+              </a:cxn>
+              <a:cxn ang="0">
+                <a:pos x="connsiteX138" y="connsiteY138"/>
+              </a:cxn>
+              <a:cxn ang="0">
+                <a:pos x="connsiteX139" y="connsiteY139"/>
+              </a:cxn>
+              <a:cxn ang="0">
+                <a:pos x="connsiteX140" y="connsiteY140"/>
+              </a:cxn>
+              <a:cxn ang="0">
+                <a:pos x="connsiteX141" y="connsiteY141"/>
+              </a:cxn>
+              <a:cxn ang="0">
+                <a:pos x="connsiteX142" y="connsiteY142"/>
+              </a:cxn>
+              <a:cxn ang="0">
+                <a:pos x="connsiteX143" y="connsiteY143"/>
+              </a:cxn>
+              <a:cxn ang="0">
+                <a:pos x="connsiteX144" y="connsiteY144"/>
+              </a:cxn>
+              <a:cxn ang="0">
+                <a:pos x="connsiteX145" y="connsiteY145"/>
+              </a:cxn>
+              <a:cxn ang="0">
+                <a:pos x="connsiteX146" y="connsiteY146"/>
+              </a:cxn>
+              <a:cxn ang="0">
+                <a:pos x="connsiteX147" y="connsiteY147"/>
+              </a:cxn>
+              <a:cxn ang="0">
+                <a:pos x="connsiteX148" y="connsiteY148"/>
+              </a:cxn>
+              <a:cxn ang="0">
+                <a:pos x="connsiteX149" y="connsiteY149"/>
+              </a:cxn>
+              <a:cxn ang="0">
+                <a:pos x="connsiteX150" y="connsiteY150"/>
+              </a:cxn>
+              <a:cxn ang="0">
+                <a:pos x="connsiteX151" y="connsiteY151"/>
+              </a:cxn>
+              <a:cxn ang="0">
+                <a:pos x="connsiteX152" y="connsiteY152"/>
+              </a:cxn>
+              <a:cxn ang="0">
+                <a:pos x="connsiteX153" y="connsiteY153"/>
+              </a:cxn>
+              <a:cxn ang="0">
+                <a:pos x="connsiteX154" y="connsiteY154"/>
+              </a:cxn>
+              <a:cxn ang="0">
+                <a:pos x="connsiteX155" y="connsiteY155"/>
+              </a:cxn>
+              <a:cxn ang="0">
+                <a:pos x="connsiteX156" y="connsiteY156"/>
+              </a:cxn>
+              <a:cxn ang="0">
+                <a:pos x="connsiteX157" y="connsiteY157"/>
+              </a:cxn>
+              <a:cxn ang="0">
+                <a:pos x="connsiteX158" y="connsiteY158"/>
+              </a:cxn>
+              <a:cxn ang="0">
+                <a:pos x="connsiteX159" y="connsiteY159"/>
+              </a:cxn>
+              <a:cxn ang="0">
+                <a:pos x="connsiteX160" y="connsiteY160"/>
+              </a:cxn>
+              <a:cxn ang="0">
+                <a:pos x="connsiteX161" y="connsiteY161"/>
+              </a:cxn>
+              <a:cxn ang="0">
+                <a:pos x="connsiteX162" y="connsiteY162"/>
+              </a:cxn>
+              <a:cxn ang="0">
+                <a:pos x="connsiteX163" y="connsiteY163"/>
+              </a:cxn>
+              <a:cxn ang="0">
+                <a:pos x="connsiteX164" y="connsiteY164"/>
+              </a:cxn>
+              <a:cxn ang="0">
+                <a:pos x="connsiteX165" y="connsiteY165"/>
+              </a:cxn>
+              <a:cxn ang="0">
+                <a:pos x="connsiteX166" y="connsiteY166"/>
+              </a:cxn>
+              <a:cxn ang="0">
+                <a:pos x="connsiteX167" y="connsiteY167"/>
+              </a:cxn>
+              <a:cxn ang="0">
+                <a:pos x="connsiteX168" y="connsiteY168"/>
+              </a:cxn>
+              <a:cxn ang="0">
+                <a:pos x="connsiteX169" y="connsiteY169"/>
+              </a:cxn>
+              <a:cxn ang="0">
+                <a:pos x="connsiteX170" y="connsiteY170"/>
+              </a:cxn>
+              <a:cxn ang="0">
+                <a:pos x="connsiteX171" y="connsiteY171"/>
+              </a:cxn>
+              <a:cxn ang="0">
+                <a:pos x="connsiteX172" y="connsiteY172"/>
+              </a:cxn>
+              <a:cxn ang="0">
+                <a:pos x="connsiteX173" y="connsiteY173"/>
+              </a:cxn>
+              <a:cxn ang="0">
+                <a:pos x="connsiteX174" y="connsiteY174"/>
+              </a:cxn>
+              <a:cxn ang="0">
+                <a:pos x="connsiteX175" y="connsiteY175"/>
+              </a:cxn>
+              <a:cxn ang="0">
+                <a:pos x="connsiteX176" y="connsiteY176"/>
+              </a:cxn>
+              <a:cxn ang="0">
+                <a:pos x="connsiteX177" y="connsiteY177"/>
+              </a:cxn>
+              <a:cxn ang="0">
+                <a:pos x="connsiteX178" y="connsiteY178"/>
+              </a:cxn>
+              <a:cxn ang="0">
+                <a:pos x="connsiteX179" y="connsiteY179"/>
+              </a:cxn>
+              <a:cxn ang="0">
+                <a:pos x="connsiteX180" y="connsiteY180"/>
+              </a:cxn>
+              <a:cxn ang="0">
+                <a:pos x="connsiteX181" y="connsiteY181"/>
+              </a:cxn>
+              <a:cxn ang="0">
+                <a:pos x="connsiteX182" y="connsiteY182"/>
+              </a:cxn>
+            </a:cxnLst>
+            <a:rect l="l" t="t" r="r" b="b"/>
+            <a:pathLst>
+              <a:path w="5552708" h="6858000">
+                <a:moveTo>
+                  <a:pt x="0" y="0"/>
+                </a:moveTo>
+                <a:lnTo>
+                  <a:pt x="5443651" y="0"/>
+                </a:lnTo>
+                <a:lnTo>
+                  <a:pt x="5443781" y="512"/>
+                </a:lnTo>
+                <a:cubicBezTo>
+                  <a:pt x="5446206" y="7309"/>
+                  <a:pt x="5449083" y="15278"/>
+                  <a:pt x="5444033" y="20501"/>
+                </a:cubicBezTo>
+                <a:cubicBezTo>
+                  <a:pt x="5435420" y="27795"/>
+                  <a:pt x="5439966" y="35996"/>
+                  <a:pt x="5439390" y="44768"/>
+                </a:cubicBezTo>
+                <a:cubicBezTo>
+                  <a:pt x="5431962" y="55410"/>
+                  <a:pt x="5437588" y="94208"/>
+                  <a:pt x="5443913" y="104988"/>
+                </a:cubicBezTo>
+                <a:cubicBezTo>
+                  <a:pt x="5467308" y="131885"/>
+                  <a:pt x="5440518" y="182050"/>
+                  <a:pt x="5458241" y="204162"/>
+                </a:cubicBezTo>
+                <a:cubicBezTo>
+                  <a:pt x="5460281" y="211583"/>
+                  <a:pt x="5460566" y="218611"/>
+                  <a:pt x="5459763" y="225360"/>
+                </a:cubicBezTo>
+                <a:lnTo>
+                  <a:pt x="5454996" y="243902"/>
+                </a:lnTo>
+                <a:lnTo>
+                  <a:pt x="5448597" y="248483"/>
+                </a:lnTo>
+                <a:lnTo>
+                  <a:pt x="5448458" y="260196"/>
+                </a:lnTo>
+                <a:lnTo>
+                  <a:pt x="5447150" y="263377"/>
+                </a:lnTo>
+                <a:cubicBezTo>
+                  <a:pt x="5448938" y="273127"/>
+                  <a:pt x="5457762" y="301628"/>
+                  <a:pt x="5459187" y="318691"/>
+                </a:cubicBezTo>
+                <a:cubicBezTo>
+                  <a:pt x="5456617" y="351374"/>
+                  <a:pt x="5481393" y="329570"/>
+                  <a:pt x="5455708" y="365759"/>
+                </a:cubicBezTo>
+                <a:cubicBezTo>
+                  <a:pt x="5472236" y="419311"/>
+                  <a:pt x="5443611" y="447897"/>
+                  <a:pt x="5473651" y="492182"/>
+                </a:cubicBezTo>
+                <a:cubicBezTo>
+                  <a:pt x="5483259" y="556102"/>
+                  <a:pt x="5473858" y="624576"/>
+                  <a:pt x="5481453" y="689666"/>
+                </a:cubicBezTo>
+                <a:cubicBezTo>
+                  <a:pt x="5481825" y="737836"/>
+                  <a:pt x="5505966" y="768312"/>
+                  <a:pt x="5488233" y="816332"/>
+                </a:cubicBezTo>
+                <a:cubicBezTo>
+                  <a:pt x="5492515" y="818482"/>
+                  <a:pt x="5526923" y="887911"/>
+                  <a:pt x="5529718" y="891550"/>
+                </a:cubicBezTo>
+                <a:lnTo>
+                  <a:pt x="5536104" y="903318"/>
+                </a:lnTo>
+                <a:lnTo>
+                  <a:pt x="5535257" y="905308"/>
+                </a:lnTo>
+                <a:cubicBezTo>
+                  <a:pt x="5534066" y="913418"/>
+                  <a:pt x="5535399" y="917837"/>
+                  <a:pt x="5537840" y="920621"/>
+                </a:cubicBezTo>
+                <a:lnTo>
+                  <a:pt x="5541663" y="922876"/>
+                </a:lnTo>
+                <a:lnTo>
+                  <a:pt x="5544456" y="933037"/>
+                </a:lnTo>
+                <a:lnTo>
+                  <a:pt x="5552708" y="952132"/>
+                </a:lnTo>
+                <a:lnTo>
+                  <a:pt x="5551675" y="956570"/>
+                </a:lnTo>
+                <a:lnTo>
+                  <a:pt x="5531341" y="1064863"/>
+                </a:lnTo>
+                <a:cubicBezTo>
+                  <a:pt x="5534620" y="1074818"/>
+                  <a:pt x="5537566" y="1085372"/>
+                  <a:pt x="5539998" y="1096340"/>
+                </a:cubicBezTo>
+                <a:lnTo>
+                  <a:pt x="5541075" y="1102915"/>
+                </a:lnTo>
+                <a:lnTo>
+                  <a:pt x="5540822" y="1103143"/>
+                </a:lnTo>
+                <a:cubicBezTo>
+                  <a:pt x="5540471" y="1104784"/>
+                  <a:pt x="5540605" y="1107024"/>
+                  <a:pt x="5541413" y="1110274"/>
+                </a:cubicBezTo>
+                <a:lnTo>
+                  <a:pt x="5543038" y="1114901"/>
+                </a:lnTo>
+                <a:cubicBezTo>
+                  <a:pt x="5543735" y="1119151"/>
+                  <a:pt x="5544432" y="1123402"/>
+                  <a:pt x="5545128" y="1127652"/>
+                </a:cubicBezTo>
+                <a:lnTo>
+                  <a:pt x="5544028" y="1132698"/>
+                </a:lnTo>
+                <a:cubicBezTo>
+                  <a:pt x="5534609" y="1151029"/>
+                  <a:pt x="5496304" y="1149042"/>
+                  <a:pt x="5514811" y="1177140"/>
+                </a:cubicBezTo>
+                <a:cubicBezTo>
+                  <a:pt x="5509719" y="1211798"/>
+                  <a:pt x="5486957" y="1231445"/>
+                  <a:pt x="5496402" y="1265293"/>
+                </a:cubicBezTo>
+                <a:cubicBezTo>
+                  <a:pt x="5491550" y="1297727"/>
+                  <a:pt x="5479431" y="1324727"/>
+                  <a:pt x="5481620" y="1353039"/>
+                </a:cubicBezTo>
+                <a:cubicBezTo>
+                  <a:pt x="5473631" y="1363324"/>
+                  <a:pt x="5469597" y="1373497"/>
+                  <a:pt x="5477938" y="1385038"/>
+                </a:cubicBezTo>
+                <a:cubicBezTo>
+                  <a:pt x="5470625" y="1414924"/>
+                  <a:pt x="5455771" y="1420367"/>
+                  <a:pt x="5464009" y="1441067"/>
+                </a:cubicBezTo>
+                <a:cubicBezTo>
+                  <a:pt x="5439287" y="1455035"/>
+                  <a:pt x="5447714" y="1457216"/>
+                  <a:pt x="5453063" y="1466104"/>
+                </a:cubicBezTo>
+                <a:cubicBezTo>
+                  <a:pt x="5453164" y="1466506"/>
+                  <a:pt x="5453267" y="1466908"/>
+                  <a:pt x="5453368" y="1467310"/>
+                </a:cubicBezTo>
+                <a:lnTo>
+                  <a:pt x="5449849" y="1469198"/>
+                </a:lnTo>
+                <a:lnTo>
+                  <a:pt x="5447717" y="1473816"/>
+                </a:lnTo>
+                <a:lnTo>
+                  <a:pt x="5446906" y="1487106"/>
+                </a:lnTo>
+                <a:cubicBezTo>
+                  <a:pt x="5447081" y="1488810"/>
+                  <a:pt x="5447254" y="1490514"/>
+                  <a:pt x="5447429" y="1492218"/>
+                </a:cubicBezTo>
+                <a:cubicBezTo>
+                  <a:pt x="5447480" y="1495695"/>
+                  <a:pt x="5447119" y="1497953"/>
+                  <a:pt x="5446434" y="1499455"/>
+                </a:cubicBezTo>
+                <a:lnTo>
+                  <a:pt x="5446146" y="1499600"/>
+                </a:lnTo>
+                <a:lnTo>
+                  <a:pt x="5445728" y="1506449"/>
+                </a:lnTo>
+                <a:cubicBezTo>
+                  <a:pt x="5445627" y="1518090"/>
+                  <a:pt x="5446096" y="1529498"/>
+                  <a:pt x="5447013" y="1540420"/>
+                </a:cubicBezTo>
+                <a:cubicBezTo>
+                  <a:pt x="5431084" y="1547368"/>
+                  <a:pt x="5443219" y="1588924"/>
+                  <a:pt x="5416036" y="1580834"/>
+                </a:cubicBezTo>
+                <a:cubicBezTo>
+                  <a:pt x="5416447" y="1595454"/>
+                  <a:pt x="5426812" y="1605684"/>
+                  <a:pt x="5409252" y="1598373"/>
+                </a:cubicBezTo>
+                <a:cubicBezTo>
+                  <a:pt x="5408864" y="1603115"/>
+                  <a:pt x="5406927" y="1605804"/>
+                  <a:pt x="5404223" y="1607549"/>
+                </a:cubicBezTo>
+                <a:lnTo>
+                  <a:pt x="5403003" y="1607994"/>
+                </a:lnTo>
+                <a:lnTo>
+                  <a:pt x="5404366" y="1640580"/>
+                </a:lnTo>
+                <a:lnTo>
+                  <a:pt x="5402429" y="1644617"/>
+                </a:lnTo>
+                <a:cubicBezTo>
+                  <a:pt x="5403628" y="1651821"/>
+                  <a:pt x="5404828" y="1659024"/>
+                  <a:pt x="5406027" y="1666228"/>
+                </a:cubicBezTo>
+                <a:lnTo>
+                  <a:pt x="5409538" y="1680703"/>
+                </a:lnTo>
+                <a:lnTo>
+                  <a:pt x="5405582" y="1870222"/>
+                </a:lnTo>
+                <a:cubicBezTo>
+                  <a:pt x="5407505" y="1917082"/>
+                  <a:pt x="5419912" y="1922890"/>
+                  <a:pt x="5418948" y="1979530"/>
+                </a:cubicBezTo>
+                <a:cubicBezTo>
+                  <a:pt x="5381653" y="1974789"/>
+                  <a:pt x="5447295" y="2092994"/>
+                  <a:pt x="5405060" y="2051964"/>
+                </a:cubicBezTo>
+                <a:cubicBezTo>
+                  <a:pt x="5406099" y="2068965"/>
+                  <a:pt x="5389286" y="2084064"/>
+                  <a:pt x="5378701" y="2073120"/>
+                </a:cubicBezTo>
+                <a:cubicBezTo>
+                  <a:pt x="5397285" y="2126878"/>
+                  <a:pt x="5362129" y="2197651"/>
+                  <a:pt x="5366006" y="2256053"/>
+                </a:cubicBezTo>
+                <a:cubicBezTo>
+                  <a:pt x="5334011" y="2283221"/>
+                  <a:pt x="5362023" y="2269954"/>
+                  <a:pt x="5352501" y="2301374"/>
+                </a:cubicBezTo>
+                <a:cubicBezTo>
+                  <a:pt x="5379308" y="2296096"/>
+                  <a:pt x="5332887" y="2338416"/>
+                  <a:pt x="5361572" y="2344135"/>
+                </a:cubicBezTo>
+                <a:cubicBezTo>
+                  <a:pt x="5358931" y="2349671"/>
+                  <a:pt x="5355467" y="2354856"/>
+                  <a:pt x="5351776" y="2360013"/>
+                </a:cubicBezTo>
+                <a:lnTo>
+                  <a:pt x="5349856" y="2362723"/>
+                </a:lnTo>
+                <a:lnTo>
+                  <a:pt x="5347182" y="2374239"/>
+                </a:lnTo>
+                <a:lnTo>
+                  <a:pt x="5340172" y="2376629"/>
+                </a:lnTo>
+                <a:lnTo>
+                  <a:pt x="5331662" y="2393351"/>
+                </a:lnTo>
+                <a:cubicBezTo>
+                  <a:pt x="5329441" y="2399746"/>
+                  <a:pt x="5328181" y="2406782"/>
+                  <a:pt x="5328482" y="2414790"/>
+                </a:cubicBezTo>
+                <a:cubicBezTo>
+                  <a:pt x="5337359" y="2435605"/>
+                  <a:pt x="5319289" y="2463646"/>
+                  <a:pt x="5316501" y="2490864"/>
+                </a:cubicBezTo>
+                <a:cubicBezTo>
+                  <a:pt x="5317127" y="2495175"/>
+                  <a:pt x="5317754" y="2499486"/>
+                  <a:pt x="5318378" y="2503797"/>
+                </a:cubicBezTo>
+                <a:lnTo>
+                  <a:pt x="5307008" y="2543608"/>
+                </a:lnTo>
+                <a:cubicBezTo>
+                  <a:pt x="5304307" y="2555015"/>
+                  <a:pt x="5302094" y="2566933"/>
+                  <a:pt x="5300817" y="2579627"/>
+                </a:cubicBezTo>
+                <a:lnTo>
+                  <a:pt x="5300491" y="2603469"/>
+                </a:lnTo>
+                <a:lnTo>
+                  <a:pt x="5297327" y="2609298"/>
+                </a:lnTo>
+                <a:cubicBezTo>
+                  <a:pt x="5296149" y="2620041"/>
+                  <a:pt x="5302481" y="2635343"/>
+                  <a:pt x="5292648" y="2632709"/>
+                </a:cubicBezTo>
+                <a:lnTo>
+                  <a:pt x="5294499" y="2645215"/>
+                </a:lnTo>
+                <a:lnTo>
+                  <a:pt x="5284921" y="2655995"/>
+                </a:lnTo>
+                <a:cubicBezTo>
+                  <a:pt x="5282893" y="2657043"/>
+                  <a:pt x="5280790" y="2657749"/>
+                  <a:pt x="5278681" y="2658097"/>
+                </a:cubicBezTo>
+                <a:lnTo>
+                  <a:pt x="5279052" y="2675265"/>
+                </a:lnTo>
+                <a:lnTo>
+                  <a:pt x="5271485" y="2688260"/>
+                </a:lnTo>
+                <a:cubicBezTo>
+                  <a:pt x="5272192" y="2692435"/>
+                  <a:pt x="5272901" y="2696610"/>
+                  <a:pt x="5273609" y="2700785"/>
+                </a:cubicBezTo>
+                <a:lnTo>
+                  <a:pt x="5272098" y="2705655"/>
+                </a:lnTo>
+                <a:lnTo>
+                  <a:pt x="5267605" y="2717660"/>
+                </a:lnTo>
+                <a:cubicBezTo>
+                  <a:pt x="5264770" y="2723740"/>
+                  <a:pt x="5261426" y="2730522"/>
+                  <a:pt x="5258449" y="2738177"/>
+                </a:cubicBezTo>
+                <a:lnTo>
+                  <a:pt x="5256679" y="2744727"/>
+                </a:lnTo>
+                <a:lnTo>
+                  <a:pt x="5245116" y="2757932"/>
+                </a:lnTo>
+                <a:cubicBezTo>
+                  <a:pt x="5236430" y="2767502"/>
+                  <a:pt x="5230416" y="2775146"/>
+                  <a:pt x="5233122" y="2784915"/>
+                </a:cubicBezTo>
+                <a:cubicBezTo>
+                  <a:pt x="5221620" y="2799359"/>
+                  <a:pt x="5193828" y="2806744"/>
+                  <a:pt x="5197792" y="2830475"/>
+                </a:cubicBezTo>
+                <a:cubicBezTo>
+                  <a:pt x="5186798" y="2821932"/>
+                  <a:pt x="5192955" y="2855565"/>
+                  <a:pt x="5180199" y="2857691"/>
+                </a:cubicBezTo>
+                <a:cubicBezTo>
+                  <a:pt x="5170100" y="2858096"/>
+                  <a:pt x="5169614" y="2868393"/>
+                  <a:pt x="5164940" y="2875644"/>
+                </a:cubicBezTo>
+                <a:cubicBezTo>
+                  <a:pt x="5154127" y="2879787"/>
+                  <a:pt x="5139696" y="2917521"/>
+                  <a:pt x="5139323" y="2931296"/>
+                </a:cubicBezTo>
+                <a:cubicBezTo>
+                  <a:pt x="5144210" y="2970932"/>
+                  <a:pt x="5099528" y="2996158"/>
+                  <a:pt x="5102390" y="3027705"/>
+                </a:cubicBezTo>
+                <a:cubicBezTo>
+                  <a:pt x="5100365" y="3035586"/>
+                  <a:pt x="5097192" y="3041915"/>
+                  <a:pt x="5093321" y="3047244"/>
+                </a:cubicBezTo>
+                <a:lnTo>
+                  <a:pt x="5080729" y="3060118"/>
+                </a:lnTo>
+                <a:lnTo>
+                  <a:pt x="5073626" y="3059690"/>
+                </a:lnTo>
+                <a:lnTo>
+                  <a:pt x="5067867" y="3069806"/>
+                </a:lnTo>
+                <a:lnTo>
+                  <a:pt x="5065335" y="3071678"/>
+                </a:lnTo>
+                <a:cubicBezTo>
+                  <a:pt x="5060475" y="3075234"/>
+                  <a:pt x="5055815" y="3078901"/>
+                  <a:pt x="5051806" y="3083233"/>
+                </a:cubicBezTo>
+                <a:cubicBezTo>
+                  <a:pt x="5076417" y="3100024"/>
+                  <a:pt x="5021773" y="3122856"/>
+                  <a:pt x="5047824" y="3128247"/>
+                </a:cubicBezTo>
+                <a:cubicBezTo>
+                  <a:pt x="5030083" y="3154978"/>
+                  <a:pt x="5059535" y="3153095"/>
+                  <a:pt x="5022444" y="3166893"/>
+                </a:cubicBezTo>
+                <a:cubicBezTo>
+                  <a:pt x="5009215" y="3225035"/>
+                  <a:pt x="4960350" y="3252747"/>
+                  <a:pt x="4961916" y="3312149"/>
+                </a:cubicBezTo>
+                <a:cubicBezTo>
+                  <a:pt x="4955371" y="3297387"/>
+                  <a:pt x="4932004" y="3332561"/>
+                  <a:pt x="4928070" y="3349450"/>
+                </a:cubicBezTo>
+                <a:cubicBezTo>
+                  <a:pt x="4901199" y="3293116"/>
+                  <a:pt x="4891428" y="3463059"/>
+                  <a:pt x="4858652" y="3443841"/>
+                </a:cubicBezTo>
+                <a:cubicBezTo>
+                  <a:pt x="4840872" y="3495884"/>
+                  <a:pt x="4832958" y="3617975"/>
+                  <a:pt x="4821392" y="3661714"/>
+                </a:cubicBezTo>
+                <a:cubicBezTo>
+                  <a:pt x="4823621" y="3666551"/>
+                  <a:pt x="4824768" y="3671561"/>
+                  <a:pt x="4825147" y="3676668"/>
+                </a:cubicBezTo>
+                <a:lnTo>
+                  <a:pt x="4824341" y="3691352"/>
+                </a:lnTo>
+                <a:lnTo>
+                  <a:pt x="4822735" y="3692500"/>
+                </a:lnTo>
+                <a:cubicBezTo>
+                  <a:pt x="4817912" y="3698748"/>
+                  <a:pt x="4816795" y="3703524"/>
+                  <a:pt x="4817318" y="3707640"/>
+                </a:cubicBezTo>
+                <a:lnTo>
+                  <a:pt x="4819146" y="3712253"/>
+                </a:lnTo>
+                <a:lnTo>
+                  <a:pt x="4816373" y="3723048"/>
+                </a:lnTo>
+                <a:lnTo>
+                  <a:pt x="4813460" y="3745409"/>
+                </a:lnTo>
+                <a:lnTo>
+                  <a:pt x="4810527" y="3748566"/>
+                </a:lnTo>
+                <a:cubicBezTo>
+                  <a:pt x="4798737" y="3762490"/>
+                  <a:pt x="4755451" y="3809983"/>
+                  <a:pt x="4742720" y="3828954"/>
+                </a:cubicBezTo>
+                <a:lnTo>
+                  <a:pt x="4731784" y="3868871"/>
+                </a:lnTo>
+                <a:lnTo>
+                  <a:pt x="4731481" y="3868898"/>
+                </a:lnTo>
+                <a:cubicBezTo>
+                  <a:pt x="4730422" y="3870084"/>
+                  <a:pt x="4729442" y="3872132"/>
+                  <a:pt x="4728490" y="3875525"/>
+                </a:cubicBezTo>
+                <a:lnTo>
+                  <a:pt x="4727500" y="3880683"/>
+                </a:lnTo>
+                <a:lnTo>
+                  <a:pt x="4719663" y="3896892"/>
+                </a:lnTo>
+                <a:lnTo>
+                  <a:pt x="4715899" y="3897345"/>
+                </a:lnTo>
+                <a:cubicBezTo>
+                  <a:pt x="4715876" y="3897775"/>
+                  <a:pt x="4715854" y="3898203"/>
+                  <a:pt x="4715832" y="3898632"/>
+                </a:cubicBezTo>
+                <a:lnTo>
+                  <a:pt x="4618476" y="4076334"/>
+                </a:lnTo>
+                <a:cubicBezTo>
+                  <a:pt x="4617399" y="4112851"/>
+                  <a:pt x="4590920" y="4122978"/>
+                  <a:pt x="4576303" y="4154580"/>
+                </a:cubicBezTo>
+                <a:cubicBezTo>
+                  <a:pt x="4585172" y="4189077"/>
+                  <a:pt x="4550681" y="4172136"/>
+                  <a:pt x="4536795" y="4186216"/>
+                </a:cubicBezTo>
+                <a:lnTo>
+                  <a:pt x="4534335" y="4190678"/>
+                </a:lnTo>
+                <a:lnTo>
+                  <a:pt x="4532585" y="4203860"/>
+                </a:lnTo>
+                <a:cubicBezTo>
+                  <a:pt x="4532638" y="4205567"/>
+                  <a:pt x="4532692" y="4207276"/>
+                  <a:pt x="4532745" y="4208983"/>
+                </a:cubicBezTo>
+                <a:cubicBezTo>
+                  <a:pt x="4532551" y="4212450"/>
+                  <a:pt x="4532031" y="4214675"/>
+                  <a:pt x="4531239" y="4216126"/>
+                </a:cubicBezTo>
+                <a:lnTo>
+                  <a:pt x="4530941" y="4216251"/>
+                </a:lnTo>
+                <a:lnTo>
+                  <a:pt x="4530039" y="4223045"/>
+                </a:lnTo>
+                <a:cubicBezTo>
+                  <a:pt x="4529114" y="4234633"/>
+                  <a:pt x="4528779" y="4246020"/>
+                  <a:pt x="4528920" y="4256957"/>
+                </a:cubicBezTo>
+                <a:cubicBezTo>
+                  <a:pt x="4512505" y="4262858"/>
+                  <a:pt x="4521695" y="4305010"/>
+                  <a:pt x="4495092" y="4295227"/>
+                </a:cubicBezTo>
+                <a:cubicBezTo>
+                  <a:pt x="4494469" y="4309813"/>
+                  <a:pt x="4504108" y="4320656"/>
+                  <a:pt x="4487069" y="4312260"/>
+                </a:cubicBezTo>
+                <a:cubicBezTo>
+                  <a:pt x="4486347" y="4316957"/>
+                  <a:pt x="4484219" y="4319510"/>
+                  <a:pt x="4481391" y="4321074"/>
+                </a:cubicBezTo>
+                <a:lnTo>
+                  <a:pt x="4480140" y="4321443"/>
+                </a:lnTo>
+                <a:lnTo>
+                  <a:pt x="4479199" y="4353976"/>
+                </a:lnTo>
+                <a:lnTo>
+                  <a:pt x="4476976" y="4357874"/>
+                </a:lnTo>
+                <a:cubicBezTo>
+                  <a:pt x="4477666" y="4365122"/>
+                  <a:pt x="4478355" y="4372372"/>
+                  <a:pt x="4479044" y="4379621"/>
+                </a:cubicBezTo>
+                <a:lnTo>
+                  <a:pt x="4478683" y="4390568"/>
+                </a:lnTo>
+                <a:lnTo>
+                  <a:pt x="4481532" y="4394254"/>
+                </a:lnTo>
+                <a:cubicBezTo>
+                  <a:pt x="4482969" y="4397909"/>
+                  <a:pt x="4482918" y="4402720"/>
+                  <a:pt x="4479499" y="4410114"/>
+                </a:cubicBezTo>
+                <a:lnTo>
+                  <a:pt x="4478153" y="4411710"/>
+                </a:lnTo>
+                <a:lnTo>
+                  <a:pt x="4480616" y="4425622"/>
+                </a:lnTo>
+                <a:cubicBezTo>
+                  <a:pt x="4482131" y="4430247"/>
+                  <a:pt x="4484387" y="4434528"/>
+                  <a:pt x="4487688" y="4438292"/>
+                </a:cubicBezTo>
+                <a:cubicBezTo>
+                  <a:pt x="4457664" y="4477897"/>
+                  <a:pt x="4468221" y="4523123"/>
+                  <a:pt x="4454727" y="4569970"/>
+                </a:cubicBezTo>
+                <a:cubicBezTo>
+                  <a:pt x="4417898" y="4583966"/>
+                  <a:pt x="4440689" y="4674230"/>
+                  <a:pt x="4469804" y="4692415"/>
+                </a:cubicBezTo>
+                <a:cubicBezTo>
+                  <a:pt x="4432851" y="4685322"/>
+                  <a:pt x="4490117" y="4807198"/>
+                  <a:pt x="4450795" y="4763659"/>
+                </a:cubicBezTo>
+                <a:cubicBezTo>
+                  <a:pt x="4450628" y="4780652"/>
+                  <a:pt x="4432755" y="4794620"/>
+                  <a:pt x="4422945" y="4783049"/>
+                </a:cubicBezTo>
+                <a:cubicBezTo>
+                  <a:pt x="4437721" y="4837759"/>
+                  <a:pt x="4397569" y="4905997"/>
+                  <a:pt x="4397314" y="4964397"/>
+                </a:cubicBezTo>
+                <a:cubicBezTo>
+                  <a:pt x="4363407" y="4989414"/>
+                  <a:pt x="4392349" y="4977986"/>
+                  <a:pt x="4380606" y="5008665"/>
+                </a:cubicBezTo>
+                <a:cubicBezTo>
+                  <a:pt x="4407778" y="5005114"/>
+                  <a:pt x="4358378" y="5044304"/>
+                  <a:pt x="4386649" y="5051823"/>
+                </a:cubicBezTo>
+                <a:cubicBezTo>
+                  <a:pt x="4383620" y="5057169"/>
+                  <a:pt x="4379789" y="5062109"/>
+                  <a:pt x="4375733" y="5067011"/>
+                </a:cubicBezTo>
+                <a:lnTo>
+                  <a:pt x="4373624" y="5069584"/>
+                </a:lnTo>
+                <a:lnTo>
+                  <a:pt x="4370134" y="5080883"/>
+                </a:lnTo>
+                <a:lnTo>
+                  <a:pt x="4362957" y="5082819"/>
+                </a:lnTo>
+                <a:lnTo>
+                  <a:pt x="4333195" y="5221840"/>
+                </a:lnTo>
+                <a:cubicBezTo>
+                  <a:pt x="4335888" y="5234770"/>
+                  <a:pt x="4329894" y="5274591"/>
+                  <a:pt x="4320037" y="5281999"/>
+                </a:cubicBezTo>
+                <a:cubicBezTo>
+                  <a:pt x="4316990" y="5290274"/>
+                  <a:pt x="4318795" y="5300010"/>
+                  <a:pt x="4308816" y="5303704"/>
+                </a:cubicBezTo>
+                <a:cubicBezTo>
+                  <a:pt x="4300851" y="5321498"/>
+                  <a:pt x="4282560" y="5362240"/>
+                  <a:pt x="4272244" y="5388756"/>
+                </a:cubicBezTo>
+                <a:cubicBezTo>
+                  <a:pt x="4281980" y="5405143"/>
+                  <a:pt x="4255067" y="5425092"/>
+                  <a:pt x="4246915" y="5462809"/>
+                </a:cubicBezTo>
+                <a:cubicBezTo>
+                  <a:pt x="4258299" y="5480842"/>
+                  <a:pt x="4241233" y="5488203"/>
+                  <a:pt x="4255030" y="5521632"/>
+                </a:cubicBezTo>
+                <a:cubicBezTo>
+                  <a:pt x="4253005" y="5522647"/>
+                  <a:pt x="4251068" y="5523996"/>
+                  <a:pt x="4249277" y="5525636"/>
+                </a:cubicBezTo>
+                <a:cubicBezTo>
+                  <a:pt x="4238872" y="5535166"/>
+                  <a:pt x="4235581" y="5552275"/>
+                  <a:pt x="4241924" y="5563850"/>
+                </a:cubicBezTo>
+                <a:cubicBezTo>
+                  <a:pt x="4259047" y="5616453"/>
+                  <a:pt x="4250256" y="5660812"/>
+                  <a:pt x="4248240" y="5703386"/>
+                </a:cubicBezTo>
+                <a:cubicBezTo>
+                  <a:pt x="4243085" y="5751111"/>
+                  <a:pt x="4218929" y="5715189"/>
+                  <a:pt x="4232982" y="5777907"/>
+                </a:cubicBezTo>
+                <a:cubicBezTo>
+                  <a:pt x="4221558" y="5782651"/>
+                  <a:pt x="4219728" y="5790057"/>
+                  <a:pt x="4222394" y="5803443"/>
+                </a:cubicBezTo>
+                <a:cubicBezTo>
+                  <a:pt x="4219121" y="5826511"/>
+                  <a:pt x="4193576" y="5820653"/>
+                  <a:pt x="4204974" y="5846279"/>
+                </a:cubicBezTo>
+                <a:cubicBezTo>
+                  <a:pt x="4191825" y="5839931"/>
+                  <a:pt x="4191753" y="5888934"/>
+                  <a:pt x="4179217" y="5876046"/>
+                </a:cubicBezTo>
+                <a:cubicBezTo>
+                  <a:pt x="4163863" y="5888983"/>
+                  <a:pt x="4183376" y="5899672"/>
+                  <a:pt x="4169698" y="5912761"/>
+                </a:cubicBezTo>
+                <a:cubicBezTo>
+                  <a:pt x="4164113" y="5929085"/>
+                  <a:pt x="4186281" y="5905514"/>
+                  <a:pt x="4183963" y="5924201"/>
+                </a:cubicBezTo>
+                <a:lnTo>
+                  <a:pt x="4143073" y="6020347"/>
+                </a:lnTo>
+                <a:cubicBezTo>
+                  <a:pt x="4148635" y="6035084"/>
+                  <a:pt x="4142583" y="6045204"/>
+                  <a:pt x="4132699" y="6054447"/>
+                </a:cubicBezTo>
+                <a:cubicBezTo>
+                  <a:pt x="4128762" y="6085993"/>
+                  <a:pt x="4111337" y="6112491"/>
+                  <a:pt x="4099744" y="6146773"/>
+                </a:cubicBezTo>
+                <a:cubicBezTo>
+                  <a:pt x="4101611" y="6186210"/>
+                  <a:pt x="4075513" y="6201974"/>
+                  <a:pt x="4063216" y="6238624"/>
+                </a:cubicBezTo>
+                <a:cubicBezTo>
+                  <a:pt x="4076714" y="6279119"/>
+                  <a:pt x="4027194" y="6257865"/>
+                  <a:pt x="4021696" y="6289517"/>
+                </a:cubicBezTo>
+                <a:cubicBezTo>
+                  <a:pt x="4030060" y="6343907"/>
+                  <a:pt x="4004638" y="6285373"/>
+                  <a:pt x="3993817" y="6365399"/>
+                </a:cubicBezTo>
+                <a:cubicBezTo>
+                  <a:pt x="3996125" y="6370415"/>
+                  <a:pt x="3990553" y="6379380"/>
+                  <a:pt x="3986236" y="6377584"/>
+                </a:cubicBezTo>
+                <a:cubicBezTo>
+                  <a:pt x="3984044" y="6395147"/>
+                  <a:pt x="3911719" y="6484083"/>
+                  <a:pt x="3911599" y="6509659"/>
+                </a:cubicBezTo>
+                <a:cubicBezTo>
+                  <a:pt x="3888028" y="6555694"/>
+                  <a:pt x="3870378" y="6548451"/>
+                  <a:pt x="3858869" y="6582751"/>
+                </a:cubicBezTo>
+                <a:cubicBezTo>
+                  <a:pt x="3834576" y="6620569"/>
+                  <a:pt x="3820634" y="6692927"/>
+                  <a:pt x="3770950" y="6757987"/>
+                </a:cubicBezTo>
+                <a:lnTo>
+                  <a:pt x="3749766" y="6858000"/>
+                </a:lnTo>
+                <a:lnTo>
+                  <a:pt x="12348" y="6858000"/>
+                </a:lnTo>
+                <a:lnTo>
+                  <a:pt x="0" y="6725668"/>
+                </a:lnTo>
+                <a:close/>
+              </a:path>
+            </a:pathLst>
+          </a:custGeom>
+          <a:solidFill>
+            <a:srgbClr val="82766A">
+              <a:alpha val="15000"/>
+            </a:srgbClr>
+          </a:solidFill>
+          <a:ln w="12700" cap="flat" cmpd="sng" algn="ctr">
+            <a:noFill/>
+            <a:prstDash val="solid"/>
+            <a:miter lim="800000"/>
+          </a:ln>
+          <a:effectLst/>
+        </p:spPr>
+        <p:style>
+          <a:lnRef idx="2">
+            <a:schemeClr val="accent1">
+              <a:shade val="50000"/>
+            </a:schemeClr>
+          </a:lnRef>
+          <a:fillRef idx="1">
+            <a:schemeClr val="accent1"/>
+          </a:fillRef>
+          <a:effectRef idx="0">
+            <a:schemeClr val="accent1"/>
+          </a:effectRef>
+          <a:fontRef idx="minor">
+            <a:schemeClr val="lt1"/>
+          </a:fontRef>
+        </p:style>
+        <p:txBody>
+          <a:bodyPr wrap="square" rtlCol="0" anchor="ctr">
+            <a:noAutofit/>
+          </a:bodyPr>
+          <a:lstStyle/>
+          <a:p>
+            <a:pPr algn="ctr"/>
+            <a:endParaRPr lang="en-US"/>
+          </a:p>
+        </p:txBody>
+      </p:sp>
+      <p:sp>
+        <p:nvSpPr>
+          <p:cNvPr id="2" name="Title 1">
+            <a:extLst>
+              <a:ext uri="{FF2B5EF4-FFF2-40B4-BE49-F238E27FC236}">
+                <a16:creationId xmlns:a16="http://schemas.microsoft.com/office/drawing/2014/main" id="{1C1544C3-40DE-D57E-F48C-CD99D17799A2}"/>
+              </a:ext>
+            </a:extLst>
+          </p:cNvPr>
+          <p:cNvSpPr>
+            <a:spLocks noGrp="1"/>
+          </p:cNvSpPr>
+          <p:nvPr>
+            <p:ph type="title"/>
+          </p:nvPr>
+        </p:nvSpPr>
+        <p:spPr>
+          <a:xfrm>
+            <a:off x="1137038" y="896469"/>
+            <a:ext cx="3820630" cy="3005643"/>
+          </a:xfrm>
+        </p:spPr>
+        <p:txBody>
+          <a:bodyPr anchor="t">
+            <a:normAutofit/>
+          </a:bodyPr>
+          <a:lstStyle/>
+          <a:p>
+            <a:r>
+              <a:rPr lang="fr-FR" dirty="0">
+                <a:solidFill>
+                  <a:schemeClr val="tx1">
+                    <a:lumMod val="85000"/>
+                    <a:lumOff val="15000"/>
+                  </a:schemeClr>
+                </a:solidFill>
+              </a:rPr>
+              <a:t>Définition formelle</a:t>
+            </a:r>
+          </a:p>
+        </p:txBody>
+      </p:sp>
+      <p:sp>
+        <p:nvSpPr>
+          <p:cNvPr id="4" name="Content Placeholder 3">
+            <a:extLst>
+              <a:ext uri="{FF2B5EF4-FFF2-40B4-BE49-F238E27FC236}">
+                <a16:creationId xmlns:a16="http://schemas.microsoft.com/office/drawing/2014/main" id="{FEFA5634-660A-01F9-611C-A465E065A17E}"/>
+              </a:ext>
+            </a:extLst>
+          </p:cNvPr>
+          <p:cNvSpPr txBox="1">
+            <a:spLocks noGrp="1"/>
+          </p:cNvSpPr>
+          <p:nvPr>
+            <p:ph idx="1"/>
+          </p:nvPr>
+        </p:nvSpPr>
+        <p:spPr>
+          <a:xfrm>
+            <a:off x="5552708" y="896469"/>
+            <a:ext cx="5945025" cy="5319430"/>
+          </a:xfrm>
+          <a:prstGeom prst="rect">
+            <a:avLst/>
+          </a:prstGeom>
+        </p:spPr>
+        <p:txBody>
+          <a:bodyPr>
+            <a:normAutofit/>
+          </a:bodyPr>
+          <a:lstStyle/>
+          <a:p>
+            <a:pPr marL="0" indent="0" algn="just">
+              <a:buNone/>
+            </a:pPr>
+            <a:r>
+              <a:rPr lang="fr-FR" sz="4400" b="1" dirty="0">
+                <a:solidFill>
+                  <a:schemeClr val="tx1">
+                    <a:lumMod val="85000"/>
+                    <a:lumOff val="15000"/>
+                  </a:schemeClr>
+                </a:solidFill>
+              </a:rPr>
+              <a:t>« l’ensemble de théories et de techniques mises en œuvre en vue de réaliser des machines capables de simuler l'intelligence humaine »</a:t>
+            </a:r>
+          </a:p>
+        </p:txBody>
+      </p:sp>
+    </p:spTree>
+    <p:extLst>
+      <p:ext uri="{BB962C8B-B14F-4D97-AF65-F5344CB8AC3E}">
+        <p14:creationId xmlns:p14="http://schemas.microsoft.com/office/powerpoint/2010/main" val="2838456650"/>
+      </p:ext>
+    </p:extLst>
+  </p:cSld>
+  <p:clrMapOvr>
+    <a:masterClrMapping/>
+  </p:clrMapOvr>
+</p:sld>
+</file>
+
+<file path=ppt/slides/slide6.xml><?xml version="1.0" encoding="utf-8"?>
 <p:sld xmlns:a="http://schemas.openxmlformats.org/drawingml/2006/main" xmlns:r="http://schemas.openxmlformats.org/officeDocument/2006/relationships" xmlns:p="http://schemas.openxmlformats.org/presentationml/2006/main">
   <p:cSld>
     <p:bg>
@@ -26180,6 +28140,46 @@
           </a:p>
         </p:txBody>
       </p:sp>
+      <p:sp>
+        <p:nvSpPr>
+          <p:cNvPr id="10" name="TextBox 9">
+            <a:extLst>
+              <a:ext uri="{FF2B5EF4-FFF2-40B4-BE49-F238E27FC236}">
+                <a16:creationId xmlns:a16="http://schemas.microsoft.com/office/drawing/2014/main" id="{F210E243-A46F-EA2E-D4F7-A0FCD72E7C30}"/>
+              </a:ext>
+            </a:extLst>
+          </p:cNvPr>
+          <p:cNvSpPr txBox="1"/>
+          <p:nvPr/>
+        </p:nvSpPr>
+        <p:spPr>
+          <a:xfrm>
+            <a:off x="497973" y="1218973"/>
+            <a:ext cx="10771363" cy="954107"/>
+          </a:xfrm>
+          <a:prstGeom prst="rect">
+            <a:avLst/>
+          </a:prstGeom>
+          <a:noFill/>
+        </p:spPr>
+        <p:txBody>
+          <a:bodyPr wrap="square">
+            <a:spAutoFit/>
+          </a:bodyPr>
+          <a:lstStyle/>
+          <a:p>
+            <a:pPr algn="ctr"/>
+            <a:r>
+              <a:rPr lang="fr-FR" sz="2800" b="1" i="1" dirty="0"/>
+              <a:t>IA:</a:t>
+            </a:r>
+            <a:r>
+              <a:rPr lang="fr-FR" sz="2800" b="1" dirty="0"/>
+              <a:t> « l’ensemble de théories et de techniques mises en œuvre en vue de réaliser des machines capables de simuler l'intelligence humaine »</a:t>
+            </a:r>
+          </a:p>
+        </p:txBody>
+      </p:sp>
     </p:spTree>
     <p:extLst>
       <p:ext uri="{BB962C8B-B14F-4D97-AF65-F5344CB8AC3E}">

</xml_diff>

<commit_message>
added example of "simple" ai
</commit_message>
<xml_diff>
--- a/slides.pptx
+++ b/slides.pptx
@@ -11,6 +11,7 @@
     <p:sldId id="259" r:id="rId5"/>
     <p:sldId id="261" r:id="rId6"/>
     <p:sldId id="260" r:id="rId7"/>
+    <p:sldId id="262" r:id="rId8"/>
   </p:sldIdLst>
   <p:sldSz cx="12192000" cy="6858000"/>
   <p:notesSz cx="6858000" cy="9144000"/>
@@ -28193,6 +28194,938 @@
 </p:sld>
 </file>
 
+<file path=ppt/slides/slide7.xml><?xml version="1.0" encoding="utf-8"?>
+<p:sld xmlns:a="http://schemas.openxmlformats.org/drawingml/2006/main" xmlns:r="http://schemas.openxmlformats.org/officeDocument/2006/relationships" xmlns:p="http://schemas.openxmlformats.org/presentationml/2006/main">
+  <p:cSld>
+    <p:spTree>
+      <p:nvGrpSpPr>
+        <p:cNvPr id="1" name=""/>
+        <p:cNvGrpSpPr/>
+        <p:nvPr/>
+      </p:nvGrpSpPr>
+      <p:grpSpPr>
+        <a:xfrm>
+          <a:off x="0" y="0"/>
+          <a:ext cx="0" cy="0"/>
+          <a:chOff x="0" y="0"/>
+          <a:chExt cx="0" cy="0"/>
+        </a:xfrm>
+      </p:grpSpPr>
+      <p:sp>
+        <p:nvSpPr>
+          <p:cNvPr id="2" name="Title 1">
+            <a:extLst>
+              <a:ext uri="{FF2B5EF4-FFF2-40B4-BE49-F238E27FC236}">
+                <a16:creationId xmlns:a16="http://schemas.microsoft.com/office/drawing/2014/main" id="{EC1922F3-6628-8A56-FBAF-C05D1D6FEE40}"/>
+              </a:ext>
+            </a:extLst>
+          </p:cNvPr>
+          <p:cNvSpPr>
+            <a:spLocks noGrp="1"/>
+          </p:cNvSpPr>
+          <p:nvPr>
+            <p:ph type="title"/>
+          </p:nvPr>
+        </p:nvSpPr>
+        <p:spPr/>
+        <p:txBody>
+          <a:bodyPr/>
+          <a:lstStyle/>
+          <a:p>
+            <a:r>
+              <a:rPr lang="fr-FR" dirty="0"/>
+              <a:t>Exemple d’IA "simple"</a:t>
+            </a:r>
+          </a:p>
+        </p:txBody>
+      </p:sp>
+      <p:graphicFrame>
+        <p:nvGraphicFramePr>
+          <p:cNvPr id="4" name="Table 4">
+            <a:extLst>
+              <a:ext uri="{FF2B5EF4-FFF2-40B4-BE49-F238E27FC236}">
+                <a16:creationId xmlns:a16="http://schemas.microsoft.com/office/drawing/2014/main" id="{B7ED6BFD-DEB8-FB42-5AA2-713604BE5A45}"/>
+              </a:ext>
+            </a:extLst>
+          </p:cNvPr>
+          <p:cNvGraphicFramePr>
+            <a:graphicFrameLocks noGrp="1"/>
+          </p:cNvGraphicFramePr>
+          <p:nvPr>
+            <p:ph idx="1"/>
+            <p:extLst>
+              <p:ext uri="{D42A27DB-BD31-4B8C-83A1-F6EECF244321}">
+                <p14:modId xmlns:p14="http://schemas.microsoft.com/office/powerpoint/2010/main" val="1051052038"/>
+              </p:ext>
+            </p:extLst>
+          </p:nvPr>
+        </p:nvGraphicFramePr>
+        <p:xfrm>
+          <a:off x="2284714" y="2252133"/>
+          <a:ext cx="3240000" cy="3240000"/>
+        </p:xfrm>
+        <a:graphic>
+          <a:graphicData uri="http://schemas.openxmlformats.org/drawingml/2006/table">
+            <a:tbl>
+              <a:tblPr>
+                <a:tableStyleId>{5C22544A-7EE6-4342-B048-85BDC9FD1C3A}</a:tableStyleId>
+              </a:tblPr>
+              <a:tblGrid>
+                <a:gridCol w="1080000">
+                  <a:extLst>
+                    <a:ext uri="{9D8B030D-6E8A-4147-A177-3AD203B41FA5}">
+                      <a16:colId xmlns:a16="http://schemas.microsoft.com/office/drawing/2014/main" val="3390345776"/>
+                    </a:ext>
+                  </a:extLst>
+                </a:gridCol>
+                <a:gridCol w="1080000">
+                  <a:extLst>
+                    <a:ext uri="{9D8B030D-6E8A-4147-A177-3AD203B41FA5}">
+                      <a16:colId xmlns:a16="http://schemas.microsoft.com/office/drawing/2014/main" val="2876244952"/>
+                    </a:ext>
+                  </a:extLst>
+                </a:gridCol>
+                <a:gridCol w="1080000">
+                  <a:extLst>
+                    <a:ext uri="{9D8B030D-6E8A-4147-A177-3AD203B41FA5}">
+                      <a16:colId xmlns:a16="http://schemas.microsoft.com/office/drawing/2014/main" val="399931620"/>
+                    </a:ext>
+                  </a:extLst>
+                </a:gridCol>
+              </a:tblGrid>
+              <a:tr h="1080000">
+                <a:tc>
+                  <a:txBody>
+                    <a:bodyPr/>
+                    <a:lstStyle/>
+                    <a:p>
+                      <a:pPr marL="0" marR="0" lvl="0" indent="0" algn="ctr" defTabSz="914400" rtl="0" eaLnBrk="1" fontAlgn="auto" latinLnBrk="0" hangingPunct="1">
+                        <a:lnSpc>
+                          <a:spcPct val="100000"/>
+                        </a:lnSpc>
+                        <a:spcBef>
+                          <a:spcPts val="0"/>
+                        </a:spcBef>
+                        <a:spcAft>
+                          <a:spcPts val="0"/>
+                        </a:spcAft>
+                        <a:buClrTx/>
+                        <a:buSzTx/>
+                        <a:buFontTx/>
+                        <a:buNone/>
+                        <a:tabLst/>
+                        <a:defRPr/>
+                      </a:pPr>
+                      <a:r>
+                        <a:rPr lang="fr-FR" sz="6000" b="1" dirty="0">
+                          <a:solidFill>
+                            <a:srgbClr val="C00000"/>
+                          </a:solidFill>
+                        </a:rPr>
+                        <a:t>X</a:t>
+                      </a:r>
+                    </a:p>
+                  </a:txBody>
+                  <a:tcPr anchor="ctr">
+                    <a:lnL w="12700" cap="flat" cmpd="sng" algn="ctr">
+                      <a:solidFill>
+                        <a:schemeClr val="tx1"/>
+                      </a:solidFill>
+                      <a:prstDash val="solid"/>
+                      <a:round/>
+                      <a:headEnd type="none" w="med" len="med"/>
+                      <a:tailEnd type="none" w="med" len="med"/>
+                    </a:lnL>
+                    <a:lnR w="12700" cap="flat" cmpd="sng" algn="ctr">
+                      <a:solidFill>
+                        <a:schemeClr val="tx1"/>
+                      </a:solidFill>
+                      <a:prstDash val="solid"/>
+                      <a:round/>
+                      <a:headEnd type="none" w="med" len="med"/>
+                      <a:tailEnd type="none" w="med" len="med"/>
+                    </a:lnR>
+                    <a:lnT w="12700" cap="flat" cmpd="sng" algn="ctr">
+                      <a:solidFill>
+                        <a:schemeClr val="tx1"/>
+                      </a:solidFill>
+                      <a:prstDash val="solid"/>
+                      <a:round/>
+                      <a:headEnd type="none" w="med" len="med"/>
+                      <a:tailEnd type="none" w="med" len="med"/>
+                    </a:lnT>
+                    <a:lnB w="12700" cap="flat" cmpd="sng" algn="ctr">
+                      <a:solidFill>
+                        <a:schemeClr val="tx1"/>
+                      </a:solidFill>
+                      <a:prstDash val="solid"/>
+                      <a:round/>
+                      <a:headEnd type="none" w="med" len="med"/>
+                      <a:tailEnd type="none" w="med" len="med"/>
+                    </a:lnB>
+                    <a:lnTlToBr w="12700" cmpd="sng">
+                      <a:noFill/>
+                      <a:prstDash val="solid"/>
+                    </a:lnTlToBr>
+                    <a:lnBlToTr w="12700" cmpd="sng">
+                      <a:noFill/>
+                      <a:prstDash val="solid"/>
+                    </a:lnBlToTr>
+                    <a:noFill/>
+                  </a:tcPr>
+                </a:tc>
+                <a:tc>
+                  <a:txBody>
+                    <a:bodyPr/>
+                    <a:lstStyle/>
+                    <a:p>
+                      <a:pPr marL="0" marR="0" lvl="0" indent="0" algn="ctr" defTabSz="914400" rtl="0" eaLnBrk="1" fontAlgn="auto" latinLnBrk="0" hangingPunct="1">
+                        <a:lnSpc>
+                          <a:spcPct val="100000"/>
+                        </a:lnSpc>
+                        <a:spcBef>
+                          <a:spcPts val="0"/>
+                        </a:spcBef>
+                        <a:spcAft>
+                          <a:spcPts val="0"/>
+                        </a:spcAft>
+                        <a:buClrTx/>
+                        <a:buSzTx/>
+                        <a:buFontTx/>
+                        <a:buNone/>
+                        <a:tabLst/>
+                        <a:defRPr/>
+                      </a:pPr>
+                      <a:r>
+                        <a:rPr lang="fr-FR" sz="6000" b="1" dirty="0">
+                          <a:solidFill>
+                            <a:srgbClr val="00B050"/>
+                          </a:solidFill>
+                        </a:rPr>
+                        <a:t>O</a:t>
+                      </a:r>
+                      <a:endParaRPr lang="fr-FR" b="1" dirty="0">
+                        <a:solidFill>
+                          <a:srgbClr val="00B050"/>
+                        </a:solidFill>
+                      </a:endParaRPr>
+                    </a:p>
+                  </a:txBody>
+                  <a:tcPr anchor="ctr">
+                    <a:lnL w="12700" cap="flat" cmpd="sng" algn="ctr">
+                      <a:solidFill>
+                        <a:schemeClr val="tx1"/>
+                      </a:solidFill>
+                      <a:prstDash val="solid"/>
+                      <a:round/>
+                      <a:headEnd type="none" w="med" len="med"/>
+                      <a:tailEnd type="none" w="med" len="med"/>
+                    </a:lnL>
+                    <a:lnR w="12700" cap="flat" cmpd="sng" algn="ctr">
+                      <a:solidFill>
+                        <a:schemeClr val="tx1"/>
+                      </a:solidFill>
+                      <a:prstDash val="solid"/>
+                      <a:round/>
+                      <a:headEnd type="none" w="med" len="med"/>
+                      <a:tailEnd type="none" w="med" len="med"/>
+                    </a:lnR>
+                    <a:lnT w="12700" cap="flat" cmpd="sng" algn="ctr">
+                      <a:solidFill>
+                        <a:schemeClr val="tx1"/>
+                      </a:solidFill>
+                      <a:prstDash val="solid"/>
+                      <a:round/>
+                      <a:headEnd type="none" w="med" len="med"/>
+                      <a:tailEnd type="none" w="med" len="med"/>
+                    </a:lnT>
+                    <a:lnB w="12700" cap="flat" cmpd="sng" algn="ctr">
+                      <a:solidFill>
+                        <a:schemeClr val="tx1"/>
+                      </a:solidFill>
+                      <a:prstDash val="solid"/>
+                      <a:round/>
+                      <a:headEnd type="none" w="med" len="med"/>
+                      <a:tailEnd type="none" w="med" len="med"/>
+                    </a:lnB>
+                    <a:lnTlToBr w="12700" cmpd="sng">
+                      <a:noFill/>
+                      <a:prstDash val="solid"/>
+                    </a:lnTlToBr>
+                    <a:lnBlToTr w="12700" cmpd="sng">
+                      <a:noFill/>
+                      <a:prstDash val="solid"/>
+                    </a:lnBlToTr>
+                    <a:noFill/>
+                  </a:tcPr>
+                </a:tc>
+                <a:tc>
+                  <a:txBody>
+                    <a:bodyPr/>
+                    <a:lstStyle/>
+                    <a:p>
+                      <a:pPr algn="ctr"/>
+                      <a:r>
+                        <a:rPr lang="fr-FR" sz="6000" b="1" dirty="0">
+                          <a:solidFill>
+                            <a:srgbClr val="00B050"/>
+                          </a:solidFill>
+                        </a:rPr>
+                        <a:t>O</a:t>
+                      </a:r>
+                      <a:endParaRPr lang="fr-FR" b="1" dirty="0">
+                        <a:solidFill>
+                          <a:srgbClr val="00B050"/>
+                        </a:solidFill>
+                      </a:endParaRPr>
+                    </a:p>
+                  </a:txBody>
+                  <a:tcPr anchor="ctr">
+                    <a:lnL w="12700" cap="flat" cmpd="sng" algn="ctr">
+                      <a:solidFill>
+                        <a:schemeClr val="tx1"/>
+                      </a:solidFill>
+                      <a:prstDash val="solid"/>
+                      <a:round/>
+                      <a:headEnd type="none" w="med" len="med"/>
+                      <a:tailEnd type="none" w="med" len="med"/>
+                    </a:lnL>
+                    <a:lnR w="12700" cap="flat" cmpd="sng" algn="ctr">
+                      <a:solidFill>
+                        <a:schemeClr val="tx1"/>
+                      </a:solidFill>
+                      <a:prstDash val="solid"/>
+                      <a:round/>
+                      <a:headEnd type="none" w="med" len="med"/>
+                      <a:tailEnd type="none" w="med" len="med"/>
+                    </a:lnR>
+                    <a:lnT w="12700" cap="flat" cmpd="sng" algn="ctr">
+                      <a:solidFill>
+                        <a:schemeClr val="tx1"/>
+                      </a:solidFill>
+                      <a:prstDash val="solid"/>
+                      <a:round/>
+                      <a:headEnd type="none" w="med" len="med"/>
+                      <a:tailEnd type="none" w="med" len="med"/>
+                    </a:lnT>
+                    <a:lnB w="12700" cap="flat" cmpd="sng" algn="ctr">
+                      <a:solidFill>
+                        <a:schemeClr val="tx1"/>
+                      </a:solidFill>
+                      <a:prstDash val="solid"/>
+                      <a:round/>
+                      <a:headEnd type="none" w="med" len="med"/>
+                      <a:tailEnd type="none" w="med" len="med"/>
+                    </a:lnB>
+                    <a:lnTlToBr w="12700" cmpd="sng">
+                      <a:noFill/>
+                      <a:prstDash val="solid"/>
+                    </a:lnTlToBr>
+                    <a:lnBlToTr w="12700" cmpd="sng">
+                      <a:noFill/>
+                      <a:prstDash val="solid"/>
+                    </a:lnBlToTr>
+                    <a:noFill/>
+                  </a:tcPr>
+                </a:tc>
+                <a:extLst>
+                  <a:ext uri="{0D108BD9-81ED-4DB2-BD59-A6C34878D82A}">
+                    <a16:rowId xmlns:a16="http://schemas.microsoft.com/office/drawing/2014/main" val="1469129957"/>
+                  </a:ext>
+                </a:extLst>
+              </a:tr>
+              <a:tr h="1080000">
+                <a:tc>
+                  <a:txBody>
+                    <a:bodyPr/>
+                    <a:lstStyle/>
+                    <a:p>
+                      <a:pPr algn="ctr"/>
+                      <a:endParaRPr lang="fr-FR" dirty="0"/>
+                    </a:p>
+                  </a:txBody>
+                  <a:tcPr anchor="ctr">
+                    <a:lnL w="12700" cap="flat" cmpd="sng" algn="ctr">
+                      <a:solidFill>
+                        <a:schemeClr val="tx1"/>
+                      </a:solidFill>
+                      <a:prstDash val="solid"/>
+                      <a:round/>
+                      <a:headEnd type="none" w="med" len="med"/>
+                      <a:tailEnd type="none" w="med" len="med"/>
+                    </a:lnL>
+                    <a:lnR w="12700" cap="flat" cmpd="sng" algn="ctr">
+                      <a:solidFill>
+                        <a:schemeClr val="tx1"/>
+                      </a:solidFill>
+                      <a:prstDash val="solid"/>
+                      <a:round/>
+                      <a:headEnd type="none" w="med" len="med"/>
+                      <a:tailEnd type="none" w="med" len="med"/>
+                    </a:lnR>
+                    <a:lnT w="12700" cap="flat" cmpd="sng" algn="ctr">
+                      <a:solidFill>
+                        <a:schemeClr val="tx1"/>
+                      </a:solidFill>
+                      <a:prstDash val="solid"/>
+                      <a:round/>
+                      <a:headEnd type="none" w="med" len="med"/>
+                      <a:tailEnd type="none" w="med" len="med"/>
+                    </a:lnT>
+                    <a:lnB w="12700" cap="flat" cmpd="sng" algn="ctr">
+                      <a:solidFill>
+                        <a:schemeClr val="tx1"/>
+                      </a:solidFill>
+                      <a:prstDash val="solid"/>
+                      <a:round/>
+                      <a:headEnd type="none" w="med" len="med"/>
+                      <a:tailEnd type="none" w="med" len="med"/>
+                    </a:lnB>
+                    <a:lnTlToBr w="12700" cmpd="sng">
+                      <a:noFill/>
+                      <a:prstDash val="solid"/>
+                    </a:lnTlToBr>
+                    <a:lnBlToTr w="12700" cmpd="sng">
+                      <a:noFill/>
+                      <a:prstDash val="solid"/>
+                    </a:lnBlToTr>
+                    <a:noFill/>
+                  </a:tcPr>
+                </a:tc>
+                <a:tc>
+                  <a:txBody>
+                    <a:bodyPr/>
+                    <a:lstStyle/>
+                    <a:p>
+                      <a:pPr marL="0" marR="0" lvl="0" indent="0" algn="ctr" defTabSz="914400" rtl="0" eaLnBrk="1" fontAlgn="auto" latinLnBrk="0" hangingPunct="1">
+                        <a:lnSpc>
+                          <a:spcPct val="100000"/>
+                        </a:lnSpc>
+                        <a:spcBef>
+                          <a:spcPts val="0"/>
+                        </a:spcBef>
+                        <a:spcAft>
+                          <a:spcPts val="0"/>
+                        </a:spcAft>
+                        <a:buClrTx/>
+                        <a:buSzTx/>
+                        <a:buFontTx/>
+                        <a:buNone/>
+                        <a:tabLst/>
+                        <a:defRPr/>
+                      </a:pPr>
+                      <a:r>
+                        <a:rPr lang="fr-FR" sz="6000" b="1" dirty="0">
+                          <a:solidFill>
+                            <a:srgbClr val="C00000"/>
+                          </a:solidFill>
+                        </a:rPr>
+                        <a:t>X</a:t>
+                      </a:r>
+                      <a:endParaRPr lang="fr-FR" b="1" dirty="0">
+                        <a:solidFill>
+                          <a:srgbClr val="C00000"/>
+                        </a:solidFill>
+                      </a:endParaRPr>
+                    </a:p>
+                  </a:txBody>
+                  <a:tcPr anchor="ctr">
+                    <a:lnL w="12700" cap="flat" cmpd="sng" algn="ctr">
+                      <a:solidFill>
+                        <a:schemeClr val="tx1"/>
+                      </a:solidFill>
+                      <a:prstDash val="solid"/>
+                      <a:round/>
+                      <a:headEnd type="none" w="med" len="med"/>
+                      <a:tailEnd type="none" w="med" len="med"/>
+                    </a:lnL>
+                    <a:lnR w="12700" cap="flat" cmpd="sng" algn="ctr">
+                      <a:solidFill>
+                        <a:schemeClr val="tx1"/>
+                      </a:solidFill>
+                      <a:prstDash val="solid"/>
+                      <a:round/>
+                      <a:headEnd type="none" w="med" len="med"/>
+                      <a:tailEnd type="none" w="med" len="med"/>
+                    </a:lnR>
+                    <a:lnT w="12700" cap="flat" cmpd="sng" algn="ctr">
+                      <a:solidFill>
+                        <a:schemeClr val="tx1"/>
+                      </a:solidFill>
+                      <a:prstDash val="solid"/>
+                      <a:round/>
+                      <a:headEnd type="none" w="med" len="med"/>
+                      <a:tailEnd type="none" w="med" len="med"/>
+                    </a:lnT>
+                    <a:lnB w="12700" cap="flat" cmpd="sng" algn="ctr">
+                      <a:solidFill>
+                        <a:schemeClr val="tx1"/>
+                      </a:solidFill>
+                      <a:prstDash val="solid"/>
+                      <a:round/>
+                      <a:headEnd type="none" w="med" len="med"/>
+                      <a:tailEnd type="none" w="med" len="med"/>
+                    </a:lnB>
+                    <a:lnTlToBr w="12700" cmpd="sng">
+                      <a:noFill/>
+                      <a:prstDash val="solid"/>
+                    </a:lnTlToBr>
+                    <a:lnBlToTr w="12700" cmpd="sng">
+                      <a:noFill/>
+                      <a:prstDash val="solid"/>
+                    </a:lnBlToTr>
+                    <a:noFill/>
+                  </a:tcPr>
+                </a:tc>
+                <a:tc>
+                  <a:txBody>
+                    <a:bodyPr/>
+                    <a:lstStyle/>
+                    <a:p>
+                      <a:pPr algn="ctr"/>
+                      <a:endParaRPr lang="fr-FR"/>
+                    </a:p>
+                  </a:txBody>
+                  <a:tcPr anchor="ctr">
+                    <a:lnL w="12700" cap="flat" cmpd="sng" algn="ctr">
+                      <a:solidFill>
+                        <a:schemeClr val="tx1"/>
+                      </a:solidFill>
+                      <a:prstDash val="solid"/>
+                      <a:round/>
+                      <a:headEnd type="none" w="med" len="med"/>
+                      <a:tailEnd type="none" w="med" len="med"/>
+                    </a:lnL>
+                    <a:lnR w="12700" cap="flat" cmpd="sng" algn="ctr">
+                      <a:solidFill>
+                        <a:schemeClr val="tx1"/>
+                      </a:solidFill>
+                      <a:prstDash val="solid"/>
+                      <a:round/>
+                      <a:headEnd type="none" w="med" len="med"/>
+                      <a:tailEnd type="none" w="med" len="med"/>
+                    </a:lnR>
+                    <a:lnT w="12700" cap="flat" cmpd="sng" algn="ctr">
+                      <a:solidFill>
+                        <a:schemeClr val="tx1"/>
+                      </a:solidFill>
+                      <a:prstDash val="solid"/>
+                      <a:round/>
+                      <a:headEnd type="none" w="med" len="med"/>
+                      <a:tailEnd type="none" w="med" len="med"/>
+                    </a:lnT>
+                    <a:lnB w="12700" cap="flat" cmpd="sng" algn="ctr">
+                      <a:solidFill>
+                        <a:schemeClr val="tx1"/>
+                      </a:solidFill>
+                      <a:prstDash val="solid"/>
+                      <a:round/>
+                      <a:headEnd type="none" w="med" len="med"/>
+                      <a:tailEnd type="none" w="med" len="med"/>
+                    </a:lnB>
+                    <a:lnTlToBr w="12700" cmpd="sng">
+                      <a:noFill/>
+                      <a:prstDash val="solid"/>
+                    </a:lnTlToBr>
+                    <a:lnBlToTr w="12700" cmpd="sng">
+                      <a:noFill/>
+                      <a:prstDash val="solid"/>
+                    </a:lnBlToTr>
+                    <a:noFill/>
+                  </a:tcPr>
+                </a:tc>
+                <a:extLst>
+                  <a:ext uri="{0D108BD9-81ED-4DB2-BD59-A6C34878D82A}">
+                    <a16:rowId xmlns:a16="http://schemas.microsoft.com/office/drawing/2014/main" val="1509473886"/>
+                  </a:ext>
+                </a:extLst>
+              </a:tr>
+              <a:tr h="1080000">
+                <a:tc>
+                  <a:txBody>
+                    <a:bodyPr/>
+                    <a:lstStyle/>
+                    <a:p>
+                      <a:pPr algn="ctr"/>
+                      <a:endParaRPr lang="fr-FR"/>
+                    </a:p>
+                  </a:txBody>
+                  <a:tcPr anchor="ctr">
+                    <a:lnL w="12700" cap="flat" cmpd="sng" algn="ctr">
+                      <a:solidFill>
+                        <a:schemeClr val="tx1"/>
+                      </a:solidFill>
+                      <a:prstDash val="solid"/>
+                      <a:round/>
+                      <a:headEnd type="none" w="med" len="med"/>
+                      <a:tailEnd type="none" w="med" len="med"/>
+                    </a:lnL>
+                    <a:lnR w="12700" cap="flat" cmpd="sng" algn="ctr">
+                      <a:solidFill>
+                        <a:schemeClr val="tx1"/>
+                      </a:solidFill>
+                      <a:prstDash val="solid"/>
+                      <a:round/>
+                      <a:headEnd type="none" w="med" len="med"/>
+                      <a:tailEnd type="none" w="med" len="med"/>
+                    </a:lnR>
+                    <a:lnT w="12700" cap="flat" cmpd="sng" algn="ctr">
+                      <a:solidFill>
+                        <a:schemeClr val="tx1"/>
+                      </a:solidFill>
+                      <a:prstDash val="solid"/>
+                      <a:round/>
+                      <a:headEnd type="none" w="med" len="med"/>
+                      <a:tailEnd type="none" w="med" len="med"/>
+                    </a:lnT>
+                    <a:lnB w="12700" cap="flat" cmpd="sng" algn="ctr">
+                      <a:solidFill>
+                        <a:schemeClr val="tx1"/>
+                      </a:solidFill>
+                      <a:prstDash val="solid"/>
+                      <a:round/>
+                      <a:headEnd type="none" w="med" len="med"/>
+                      <a:tailEnd type="none" w="med" len="med"/>
+                    </a:lnB>
+                    <a:lnTlToBr w="12700" cmpd="sng">
+                      <a:noFill/>
+                      <a:prstDash val="solid"/>
+                    </a:lnTlToBr>
+                    <a:lnBlToTr w="12700" cmpd="sng">
+                      <a:noFill/>
+                      <a:prstDash val="solid"/>
+                    </a:lnBlToTr>
+                    <a:noFill/>
+                  </a:tcPr>
+                </a:tc>
+                <a:tc>
+                  <a:txBody>
+                    <a:bodyPr/>
+                    <a:lstStyle/>
+                    <a:p>
+                      <a:pPr algn="ctr"/>
+                      <a:endParaRPr lang="fr-FR"/>
+                    </a:p>
+                  </a:txBody>
+                  <a:tcPr anchor="ctr">
+                    <a:lnL w="12700" cap="flat" cmpd="sng" algn="ctr">
+                      <a:solidFill>
+                        <a:schemeClr val="tx1"/>
+                      </a:solidFill>
+                      <a:prstDash val="solid"/>
+                      <a:round/>
+                      <a:headEnd type="none" w="med" len="med"/>
+                      <a:tailEnd type="none" w="med" len="med"/>
+                    </a:lnL>
+                    <a:lnR w="12700" cap="flat" cmpd="sng" algn="ctr">
+                      <a:solidFill>
+                        <a:schemeClr val="tx1"/>
+                      </a:solidFill>
+                      <a:prstDash val="solid"/>
+                      <a:round/>
+                      <a:headEnd type="none" w="med" len="med"/>
+                      <a:tailEnd type="none" w="med" len="med"/>
+                    </a:lnR>
+                    <a:lnT w="12700" cap="flat" cmpd="sng" algn="ctr">
+                      <a:solidFill>
+                        <a:schemeClr val="tx1"/>
+                      </a:solidFill>
+                      <a:prstDash val="solid"/>
+                      <a:round/>
+                      <a:headEnd type="none" w="med" len="med"/>
+                      <a:tailEnd type="none" w="med" len="med"/>
+                    </a:lnT>
+                    <a:lnB w="12700" cap="flat" cmpd="sng" algn="ctr">
+                      <a:solidFill>
+                        <a:schemeClr val="tx1"/>
+                      </a:solidFill>
+                      <a:prstDash val="solid"/>
+                      <a:round/>
+                      <a:headEnd type="none" w="med" len="med"/>
+                      <a:tailEnd type="none" w="med" len="med"/>
+                    </a:lnB>
+                    <a:lnTlToBr w="12700" cmpd="sng">
+                      <a:noFill/>
+                      <a:prstDash val="solid"/>
+                    </a:lnTlToBr>
+                    <a:lnBlToTr w="12700" cmpd="sng">
+                      <a:noFill/>
+                      <a:prstDash val="solid"/>
+                    </a:lnBlToTr>
+                    <a:noFill/>
+                  </a:tcPr>
+                </a:tc>
+                <a:tc>
+                  <a:txBody>
+                    <a:bodyPr/>
+                    <a:lstStyle/>
+                    <a:p>
+                      <a:pPr marL="0" marR="0" lvl="0" indent="0" algn="ctr" defTabSz="914400" rtl="0" eaLnBrk="1" fontAlgn="auto" latinLnBrk="0" hangingPunct="1">
+                        <a:lnSpc>
+                          <a:spcPct val="100000"/>
+                        </a:lnSpc>
+                        <a:spcBef>
+                          <a:spcPts val="0"/>
+                        </a:spcBef>
+                        <a:spcAft>
+                          <a:spcPts val="0"/>
+                        </a:spcAft>
+                        <a:buClrTx/>
+                        <a:buSzTx/>
+                        <a:buFontTx/>
+                        <a:buNone/>
+                        <a:tabLst/>
+                        <a:defRPr/>
+                      </a:pPr>
+                      <a:r>
+                        <a:rPr lang="fr-FR" sz="6000" b="1" dirty="0">
+                          <a:solidFill>
+                            <a:srgbClr val="00B050"/>
+                          </a:solidFill>
+                        </a:rPr>
+                        <a:t>O</a:t>
+                      </a:r>
+                    </a:p>
+                  </a:txBody>
+                  <a:tcPr anchor="ctr">
+                    <a:lnL w="12700" cap="flat" cmpd="sng" algn="ctr">
+                      <a:solidFill>
+                        <a:schemeClr val="tx1"/>
+                      </a:solidFill>
+                      <a:prstDash val="solid"/>
+                      <a:round/>
+                      <a:headEnd type="none" w="med" len="med"/>
+                      <a:tailEnd type="none" w="med" len="med"/>
+                    </a:lnL>
+                    <a:lnR w="12700" cap="flat" cmpd="sng" algn="ctr">
+                      <a:solidFill>
+                        <a:schemeClr val="tx1"/>
+                      </a:solidFill>
+                      <a:prstDash val="solid"/>
+                      <a:round/>
+                      <a:headEnd type="none" w="med" len="med"/>
+                      <a:tailEnd type="none" w="med" len="med"/>
+                    </a:lnR>
+                    <a:lnT w="12700" cap="flat" cmpd="sng" algn="ctr">
+                      <a:solidFill>
+                        <a:schemeClr val="tx1"/>
+                      </a:solidFill>
+                      <a:prstDash val="solid"/>
+                      <a:round/>
+                      <a:headEnd type="none" w="med" len="med"/>
+                      <a:tailEnd type="none" w="med" len="med"/>
+                    </a:lnT>
+                    <a:lnB w="12700" cap="flat" cmpd="sng" algn="ctr">
+                      <a:solidFill>
+                        <a:schemeClr val="tx1"/>
+                      </a:solidFill>
+                      <a:prstDash val="solid"/>
+                      <a:round/>
+                      <a:headEnd type="none" w="med" len="med"/>
+                      <a:tailEnd type="none" w="med" len="med"/>
+                    </a:lnB>
+                    <a:lnTlToBr w="12700" cmpd="sng">
+                      <a:noFill/>
+                      <a:prstDash val="solid"/>
+                    </a:lnTlToBr>
+                    <a:lnBlToTr w="12700" cmpd="sng">
+                      <a:noFill/>
+                      <a:prstDash val="solid"/>
+                    </a:lnBlToTr>
+                    <a:noFill/>
+                  </a:tcPr>
+                </a:tc>
+                <a:extLst>
+                  <a:ext uri="{0D108BD9-81ED-4DB2-BD59-A6C34878D82A}">
+                    <a16:rowId xmlns:a16="http://schemas.microsoft.com/office/drawing/2014/main" val="1884603609"/>
+                  </a:ext>
+                </a:extLst>
+              </a:tr>
+            </a:tbl>
+          </a:graphicData>
+        </a:graphic>
+      </p:graphicFrame>
+      <p:sp>
+        <p:nvSpPr>
+          <p:cNvPr id="8" name="TextBox 7">
+            <a:extLst>
+              <a:ext uri="{FF2B5EF4-FFF2-40B4-BE49-F238E27FC236}">
+                <a16:creationId xmlns:a16="http://schemas.microsoft.com/office/drawing/2014/main" id="{B1168219-1B48-7BA8-1784-D8084640F534}"/>
+              </a:ext>
+            </a:extLst>
+          </p:cNvPr>
+          <p:cNvSpPr txBox="1"/>
+          <p:nvPr/>
+        </p:nvSpPr>
+        <p:spPr>
+          <a:xfrm>
+            <a:off x="6870914" y="2645833"/>
+            <a:ext cx="607859" cy="1015663"/>
+          </a:xfrm>
+          <a:prstGeom prst="rect">
+            <a:avLst/>
+          </a:prstGeom>
+          <a:noFill/>
+        </p:spPr>
+        <p:txBody>
+          <a:bodyPr wrap="none" rtlCol="0">
+            <a:spAutoFit/>
+          </a:bodyPr>
+          <a:lstStyle/>
+          <a:p>
+            <a:r>
+              <a:rPr lang="fr-FR" sz="6000" b="1" dirty="0">
+                <a:solidFill>
+                  <a:srgbClr val="C00000"/>
+                </a:solidFill>
+              </a:rPr>
+              <a:t>X</a:t>
+            </a:r>
+          </a:p>
+        </p:txBody>
+      </p:sp>
+      <p:sp>
+        <p:nvSpPr>
+          <p:cNvPr id="11" name="Free-form: Shape 10">
+            <a:extLst>
+              <a:ext uri="{FF2B5EF4-FFF2-40B4-BE49-F238E27FC236}">
+                <a16:creationId xmlns:a16="http://schemas.microsoft.com/office/drawing/2014/main" id="{67071EFB-78E5-40D3-6349-05AEDD1661B7}"/>
+              </a:ext>
+            </a:extLst>
+          </p:cNvPr>
+          <p:cNvSpPr/>
+          <p:nvPr/>
+        </p:nvSpPr>
+        <p:spPr>
+          <a:xfrm>
+            <a:off x="5118100" y="3191934"/>
+            <a:ext cx="1625600" cy="575227"/>
+          </a:xfrm>
+          <a:custGeom>
+            <a:avLst/>
+            <a:gdLst>
+              <a:gd name="connsiteX0" fmla="*/ 2506133 w 2506133"/>
+              <a:gd name="connsiteY0" fmla="*/ 0 h 982134"/>
+              <a:gd name="connsiteX1" fmla="*/ 948267 w 2506133"/>
+              <a:gd name="connsiteY1" fmla="*/ 317500 h 982134"/>
+              <a:gd name="connsiteX2" fmla="*/ 0 w 2506133"/>
+              <a:gd name="connsiteY2" fmla="*/ 982134 h 982134"/>
+            </a:gdLst>
+            <a:ahLst/>
+            <a:cxnLst>
+              <a:cxn ang="0">
+                <a:pos x="connsiteX0" y="connsiteY0"/>
+              </a:cxn>
+              <a:cxn ang="0">
+                <a:pos x="connsiteX1" y="connsiteY1"/>
+              </a:cxn>
+              <a:cxn ang="0">
+                <a:pos x="connsiteX2" y="connsiteY2"/>
+              </a:cxn>
+            </a:cxnLst>
+            <a:rect l="l" t="t" r="r" b="b"/>
+            <a:pathLst>
+              <a:path w="2506133" h="982134">
+                <a:moveTo>
+                  <a:pt x="2506133" y="0"/>
+                </a:moveTo>
+                <a:cubicBezTo>
+                  <a:pt x="1936044" y="76905"/>
+                  <a:pt x="1365956" y="153811"/>
+                  <a:pt x="948267" y="317500"/>
+                </a:cubicBezTo>
+                <a:cubicBezTo>
+                  <a:pt x="530578" y="481189"/>
+                  <a:pt x="265289" y="731661"/>
+                  <a:pt x="0" y="982134"/>
+                </a:cubicBezTo>
+              </a:path>
+            </a:pathLst>
+          </a:custGeom>
+          <a:noFill/>
+          <a:ln w="57150">
+            <a:solidFill>
+              <a:schemeClr val="bg1">
+                <a:lumMod val="50000"/>
+              </a:schemeClr>
+            </a:solidFill>
+            <a:headEnd type="none" w="med" len="med"/>
+            <a:tailEnd type="arrow" w="med" len="med"/>
+          </a:ln>
+        </p:spPr>
+        <p:style>
+          <a:lnRef idx="2">
+            <a:schemeClr val="accent1">
+              <a:shade val="15000"/>
+            </a:schemeClr>
+          </a:lnRef>
+          <a:fillRef idx="1">
+            <a:schemeClr val="accent1"/>
+          </a:fillRef>
+          <a:effectRef idx="0">
+            <a:schemeClr val="accent1"/>
+          </a:effectRef>
+          <a:fontRef idx="minor">
+            <a:schemeClr val="lt1"/>
+          </a:fontRef>
+        </p:style>
+        <p:txBody>
+          <a:bodyPr rtlCol="0" anchor="ctr"/>
+          <a:lstStyle/>
+          <a:p>
+            <a:pPr algn="ctr"/>
+            <a:endParaRPr lang="fr-FR"/>
+          </a:p>
+        </p:txBody>
+      </p:sp>
+      <p:sp>
+        <p:nvSpPr>
+          <p:cNvPr id="12" name="TextBox 11">
+            <a:extLst>
+              <a:ext uri="{FF2B5EF4-FFF2-40B4-BE49-F238E27FC236}">
+                <a16:creationId xmlns:a16="http://schemas.microsoft.com/office/drawing/2014/main" id="{D32BD4E9-2C4A-5ABA-8EFF-A646CF4F6F32}"/>
+              </a:ext>
+            </a:extLst>
+          </p:cNvPr>
+          <p:cNvSpPr txBox="1"/>
+          <p:nvPr/>
+        </p:nvSpPr>
+        <p:spPr>
+          <a:xfrm>
+            <a:off x="2603465" y="5725054"/>
+            <a:ext cx="5842497" cy="461665"/>
+          </a:xfrm>
+          <a:prstGeom prst="rect">
+            <a:avLst/>
+          </a:prstGeom>
+          <a:noFill/>
+        </p:spPr>
+        <p:txBody>
+          <a:bodyPr wrap="none" rtlCol="0">
+            <a:spAutoFit/>
+          </a:bodyPr>
+          <a:lstStyle/>
+          <a:p>
+            <a:r>
+              <a:rPr lang="fr-FR" sz="2400" i="1" dirty="0"/>
+              <a:t>« Si deux symboles alignés, bloquer la ligne. »</a:t>
+            </a:r>
+          </a:p>
+        </p:txBody>
+      </p:sp>
+    </p:spTree>
+    <p:extLst>
+      <p:ext uri="{BB962C8B-B14F-4D97-AF65-F5344CB8AC3E}">
+        <p14:creationId xmlns:p14="http://schemas.microsoft.com/office/powerpoint/2010/main" val="1949032356"/>
+      </p:ext>
+    </p:extLst>
+  </p:cSld>
+  <p:clrMapOvr>
+    <a:masterClrMapping/>
+  </p:clrMapOvr>
+</p:sld>
+</file>
+
 <file path=ppt/theme/theme1.xml><?xml version="1.0" encoding="utf-8"?>
 <a:theme xmlns:a="http://schemas.openxmlformats.org/drawingml/2006/main" name="Office Theme">
   <a:themeElements>

</xml_diff>

<commit_message>
added classic vs deep paradigmes
</commit_message>
<xml_diff>
--- a/slides.pptx
+++ b/slides.pptx
@@ -12,6 +12,7 @@
     <p:sldId id="261" r:id="rId6"/>
     <p:sldId id="260" r:id="rId7"/>
     <p:sldId id="262" r:id="rId8"/>
+    <p:sldId id="263" r:id="rId9"/>
   </p:sldIdLst>
   <p:sldSz cx="12192000" cy="6858000"/>
   <p:notesSz cx="6858000" cy="9144000"/>
@@ -29126,6 +29127,196 @@
 </p:sld>
 </file>
 
+<file path=ppt/slides/slide8.xml><?xml version="1.0" encoding="utf-8"?>
+<p:sld xmlns:a="http://schemas.openxmlformats.org/drawingml/2006/main" xmlns:r="http://schemas.openxmlformats.org/officeDocument/2006/relationships" xmlns:p="http://schemas.openxmlformats.org/presentationml/2006/main">
+  <p:cSld>
+    <p:spTree>
+      <p:nvGrpSpPr>
+        <p:cNvPr id="1" name=""/>
+        <p:cNvGrpSpPr/>
+        <p:nvPr/>
+      </p:nvGrpSpPr>
+      <p:grpSpPr>
+        <a:xfrm>
+          <a:off x="0" y="0"/>
+          <a:ext cx="0" cy="0"/>
+          <a:chOff x="0" y="0"/>
+          <a:chExt cx="0" cy="0"/>
+        </a:xfrm>
+      </p:grpSpPr>
+      <p:sp>
+        <p:nvSpPr>
+          <p:cNvPr id="4" name="Title 3">
+            <a:extLst>
+              <a:ext uri="{FF2B5EF4-FFF2-40B4-BE49-F238E27FC236}">
+                <a16:creationId xmlns:a16="http://schemas.microsoft.com/office/drawing/2014/main" id="{C814BAF1-E3E0-20D0-D614-BCA793500AD9}"/>
+              </a:ext>
+            </a:extLst>
+          </p:cNvPr>
+          <p:cNvSpPr>
+            <a:spLocks noGrp="1"/>
+          </p:cNvSpPr>
+          <p:nvPr>
+            <p:ph type="title"/>
+          </p:nvPr>
+        </p:nvSpPr>
+        <p:spPr/>
+        <p:txBody>
+          <a:bodyPr/>
+          <a:lstStyle/>
+          <a:p>
+            <a:r>
+              <a:rPr lang="fr-FR" dirty="0"/>
+              <a:t>Paradigmes d’IA</a:t>
+            </a:r>
+          </a:p>
+        </p:txBody>
+      </p:sp>
+      <p:sp>
+        <p:nvSpPr>
+          <p:cNvPr id="5" name="Text Placeholder 4">
+            <a:extLst>
+              <a:ext uri="{FF2B5EF4-FFF2-40B4-BE49-F238E27FC236}">
+                <a16:creationId xmlns:a16="http://schemas.microsoft.com/office/drawing/2014/main" id="{9025F3AC-7BE7-379D-B646-71B835E47AAB}"/>
+              </a:ext>
+            </a:extLst>
+          </p:cNvPr>
+          <p:cNvSpPr>
+            <a:spLocks noGrp="1"/>
+          </p:cNvSpPr>
+          <p:nvPr>
+            <p:ph type="body" idx="1"/>
+          </p:nvPr>
+        </p:nvSpPr>
+        <p:spPr/>
+        <p:txBody>
+          <a:bodyPr/>
+          <a:lstStyle/>
+          <a:p>
+            <a:r>
+              <a:rPr lang="fr-FR" dirty="0"/>
+              <a:t>Programmation « classique »</a:t>
+            </a:r>
+          </a:p>
+        </p:txBody>
+      </p:sp>
+      <p:sp>
+        <p:nvSpPr>
+          <p:cNvPr id="7" name="Text Placeholder 6">
+            <a:extLst>
+              <a:ext uri="{FF2B5EF4-FFF2-40B4-BE49-F238E27FC236}">
+                <a16:creationId xmlns:a16="http://schemas.microsoft.com/office/drawing/2014/main" id="{FBEBFECE-45E1-BAAA-8D7F-CD7DD8605A49}"/>
+              </a:ext>
+            </a:extLst>
+          </p:cNvPr>
+          <p:cNvSpPr>
+            <a:spLocks noGrp="1"/>
+          </p:cNvSpPr>
+          <p:nvPr>
+            <p:ph type="body" sz="quarter" idx="3"/>
+          </p:nvPr>
+        </p:nvSpPr>
+        <p:spPr/>
+        <p:txBody>
+          <a:bodyPr/>
+          <a:lstStyle/>
+          <a:p>
+            <a:r>
+              <a:rPr lang="fr-FR" dirty="0"/>
+              <a:t>Apprentissage profond</a:t>
+            </a:r>
+          </a:p>
+        </p:txBody>
+      </p:sp>
+      <p:pic>
+        <p:nvPicPr>
+          <p:cNvPr id="12" name="Content Placeholder 11">
+            <a:extLst>
+              <a:ext uri="{FF2B5EF4-FFF2-40B4-BE49-F238E27FC236}">
+                <a16:creationId xmlns:a16="http://schemas.microsoft.com/office/drawing/2014/main" id="{FDEBFDFD-53F5-1F9D-FF31-BF7DB3770CD8}"/>
+              </a:ext>
+            </a:extLst>
+          </p:cNvPr>
+          <p:cNvPicPr>
+            <a:picLocks noGrp="1" noChangeAspect="1"/>
+          </p:cNvPicPr>
+          <p:nvPr>
+            <p:ph sz="quarter" idx="4"/>
+          </p:nvPr>
+        </p:nvPicPr>
+        <p:blipFill>
+          <a:blip r:embed="rId2">
+            <a:extLst>
+              <a:ext uri="{28A0092B-C50C-407E-A947-70E740481C1C}">
+                <a14:useLocalDpi xmlns:a14="http://schemas.microsoft.com/office/drawing/2010/main" val="0"/>
+              </a:ext>
+              <a:ext uri="{96DAC541-7B7A-43D3-8B79-37D633B846F1}">
+                <asvg:svgBlip xmlns:asvg="http://schemas.microsoft.com/office/drawing/2016/SVG/main" r:embed="rId3"/>
+              </a:ext>
+            </a:extLst>
+          </a:blip>
+          <a:stretch>
+            <a:fillRect/>
+          </a:stretch>
+        </p:blipFill>
+        <p:spPr>
+          <a:xfrm>
+            <a:off x="6921500" y="2505075"/>
+            <a:ext cx="3684588" cy="3684588"/>
+          </a:xfrm>
+        </p:spPr>
+      </p:pic>
+      <p:pic>
+        <p:nvPicPr>
+          <p:cNvPr id="16" name="Content Placeholder 15">
+            <a:extLst>
+              <a:ext uri="{FF2B5EF4-FFF2-40B4-BE49-F238E27FC236}">
+                <a16:creationId xmlns:a16="http://schemas.microsoft.com/office/drawing/2014/main" id="{9DE9698F-44F3-3230-1DE8-F08EAE7C6344}"/>
+              </a:ext>
+            </a:extLst>
+          </p:cNvPr>
+          <p:cNvPicPr>
+            <a:picLocks noGrp="1" noChangeAspect="1"/>
+          </p:cNvPicPr>
+          <p:nvPr>
+            <p:ph sz="half" idx="2"/>
+          </p:nvPr>
+        </p:nvPicPr>
+        <p:blipFill>
+          <a:blip r:embed="rId4">
+            <a:extLst>
+              <a:ext uri="{28A0092B-C50C-407E-A947-70E740481C1C}">
+                <a14:useLocalDpi xmlns:a14="http://schemas.microsoft.com/office/drawing/2010/main" val="0"/>
+              </a:ext>
+              <a:ext uri="{96DAC541-7B7A-43D3-8B79-37D633B846F1}">
+                <asvg:svgBlip xmlns:asvg="http://schemas.microsoft.com/office/drawing/2016/SVG/main" r:embed="rId5"/>
+              </a:ext>
+            </a:extLst>
+          </a:blip>
+          <a:stretch>
+            <a:fillRect/>
+          </a:stretch>
+        </p:blipFill>
+        <p:spPr>
+          <a:xfrm>
+            <a:off x="1576387" y="2505075"/>
+            <a:ext cx="3684588" cy="3684588"/>
+          </a:xfrm>
+        </p:spPr>
+      </p:pic>
+    </p:spTree>
+    <p:extLst>
+      <p:ext uri="{BB962C8B-B14F-4D97-AF65-F5344CB8AC3E}">
+        <p14:creationId xmlns:p14="http://schemas.microsoft.com/office/powerpoint/2010/main" val="3112371186"/>
+      </p:ext>
+    </p:extLst>
+  </p:cSld>
+  <p:clrMapOvr>
+    <a:masterClrMapping/>
+  </p:clrMapOvr>
+</p:sld>
+</file>
+
 <file path=ppt/theme/theme1.xml><?xml version="1.0" encoding="utf-8"?>
 <a:theme xmlns:a="http://schemas.openxmlformats.org/drawingml/2006/main" name="Office Theme">
   <a:themeElements>

</xml_diff>

<commit_message>
added classic paradigm slide
</commit_message>
<xml_diff>
--- a/slides.pptx
+++ b/slides.pptx
@@ -5,7 +5,7 @@
     <p:sldMasterId id="2147483648" r:id="rId1"/>
   </p:sldMasterIdLst>
   <p:notesMasterIdLst>
-    <p:notesMasterId r:id="rId10"/>
+    <p:notesMasterId r:id="rId11"/>
   </p:notesMasterIdLst>
   <p:sldIdLst>
     <p:sldId id="256" r:id="rId2"/>
@@ -14,8 +14,9 @@
     <p:sldId id="259" r:id="rId5"/>
     <p:sldId id="261" r:id="rId6"/>
     <p:sldId id="260" r:id="rId7"/>
-    <p:sldId id="263" r:id="rId8"/>
-    <p:sldId id="262" r:id="rId9"/>
+    <p:sldId id="262" r:id="rId8"/>
+    <p:sldId id="263" r:id="rId9"/>
+    <p:sldId id="265" r:id="rId10"/>
   </p:sldIdLst>
   <p:sldSz cx="12192000" cy="6858000"/>
   <p:notesSz cx="6858000" cy="9144000"/>
@@ -28679,196 +28680,6 @@
       </p:grpSpPr>
       <p:sp>
         <p:nvSpPr>
-          <p:cNvPr id="4" name="Title 3">
-            <a:extLst>
-              <a:ext uri="{FF2B5EF4-FFF2-40B4-BE49-F238E27FC236}">
-                <a16:creationId xmlns:a16="http://schemas.microsoft.com/office/drawing/2014/main" id="{C814BAF1-E3E0-20D0-D614-BCA793500AD9}"/>
-              </a:ext>
-            </a:extLst>
-          </p:cNvPr>
-          <p:cNvSpPr>
-            <a:spLocks noGrp="1"/>
-          </p:cNvSpPr>
-          <p:nvPr>
-            <p:ph type="title"/>
-          </p:nvPr>
-        </p:nvSpPr>
-        <p:spPr/>
-        <p:txBody>
-          <a:bodyPr/>
-          <a:lstStyle/>
-          <a:p>
-            <a:r>
-              <a:rPr lang="fr-FR" dirty="0"/>
-              <a:t>Paradigmes d’IA</a:t>
-            </a:r>
-          </a:p>
-        </p:txBody>
-      </p:sp>
-      <p:sp>
-        <p:nvSpPr>
-          <p:cNvPr id="5" name="Text Placeholder 4">
-            <a:extLst>
-              <a:ext uri="{FF2B5EF4-FFF2-40B4-BE49-F238E27FC236}">
-                <a16:creationId xmlns:a16="http://schemas.microsoft.com/office/drawing/2014/main" id="{9025F3AC-7BE7-379D-B646-71B835E47AAB}"/>
-              </a:ext>
-            </a:extLst>
-          </p:cNvPr>
-          <p:cNvSpPr>
-            <a:spLocks noGrp="1"/>
-          </p:cNvSpPr>
-          <p:nvPr>
-            <p:ph type="body" idx="1"/>
-          </p:nvPr>
-        </p:nvSpPr>
-        <p:spPr/>
-        <p:txBody>
-          <a:bodyPr/>
-          <a:lstStyle/>
-          <a:p>
-            <a:r>
-              <a:rPr lang="fr-FR" dirty="0"/>
-              <a:t>Programmation « classique »</a:t>
-            </a:r>
-          </a:p>
-        </p:txBody>
-      </p:sp>
-      <p:sp>
-        <p:nvSpPr>
-          <p:cNvPr id="7" name="Text Placeholder 6">
-            <a:extLst>
-              <a:ext uri="{FF2B5EF4-FFF2-40B4-BE49-F238E27FC236}">
-                <a16:creationId xmlns:a16="http://schemas.microsoft.com/office/drawing/2014/main" id="{FBEBFECE-45E1-BAAA-8D7F-CD7DD8605A49}"/>
-              </a:ext>
-            </a:extLst>
-          </p:cNvPr>
-          <p:cNvSpPr>
-            <a:spLocks noGrp="1"/>
-          </p:cNvSpPr>
-          <p:nvPr>
-            <p:ph type="body" sz="quarter" idx="3"/>
-          </p:nvPr>
-        </p:nvSpPr>
-        <p:spPr/>
-        <p:txBody>
-          <a:bodyPr/>
-          <a:lstStyle/>
-          <a:p>
-            <a:r>
-              <a:rPr lang="fr-FR" dirty="0"/>
-              <a:t>Apprentissage profond</a:t>
-            </a:r>
-          </a:p>
-        </p:txBody>
-      </p:sp>
-      <p:pic>
-        <p:nvPicPr>
-          <p:cNvPr id="12" name="Content Placeholder 11">
-            <a:extLst>
-              <a:ext uri="{FF2B5EF4-FFF2-40B4-BE49-F238E27FC236}">
-                <a16:creationId xmlns:a16="http://schemas.microsoft.com/office/drawing/2014/main" id="{FDEBFDFD-53F5-1F9D-FF31-BF7DB3770CD8}"/>
-              </a:ext>
-            </a:extLst>
-          </p:cNvPr>
-          <p:cNvPicPr>
-            <a:picLocks noGrp="1" noChangeAspect="1"/>
-          </p:cNvPicPr>
-          <p:nvPr>
-            <p:ph sz="quarter" idx="4"/>
-          </p:nvPr>
-        </p:nvPicPr>
-        <p:blipFill>
-          <a:blip r:embed="rId2">
-            <a:extLst>
-              <a:ext uri="{28A0092B-C50C-407E-A947-70E740481C1C}">
-                <a14:useLocalDpi xmlns:a14="http://schemas.microsoft.com/office/drawing/2010/main" val="0"/>
-              </a:ext>
-              <a:ext uri="{96DAC541-7B7A-43D3-8B79-37D633B846F1}">
-                <asvg:svgBlip xmlns:asvg="http://schemas.microsoft.com/office/drawing/2016/SVG/main" r:embed="rId3"/>
-              </a:ext>
-            </a:extLst>
-          </a:blip>
-          <a:stretch>
-            <a:fillRect/>
-          </a:stretch>
-        </p:blipFill>
-        <p:spPr>
-          <a:xfrm>
-            <a:off x="6921500" y="2505075"/>
-            <a:ext cx="3684588" cy="3684588"/>
-          </a:xfrm>
-        </p:spPr>
-      </p:pic>
-      <p:pic>
-        <p:nvPicPr>
-          <p:cNvPr id="16" name="Content Placeholder 15">
-            <a:extLst>
-              <a:ext uri="{FF2B5EF4-FFF2-40B4-BE49-F238E27FC236}">
-                <a16:creationId xmlns:a16="http://schemas.microsoft.com/office/drawing/2014/main" id="{9DE9698F-44F3-3230-1DE8-F08EAE7C6344}"/>
-              </a:ext>
-            </a:extLst>
-          </p:cNvPr>
-          <p:cNvPicPr>
-            <a:picLocks noGrp="1" noChangeAspect="1"/>
-          </p:cNvPicPr>
-          <p:nvPr>
-            <p:ph sz="half" idx="2"/>
-          </p:nvPr>
-        </p:nvPicPr>
-        <p:blipFill>
-          <a:blip r:embed="rId4">
-            <a:extLst>
-              <a:ext uri="{28A0092B-C50C-407E-A947-70E740481C1C}">
-                <a14:useLocalDpi xmlns:a14="http://schemas.microsoft.com/office/drawing/2010/main" val="0"/>
-              </a:ext>
-              <a:ext uri="{96DAC541-7B7A-43D3-8B79-37D633B846F1}">
-                <asvg:svgBlip xmlns:asvg="http://schemas.microsoft.com/office/drawing/2016/SVG/main" r:embed="rId5"/>
-              </a:ext>
-            </a:extLst>
-          </a:blip>
-          <a:stretch>
-            <a:fillRect/>
-          </a:stretch>
-        </p:blipFill>
-        <p:spPr>
-          <a:xfrm>
-            <a:off x="1576387" y="2505075"/>
-            <a:ext cx="3684588" cy="3684588"/>
-          </a:xfrm>
-        </p:spPr>
-      </p:pic>
-    </p:spTree>
-    <p:extLst>
-      <p:ext uri="{BB962C8B-B14F-4D97-AF65-F5344CB8AC3E}">
-        <p14:creationId xmlns:p14="http://schemas.microsoft.com/office/powerpoint/2010/main" val="3112371186"/>
-      </p:ext>
-    </p:extLst>
-  </p:cSld>
-  <p:clrMapOvr>
-    <a:masterClrMapping/>
-  </p:clrMapOvr>
-</p:sld>
-</file>
-
-<file path=ppt/slides/slide8.xml><?xml version="1.0" encoding="utf-8"?>
-<p:sld xmlns:a="http://schemas.openxmlformats.org/drawingml/2006/main" xmlns:r="http://schemas.openxmlformats.org/officeDocument/2006/relationships" xmlns:p="http://schemas.openxmlformats.org/presentationml/2006/main">
-  <p:cSld>
-    <p:spTree>
-      <p:nvGrpSpPr>
-        <p:cNvPr id="1" name=""/>
-        <p:cNvGrpSpPr/>
-        <p:nvPr/>
-      </p:nvGrpSpPr>
-      <p:grpSpPr>
-        <a:xfrm>
-          <a:off x="0" y="0"/>
-          <a:ext cx="0" cy="0"/>
-          <a:chOff x="0" y="0"/>
-          <a:chExt cx="0" cy="0"/>
-        </a:xfrm>
-      </p:grpSpPr>
-      <p:sp>
-        <p:nvSpPr>
           <p:cNvPr id="2" name="Title 1">
             <a:extLst>
               <a:ext uri="{FF2B5EF4-FFF2-40B4-BE49-F238E27FC236}">
@@ -28890,13 +28701,8 @@
           <a:p>
             <a:r>
               <a:rPr lang="fr-FR" dirty="0"/>
-              <a:t>Exemple d’IA </a:t>
+              <a:t>Exemple d’IA "simple"</a:t>
             </a:r>
-            <a:r>
-              <a:rPr lang="fr-FR"/>
-              <a:t>"classique"</a:t>
-            </a:r>
-            <a:endParaRPr lang="fr-FR" dirty="0"/>
           </a:p>
         </p:txBody>
       </p:sp>
@@ -29787,6 +29593,321 @@
 </p:sld>
 </file>
 
+<file path=ppt/slides/slide8.xml><?xml version="1.0" encoding="utf-8"?>
+<p:sld xmlns:a="http://schemas.openxmlformats.org/drawingml/2006/main" xmlns:r="http://schemas.openxmlformats.org/officeDocument/2006/relationships" xmlns:p="http://schemas.openxmlformats.org/presentationml/2006/main">
+  <p:cSld>
+    <p:spTree>
+      <p:nvGrpSpPr>
+        <p:cNvPr id="1" name=""/>
+        <p:cNvGrpSpPr/>
+        <p:nvPr/>
+      </p:nvGrpSpPr>
+      <p:grpSpPr>
+        <a:xfrm>
+          <a:off x="0" y="0"/>
+          <a:ext cx="0" cy="0"/>
+          <a:chOff x="0" y="0"/>
+          <a:chExt cx="0" cy="0"/>
+        </a:xfrm>
+      </p:grpSpPr>
+      <p:sp>
+        <p:nvSpPr>
+          <p:cNvPr id="4" name="Title 3">
+            <a:extLst>
+              <a:ext uri="{FF2B5EF4-FFF2-40B4-BE49-F238E27FC236}">
+                <a16:creationId xmlns:a16="http://schemas.microsoft.com/office/drawing/2014/main" id="{C814BAF1-E3E0-20D0-D614-BCA793500AD9}"/>
+              </a:ext>
+            </a:extLst>
+          </p:cNvPr>
+          <p:cNvSpPr>
+            <a:spLocks noGrp="1"/>
+          </p:cNvSpPr>
+          <p:nvPr>
+            <p:ph type="title"/>
+          </p:nvPr>
+        </p:nvSpPr>
+        <p:spPr/>
+        <p:txBody>
+          <a:bodyPr/>
+          <a:lstStyle/>
+          <a:p>
+            <a:r>
+              <a:rPr lang="fr-FR" dirty="0"/>
+              <a:t>Paradigmes d’IA</a:t>
+            </a:r>
+          </a:p>
+        </p:txBody>
+      </p:sp>
+      <p:sp>
+        <p:nvSpPr>
+          <p:cNvPr id="5" name="Text Placeholder 4">
+            <a:extLst>
+              <a:ext uri="{FF2B5EF4-FFF2-40B4-BE49-F238E27FC236}">
+                <a16:creationId xmlns:a16="http://schemas.microsoft.com/office/drawing/2014/main" id="{9025F3AC-7BE7-379D-B646-71B835E47AAB}"/>
+              </a:ext>
+            </a:extLst>
+          </p:cNvPr>
+          <p:cNvSpPr>
+            <a:spLocks noGrp="1"/>
+          </p:cNvSpPr>
+          <p:nvPr>
+            <p:ph type="body" idx="1"/>
+          </p:nvPr>
+        </p:nvSpPr>
+        <p:spPr/>
+        <p:txBody>
+          <a:bodyPr/>
+          <a:lstStyle/>
+          <a:p>
+            <a:r>
+              <a:rPr lang="fr-FR" dirty="0"/>
+              <a:t>Programmation « classique »</a:t>
+            </a:r>
+          </a:p>
+        </p:txBody>
+      </p:sp>
+      <p:sp>
+        <p:nvSpPr>
+          <p:cNvPr id="7" name="Text Placeholder 6">
+            <a:extLst>
+              <a:ext uri="{FF2B5EF4-FFF2-40B4-BE49-F238E27FC236}">
+                <a16:creationId xmlns:a16="http://schemas.microsoft.com/office/drawing/2014/main" id="{FBEBFECE-45E1-BAAA-8D7F-CD7DD8605A49}"/>
+              </a:ext>
+            </a:extLst>
+          </p:cNvPr>
+          <p:cNvSpPr>
+            <a:spLocks noGrp="1"/>
+          </p:cNvSpPr>
+          <p:nvPr>
+            <p:ph type="body" sz="quarter" idx="3"/>
+          </p:nvPr>
+        </p:nvSpPr>
+        <p:spPr/>
+        <p:txBody>
+          <a:bodyPr/>
+          <a:lstStyle/>
+          <a:p>
+            <a:r>
+              <a:rPr lang="fr-FR" dirty="0"/>
+              <a:t>Apprentissage profond</a:t>
+            </a:r>
+          </a:p>
+        </p:txBody>
+      </p:sp>
+      <p:pic>
+        <p:nvPicPr>
+          <p:cNvPr id="12" name="Content Placeholder 11">
+            <a:extLst>
+              <a:ext uri="{FF2B5EF4-FFF2-40B4-BE49-F238E27FC236}">
+                <a16:creationId xmlns:a16="http://schemas.microsoft.com/office/drawing/2014/main" id="{FDEBFDFD-53F5-1F9D-FF31-BF7DB3770CD8}"/>
+              </a:ext>
+            </a:extLst>
+          </p:cNvPr>
+          <p:cNvPicPr>
+            <a:picLocks noGrp="1" noChangeAspect="1"/>
+          </p:cNvPicPr>
+          <p:nvPr>
+            <p:ph sz="quarter" idx="4"/>
+          </p:nvPr>
+        </p:nvPicPr>
+        <p:blipFill>
+          <a:blip r:embed="rId2">
+            <a:extLst>
+              <a:ext uri="{28A0092B-C50C-407E-A947-70E740481C1C}">
+                <a14:useLocalDpi xmlns:a14="http://schemas.microsoft.com/office/drawing/2010/main" val="0"/>
+              </a:ext>
+              <a:ext uri="{96DAC541-7B7A-43D3-8B79-37D633B846F1}">
+                <asvg:svgBlip xmlns:asvg="http://schemas.microsoft.com/office/drawing/2016/SVG/main" r:embed="rId3"/>
+              </a:ext>
+            </a:extLst>
+          </a:blip>
+          <a:stretch>
+            <a:fillRect/>
+          </a:stretch>
+        </p:blipFill>
+        <p:spPr>
+          <a:xfrm>
+            <a:off x="6921500" y="2505075"/>
+            <a:ext cx="3684588" cy="3684588"/>
+          </a:xfrm>
+        </p:spPr>
+      </p:pic>
+      <p:pic>
+        <p:nvPicPr>
+          <p:cNvPr id="16" name="Content Placeholder 15">
+            <a:extLst>
+              <a:ext uri="{FF2B5EF4-FFF2-40B4-BE49-F238E27FC236}">
+                <a16:creationId xmlns:a16="http://schemas.microsoft.com/office/drawing/2014/main" id="{9DE9698F-44F3-3230-1DE8-F08EAE7C6344}"/>
+              </a:ext>
+            </a:extLst>
+          </p:cNvPr>
+          <p:cNvPicPr>
+            <a:picLocks noGrp="1" noChangeAspect="1"/>
+          </p:cNvPicPr>
+          <p:nvPr>
+            <p:ph sz="half" idx="2"/>
+          </p:nvPr>
+        </p:nvPicPr>
+        <p:blipFill>
+          <a:blip r:embed="rId4">
+            <a:extLst>
+              <a:ext uri="{28A0092B-C50C-407E-A947-70E740481C1C}">
+                <a14:useLocalDpi xmlns:a14="http://schemas.microsoft.com/office/drawing/2010/main" val="0"/>
+              </a:ext>
+              <a:ext uri="{96DAC541-7B7A-43D3-8B79-37D633B846F1}">
+                <asvg:svgBlip xmlns:asvg="http://schemas.microsoft.com/office/drawing/2016/SVG/main" r:embed="rId5"/>
+              </a:ext>
+            </a:extLst>
+          </a:blip>
+          <a:stretch>
+            <a:fillRect/>
+          </a:stretch>
+        </p:blipFill>
+        <p:spPr>
+          <a:xfrm>
+            <a:off x="1576387" y="2505075"/>
+            <a:ext cx="3684588" cy="3684588"/>
+          </a:xfrm>
+        </p:spPr>
+      </p:pic>
+    </p:spTree>
+    <p:extLst>
+      <p:ext uri="{BB962C8B-B14F-4D97-AF65-F5344CB8AC3E}">
+        <p14:creationId xmlns:p14="http://schemas.microsoft.com/office/powerpoint/2010/main" val="3112371186"/>
+      </p:ext>
+    </p:extLst>
+  </p:cSld>
+  <p:clrMapOvr>
+    <a:masterClrMapping/>
+  </p:clrMapOvr>
+</p:sld>
+</file>
+
+<file path=ppt/slides/slide9.xml><?xml version="1.0" encoding="utf-8"?>
+<p:sld xmlns:a="http://schemas.openxmlformats.org/drawingml/2006/main" xmlns:r="http://schemas.openxmlformats.org/officeDocument/2006/relationships" xmlns:p="http://schemas.openxmlformats.org/presentationml/2006/main">
+  <p:cSld>
+    <p:spTree>
+      <p:nvGrpSpPr>
+        <p:cNvPr id="1" name=""/>
+        <p:cNvGrpSpPr/>
+        <p:nvPr/>
+      </p:nvGrpSpPr>
+      <p:grpSpPr>
+        <a:xfrm>
+          <a:off x="0" y="0"/>
+          <a:ext cx="0" cy="0"/>
+          <a:chOff x="0" y="0"/>
+          <a:chExt cx="0" cy="0"/>
+        </a:xfrm>
+      </p:grpSpPr>
+      <p:sp>
+        <p:nvSpPr>
+          <p:cNvPr id="2" name="Title 1">
+            <a:extLst>
+              <a:ext uri="{FF2B5EF4-FFF2-40B4-BE49-F238E27FC236}">
+                <a16:creationId xmlns:a16="http://schemas.microsoft.com/office/drawing/2014/main" id="{EC1922F3-6628-8A56-FBAF-C05D1D6FEE40}"/>
+              </a:ext>
+            </a:extLst>
+          </p:cNvPr>
+          <p:cNvSpPr>
+            <a:spLocks noGrp="1"/>
+          </p:cNvSpPr>
+          <p:nvPr>
+            <p:ph type="title"/>
+          </p:nvPr>
+        </p:nvSpPr>
+        <p:spPr/>
+        <p:txBody>
+          <a:bodyPr/>
+          <a:lstStyle/>
+          <a:p>
+            <a:r>
+              <a:rPr lang="fr-FR" dirty="0"/>
+              <a:t>Paradigme classique</a:t>
+            </a:r>
+          </a:p>
+        </p:txBody>
+      </p:sp>
+      <p:sp>
+        <p:nvSpPr>
+          <p:cNvPr id="9" name="Text Placeholder 8">
+            <a:extLst>
+              <a:ext uri="{FF2B5EF4-FFF2-40B4-BE49-F238E27FC236}">
+                <a16:creationId xmlns:a16="http://schemas.microsoft.com/office/drawing/2014/main" id="{DA48B7A3-8F8C-3AF7-EFC5-6C7E522A04B2}"/>
+              </a:ext>
+            </a:extLst>
+          </p:cNvPr>
+          <p:cNvSpPr>
+            <a:spLocks noGrp="1"/>
+          </p:cNvSpPr>
+          <p:nvPr>
+            <p:ph idx="1"/>
+          </p:nvPr>
+        </p:nvSpPr>
+        <p:spPr/>
+        <p:txBody>
+          <a:bodyPr/>
+          <a:lstStyle/>
+          <a:p>
+            <a:pPr marL="0" indent="0">
+              <a:buNone/>
+            </a:pPr>
+            <a:endParaRPr lang="fr-FR" dirty="0"/>
+          </a:p>
+          <a:p>
+            <a:r>
+              <a:rPr lang="fr-FR" dirty="0"/>
+              <a:t>Si situation A, faire action a</a:t>
+            </a:r>
+          </a:p>
+          <a:p>
+            <a:r>
+              <a:rPr lang="fr-FR" dirty="0"/>
+              <a:t>Si situation B, faire action b</a:t>
+            </a:r>
+          </a:p>
+          <a:p>
+            <a:r>
+              <a:rPr lang="fr-FR" dirty="0"/>
+              <a:t>Si situation C, faire action c</a:t>
+            </a:r>
+          </a:p>
+          <a:p>
+            <a:r>
+              <a:rPr lang="fr-FR" dirty="0"/>
+              <a:t>Si situation D, faire action a et b</a:t>
+            </a:r>
+          </a:p>
+          <a:p>
+            <a:r>
+              <a:rPr lang="fr-FR" dirty="0"/>
+              <a:t>Si situation E, faire action C puis a</a:t>
+            </a:r>
+          </a:p>
+          <a:p>
+            <a:r>
+              <a:rPr lang="fr-FR" dirty="0"/>
+              <a:t>Si non, faire action z</a:t>
+            </a:r>
+          </a:p>
+          <a:p>
+            <a:endParaRPr lang="fr-FR" dirty="0"/>
+          </a:p>
+        </p:txBody>
+      </p:sp>
+    </p:spTree>
+    <p:extLst>
+      <p:ext uri="{BB962C8B-B14F-4D97-AF65-F5344CB8AC3E}">
+        <p14:creationId xmlns:p14="http://schemas.microsoft.com/office/powerpoint/2010/main" val="1066028685"/>
+      </p:ext>
+    </p:extLst>
+  </p:cSld>
+  <p:clrMapOvr>
+    <a:masterClrMapping/>
+  </p:clrMapOvr>
+</p:sld>
+</file>
+
 <file path=ppt/theme/theme1.xml><?xml version="1.0" encoding="utf-8"?>
 <a:theme xmlns:a="http://schemas.openxmlformats.org/drawingml/2006/main" name="Office Theme">
   <a:themeElements>

</xml_diff>

<commit_message>
added deep paradigm slide
</commit_message>
<xml_diff>
--- a/slides.pptx
+++ b/slides.pptx
@@ -5,7 +5,7 @@
     <p:sldMasterId id="2147483648" r:id="rId1"/>
   </p:sldMasterIdLst>
   <p:notesMasterIdLst>
-    <p:notesMasterId r:id="rId11"/>
+    <p:notesMasterId r:id="rId12"/>
   </p:notesMasterIdLst>
   <p:sldIdLst>
     <p:sldId id="256" r:id="rId2"/>
@@ -17,6 +17,7 @@
     <p:sldId id="262" r:id="rId8"/>
     <p:sldId id="263" r:id="rId9"/>
     <p:sldId id="265" r:id="rId10"/>
+    <p:sldId id="266" r:id="rId11"/>
   </p:sldIdLst>
   <p:sldSz cx="12192000" cy="6858000"/>
   <p:notesSz cx="6858000" cy="9144000"/>
@@ -4051,6 +4052,142 @@
     <p:extLst>
       <p:ext uri="{BB962C8B-B14F-4D97-AF65-F5344CB8AC3E}">
         <p14:creationId xmlns:p14="http://schemas.microsoft.com/office/powerpoint/2010/main" val="3589506543"/>
+      </p:ext>
+    </p:extLst>
+  </p:cSld>
+  <p:clrMapOvr>
+    <a:masterClrMapping/>
+  </p:clrMapOvr>
+</p:sld>
+</file>
+
+<file path=ppt/slides/slide10.xml><?xml version="1.0" encoding="utf-8"?>
+<p:sld xmlns:a="http://schemas.openxmlformats.org/drawingml/2006/main" xmlns:r="http://schemas.openxmlformats.org/officeDocument/2006/relationships" xmlns:p="http://schemas.openxmlformats.org/presentationml/2006/main">
+  <p:cSld>
+    <p:spTree>
+      <p:nvGrpSpPr>
+        <p:cNvPr id="1" name=""/>
+        <p:cNvGrpSpPr/>
+        <p:nvPr/>
+      </p:nvGrpSpPr>
+      <p:grpSpPr>
+        <a:xfrm>
+          <a:off x="0" y="0"/>
+          <a:ext cx="0" cy="0"/>
+          <a:chOff x="0" y="0"/>
+          <a:chExt cx="0" cy="0"/>
+        </a:xfrm>
+      </p:grpSpPr>
+      <p:sp>
+        <p:nvSpPr>
+          <p:cNvPr id="2" name="Title 1">
+            <a:extLst>
+              <a:ext uri="{FF2B5EF4-FFF2-40B4-BE49-F238E27FC236}">
+                <a16:creationId xmlns:a16="http://schemas.microsoft.com/office/drawing/2014/main" id="{EC1922F3-6628-8A56-FBAF-C05D1D6FEE40}"/>
+              </a:ext>
+            </a:extLst>
+          </p:cNvPr>
+          <p:cNvSpPr>
+            <a:spLocks noGrp="1"/>
+          </p:cNvSpPr>
+          <p:nvPr>
+            <p:ph type="title"/>
+          </p:nvPr>
+        </p:nvSpPr>
+        <p:spPr/>
+        <p:txBody>
+          <a:bodyPr/>
+          <a:lstStyle/>
+          <a:p>
+            <a:r>
+              <a:rPr lang="fr-FR" dirty="0"/>
+              <a:t>Paradigme d’apprentissage profond</a:t>
+            </a:r>
+          </a:p>
+        </p:txBody>
+      </p:sp>
+      <p:sp>
+        <p:nvSpPr>
+          <p:cNvPr id="9" name="Text Placeholder 8">
+            <a:extLst>
+              <a:ext uri="{FF2B5EF4-FFF2-40B4-BE49-F238E27FC236}">
+                <a16:creationId xmlns:a16="http://schemas.microsoft.com/office/drawing/2014/main" id="{DA48B7A3-8F8C-3AF7-EFC5-6C7E522A04B2}"/>
+              </a:ext>
+            </a:extLst>
+          </p:cNvPr>
+          <p:cNvSpPr>
+            <a:spLocks noGrp="1"/>
+          </p:cNvSpPr>
+          <p:nvPr>
+            <p:ph idx="1"/>
+          </p:nvPr>
+        </p:nvSpPr>
+        <p:spPr/>
+        <p:txBody>
+          <a:bodyPr/>
+          <a:lstStyle/>
+          <a:p>
+            <a:pPr marL="0" indent="0">
+              <a:buNone/>
+            </a:pPr>
+            <a:endParaRPr lang="fr-FR" dirty="0"/>
+          </a:p>
+          <a:p>
+            <a:pPr marL="514350" indent="-514350">
+              <a:buFont typeface="+mj-lt"/>
+              <a:buAutoNum type="arabicPeriod"/>
+            </a:pPr>
+            <a:r>
+              <a:rPr lang="fr-FR" dirty="0"/>
+              <a:t>Définition de l’architecture</a:t>
+            </a:r>
+          </a:p>
+          <a:p>
+            <a:pPr marL="514350" indent="-514350">
+              <a:buFont typeface="+mj-lt"/>
+              <a:buAutoNum type="arabicPeriod"/>
+            </a:pPr>
+            <a:r>
+              <a:rPr lang="fr-FR" dirty="0"/>
+              <a:t>Récupération des données</a:t>
+            </a:r>
+          </a:p>
+          <a:p>
+            <a:pPr marL="514350" indent="-514350">
+              <a:buFont typeface="+mj-lt"/>
+              <a:buAutoNum type="arabicPeriod"/>
+            </a:pPr>
+            <a:r>
+              <a:rPr lang="fr-FR" dirty="0"/>
+              <a:t>Entrainement</a:t>
+            </a:r>
+          </a:p>
+          <a:p>
+            <a:pPr marL="514350" indent="-514350">
+              <a:buFont typeface="+mj-lt"/>
+              <a:buAutoNum type="arabicPeriod"/>
+            </a:pPr>
+            <a:r>
+              <a:rPr lang="fr-FR" dirty="0"/>
+              <a:t>Evaluation</a:t>
+            </a:r>
+          </a:p>
+          <a:p>
+            <a:pPr marL="514350" indent="-514350">
+              <a:buFont typeface="+mj-lt"/>
+              <a:buAutoNum type="arabicPeriod"/>
+            </a:pPr>
+            <a:r>
+              <a:rPr lang="fr-FR" dirty="0"/>
+              <a:t>Test</a:t>
+            </a:r>
+          </a:p>
+        </p:txBody>
+      </p:sp>
+    </p:spTree>
+    <p:extLst>
+      <p:ext uri="{BB962C8B-B14F-4D97-AF65-F5344CB8AC3E}">
+        <p14:creationId xmlns:p14="http://schemas.microsoft.com/office/powerpoint/2010/main" val="1378381660"/>
       </p:ext>
     </p:extLst>
   </p:cSld>

</xml_diff>

<commit_message>
hidden slide & moved content
</commit_message>
<xml_diff>
--- a/slides.pptx
+++ b/slides.pptx
@@ -29907,6 +29907,76 @@
           </a:xfrm>
         </p:spPr>
       </p:pic>
+      <p:sp>
+        <p:nvSpPr>
+          <p:cNvPr id="2" name="TextBox 1">
+            <a:extLst>
+              <a:ext uri="{FF2B5EF4-FFF2-40B4-BE49-F238E27FC236}">
+                <a16:creationId xmlns:a16="http://schemas.microsoft.com/office/drawing/2014/main" id="{F9992528-0855-6B35-EC22-5A82CE0F8685}"/>
+              </a:ext>
+            </a:extLst>
+          </p:cNvPr>
+          <p:cNvSpPr txBox="1"/>
+          <p:nvPr/>
+        </p:nvSpPr>
+        <p:spPr>
+          <a:xfrm>
+            <a:off x="184826" y="4940233"/>
+            <a:ext cx="3331361" cy="1754326"/>
+          </a:xfrm>
+          <a:prstGeom prst="rect">
+            <a:avLst/>
+          </a:prstGeom>
+          <a:solidFill>
+            <a:schemeClr val="bg1">
+              <a:lumMod val="50000"/>
+              <a:alpha val="90000"/>
+            </a:schemeClr>
+          </a:solidFill>
+        </p:spPr>
+        <p:txBody>
+          <a:bodyPr wrap="none" rtlCol="0">
+            <a:spAutoFit/>
+          </a:bodyPr>
+          <a:lstStyle/>
+          <a:p>
+            <a:r>
+              <a:rPr lang="fr-FR" dirty="0"/>
+              <a:t>Si situation A, faire action a</a:t>
+            </a:r>
+          </a:p>
+          <a:p>
+            <a:r>
+              <a:rPr lang="fr-FR" dirty="0"/>
+              <a:t>Si situation B, faire action b</a:t>
+            </a:r>
+          </a:p>
+          <a:p>
+            <a:r>
+              <a:rPr lang="fr-FR" dirty="0"/>
+              <a:t>Si situation C, faire action c</a:t>
+            </a:r>
+          </a:p>
+          <a:p>
+            <a:r>
+              <a:rPr lang="fr-FR" dirty="0"/>
+              <a:t>Si situation D, faire action a et b</a:t>
+            </a:r>
+          </a:p>
+          <a:p>
+            <a:r>
+              <a:rPr lang="fr-FR" dirty="0"/>
+              <a:t>Si situation E, faire action C puis a</a:t>
+            </a:r>
+          </a:p>
+          <a:p>
+            <a:r>
+              <a:rPr lang="fr-FR" dirty="0"/>
+              <a:t>Si non, faire action z</a:t>
+            </a:r>
+          </a:p>
+        </p:txBody>
+      </p:sp>
     </p:spTree>
     <p:extLst>
       <p:ext uri="{BB962C8B-B14F-4D97-AF65-F5344CB8AC3E}">
@@ -29917,11 +29987,97 @@
   <p:clrMapOvr>
     <a:masterClrMapping/>
   </p:clrMapOvr>
+  <p:timing>
+    <p:tnLst>
+      <p:par>
+        <p:cTn id="1" dur="indefinite" restart="never" nodeType="tmRoot">
+          <p:childTnLst>
+            <p:seq concurrent="1" nextAc="seek">
+              <p:cTn id="2" dur="indefinite" nodeType="mainSeq">
+                <p:childTnLst>
+                  <p:par>
+                    <p:cTn id="3" fill="hold">
+                      <p:stCondLst>
+                        <p:cond delay="indefinite"/>
+                      </p:stCondLst>
+                      <p:childTnLst>
+                        <p:par>
+                          <p:cTn id="4" fill="hold">
+                            <p:stCondLst>
+                              <p:cond delay="0"/>
+                            </p:stCondLst>
+                            <p:childTnLst>
+                              <p:par>
+                                <p:cTn id="5" presetID="10" presetClass="entr" presetSubtype="0" fill="hold" grpId="0" nodeType="clickEffect">
+                                  <p:stCondLst>
+                                    <p:cond delay="0"/>
+                                  </p:stCondLst>
+                                  <p:childTnLst>
+                                    <p:set>
+                                      <p:cBhvr>
+                                        <p:cTn id="6" dur="1" fill="hold">
+                                          <p:stCondLst>
+                                            <p:cond delay="0"/>
+                                          </p:stCondLst>
+                                        </p:cTn>
+                                        <p:tgtEl>
+                                          <p:spTgt spid="2"/>
+                                        </p:tgtEl>
+                                        <p:attrNameLst>
+                                          <p:attrName>style.visibility</p:attrName>
+                                        </p:attrNameLst>
+                                      </p:cBhvr>
+                                      <p:to>
+                                        <p:strVal val="visible"/>
+                                      </p:to>
+                                    </p:set>
+                                    <p:animEffect transition="in" filter="fade">
+                                      <p:cBhvr>
+                                        <p:cTn id="7" dur="500"/>
+                                        <p:tgtEl>
+                                          <p:spTgt spid="2"/>
+                                        </p:tgtEl>
+                                      </p:cBhvr>
+                                    </p:animEffect>
+                                  </p:childTnLst>
+                                </p:cTn>
+                              </p:par>
+                            </p:childTnLst>
+                          </p:cTn>
+                        </p:par>
+                      </p:childTnLst>
+                    </p:cTn>
+                  </p:par>
+                </p:childTnLst>
+              </p:cTn>
+              <p:prevCondLst>
+                <p:cond evt="onPrev" delay="0">
+                  <p:tgtEl>
+                    <p:sldTgt/>
+                  </p:tgtEl>
+                </p:cond>
+              </p:prevCondLst>
+              <p:nextCondLst>
+                <p:cond evt="onNext" delay="0">
+                  <p:tgtEl>
+                    <p:sldTgt/>
+                  </p:tgtEl>
+                </p:cond>
+              </p:nextCondLst>
+            </p:seq>
+          </p:childTnLst>
+        </p:cTn>
+      </p:par>
+    </p:tnLst>
+    <p:bldLst>
+      <p:bldP spid="2" grpId="0" animBg="1"/>
+    </p:bldLst>
+  </p:timing>
 </p:sld>
 </file>
 
 <file path=ppt/slides/slide9.xml><?xml version="1.0" encoding="utf-8"?>
-<p:sld xmlns:a="http://schemas.openxmlformats.org/drawingml/2006/main" xmlns:r="http://schemas.openxmlformats.org/officeDocument/2006/relationships" xmlns:p="http://schemas.openxmlformats.org/presentationml/2006/main">
+<p:sld xmlns:a="http://schemas.openxmlformats.org/drawingml/2006/main" xmlns:r="http://schemas.openxmlformats.org/officeDocument/2006/relationships" xmlns:p="http://schemas.openxmlformats.org/presentationml/2006/main" show="0">
   <p:cSld>
     <p:spTree>
       <p:nvGrpSpPr>

</xml_diff>

<commit_message>
2 stages of deep learning
</commit_message>
<xml_diff>
--- a/slides.pptx
+++ b/slides.pptx
@@ -5,7 +5,7 @@
     <p:sldMasterId id="2147483648" r:id="rId1"/>
   </p:sldMasterIdLst>
   <p:notesMasterIdLst>
-    <p:notesMasterId r:id="rId12"/>
+    <p:notesMasterId r:id="rId13"/>
   </p:notesMasterIdLst>
   <p:sldIdLst>
     <p:sldId id="256" r:id="rId2"/>
@@ -18,6 +18,7 @@
     <p:sldId id="263" r:id="rId9"/>
     <p:sldId id="265" r:id="rId10"/>
     <p:sldId id="266" r:id="rId11"/>
+    <p:sldId id="267" r:id="rId12"/>
   </p:sldIdLst>
   <p:sldSz cx="12192000" cy="6858000"/>
   <p:notesSz cx="6858000" cy="9144000"/>
@@ -4188,6 +4189,429 @@
     <p:extLst>
       <p:ext uri="{BB962C8B-B14F-4D97-AF65-F5344CB8AC3E}">
         <p14:creationId xmlns:p14="http://schemas.microsoft.com/office/powerpoint/2010/main" val="1378381660"/>
+      </p:ext>
+    </p:extLst>
+  </p:cSld>
+  <p:clrMapOvr>
+    <a:masterClrMapping/>
+  </p:clrMapOvr>
+</p:sld>
+</file>
+
+<file path=ppt/slides/slide11.xml><?xml version="1.0" encoding="utf-8"?>
+<p:sld xmlns:a="http://schemas.openxmlformats.org/drawingml/2006/main" xmlns:r="http://schemas.openxmlformats.org/officeDocument/2006/relationships" xmlns:p="http://schemas.openxmlformats.org/presentationml/2006/main">
+  <p:cSld>
+    <p:spTree>
+      <p:nvGrpSpPr>
+        <p:cNvPr id="1" name=""/>
+        <p:cNvGrpSpPr/>
+        <p:nvPr/>
+      </p:nvGrpSpPr>
+      <p:grpSpPr>
+        <a:xfrm>
+          <a:off x="0" y="0"/>
+          <a:ext cx="0" cy="0"/>
+          <a:chOff x="0" y="0"/>
+          <a:chExt cx="0" cy="0"/>
+        </a:xfrm>
+      </p:grpSpPr>
+      <p:grpSp>
+        <p:nvGrpSpPr>
+          <p:cNvPr id="11" name="Group 10">
+            <a:extLst>
+              <a:ext uri="{FF2B5EF4-FFF2-40B4-BE49-F238E27FC236}">
+                <a16:creationId xmlns:a16="http://schemas.microsoft.com/office/drawing/2014/main" id="{4752B3A7-62FE-8682-61EE-36E7D6DD0994}"/>
+              </a:ext>
+            </a:extLst>
+          </p:cNvPr>
+          <p:cNvGrpSpPr/>
+          <p:nvPr/>
+        </p:nvGrpSpPr>
+        <p:grpSpPr>
+          <a:xfrm>
+            <a:off x="5637893" y="3173412"/>
+            <a:ext cx="6023113" cy="3684588"/>
+            <a:chOff x="1848678" y="1043015"/>
+            <a:chExt cx="6023113" cy="3684588"/>
+          </a:xfrm>
+        </p:grpSpPr>
+        <p:sp>
+          <p:nvSpPr>
+            <p:cNvPr id="13" name="Rectangle 12">
+              <a:extLst>
+                <a:ext uri="{FF2B5EF4-FFF2-40B4-BE49-F238E27FC236}">
+                  <a16:creationId xmlns:a16="http://schemas.microsoft.com/office/drawing/2014/main" id="{9A0EAA25-72D3-5125-D851-4477A7D90BB3}"/>
+                </a:ext>
+              </a:extLst>
+            </p:cNvPr>
+            <p:cNvSpPr/>
+            <p:nvPr/>
+          </p:nvSpPr>
+          <p:spPr>
+            <a:xfrm>
+              <a:off x="1848678" y="1500809"/>
+              <a:ext cx="6023113" cy="2882348"/>
+            </a:xfrm>
+            <a:prstGeom prst="rect">
+              <a:avLst/>
+            </a:prstGeom>
+            <a:solidFill>
+              <a:schemeClr val="accent6">
+                <a:lumMod val="20000"/>
+                <a:lumOff val="80000"/>
+              </a:schemeClr>
+            </a:solidFill>
+            <a:ln>
+              <a:noFill/>
+            </a:ln>
+          </p:spPr>
+          <p:style>
+            <a:lnRef idx="2">
+              <a:schemeClr val="accent1">
+                <a:shade val="15000"/>
+              </a:schemeClr>
+            </a:lnRef>
+            <a:fillRef idx="1">
+              <a:schemeClr val="accent1"/>
+            </a:fillRef>
+            <a:effectRef idx="0">
+              <a:schemeClr val="accent1"/>
+            </a:effectRef>
+            <a:fontRef idx="minor">
+              <a:schemeClr val="lt1"/>
+            </a:fontRef>
+          </p:style>
+          <p:txBody>
+            <a:bodyPr rtlCol="0" anchor="ctr"/>
+            <a:lstStyle/>
+            <a:p>
+              <a:pPr algn="ctr"/>
+              <a:endParaRPr lang="en-US"/>
+            </a:p>
+          </p:txBody>
+        </p:sp>
+        <p:pic>
+          <p:nvPicPr>
+            <p:cNvPr id="14" name="Picture 13">
+              <a:extLst>
+                <a:ext uri="{FF2B5EF4-FFF2-40B4-BE49-F238E27FC236}">
+                  <a16:creationId xmlns:a16="http://schemas.microsoft.com/office/drawing/2014/main" id="{F2F01DBD-F451-CBBB-17EC-A22E39B51A39}"/>
+                </a:ext>
+              </a:extLst>
+            </p:cNvPr>
+            <p:cNvPicPr>
+              <a:picLocks noChangeAspect="1"/>
+            </p:cNvPicPr>
+            <p:nvPr/>
+          </p:nvPicPr>
+          <p:blipFill>
+            <a:blip r:embed="rId2"/>
+            <a:stretch>
+              <a:fillRect/>
+            </a:stretch>
+          </p:blipFill>
+          <p:spPr>
+            <a:xfrm>
+              <a:off x="2341019" y="1987826"/>
+              <a:ext cx="1648437" cy="1794965"/>
+            </a:xfrm>
+            <a:prstGeom prst="rect">
+              <a:avLst/>
+            </a:prstGeom>
+          </p:spPr>
+        </p:pic>
+        <p:pic>
+          <p:nvPicPr>
+            <p:cNvPr id="15" name="Content Placeholder 11">
+              <a:extLst>
+                <a:ext uri="{FF2B5EF4-FFF2-40B4-BE49-F238E27FC236}">
+                  <a16:creationId xmlns:a16="http://schemas.microsoft.com/office/drawing/2014/main" id="{4FA59A25-B56D-06C6-B0D1-AD928DD220C0}"/>
+                </a:ext>
+              </a:extLst>
+            </p:cNvPr>
+            <p:cNvPicPr>
+              <a:picLocks noChangeAspect="1"/>
+            </p:cNvPicPr>
+            <p:nvPr/>
+          </p:nvPicPr>
+          <p:blipFill>
+            <a:blip r:embed="rId3">
+              <a:extLst>
+                <a:ext uri="{28A0092B-C50C-407E-A947-70E740481C1C}">
+                  <a14:useLocalDpi xmlns:a14="http://schemas.microsoft.com/office/drawing/2010/main" val="0"/>
+                </a:ext>
+                <a:ext uri="{96DAC541-7B7A-43D3-8B79-37D633B846F1}">
+                  <asvg:svgBlip xmlns:asvg="http://schemas.microsoft.com/office/drawing/2016/SVG/main" r:embed="rId4"/>
+                </a:ext>
+              </a:extLst>
+            </a:blip>
+            <a:stretch>
+              <a:fillRect/>
+            </a:stretch>
+          </p:blipFill>
+          <p:spPr>
+            <a:xfrm>
+              <a:off x="3989456" y="1043015"/>
+              <a:ext cx="3684588" cy="3684588"/>
+            </a:xfrm>
+            <a:prstGeom prst="rect">
+              <a:avLst/>
+            </a:prstGeom>
+          </p:spPr>
+        </p:pic>
+        <p:sp>
+          <p:nvSpPr>
+            <p:cNvPr id="16" name="TextBox 15">
+              <a:extLst>
+                <a:ext uri="{FF2B5EF4-FFF2-40B4-BE49-F238E27FC236}">
+                  <a16:creationId xmlns:a16="http://schemas.microsoft.com/office/drawing/2014/main" id="{40423540-5F25-86EA-5AF8-B3566BA34C59}"/>
+                </a:ext>
+              </a:extLst>
+            </p:cNvPr>
+            <p:cNvSpPr txBox="1"/>
+            <p:nvPr/>
+          </p:nvSpPr>
+          <p:spPr>
+            <a:xfrm>
+              <a:off x="3875381" y="3946670"/>
+              <a:ext cx="1956369" cy="369332"/>
+            </a:xfrm>
+            <a:prstGeom prst="rect">
+              <a:avLst/>
+            </a:prstGeom>
+            <a:noFill/>
+          </p:spPr>
+          <p:txBody>
+            <a:bodyPr wrap="none" rtlCol="0">
+              <a:spAutoFit/>
+            </a:bodyPr>
+            <a:lstStyle/>
+            <a:p>
+              <a:r>
+                <a:rPr lang="fr-FR" dirty="0"/>
+                <a:t>Etape 2: Utilisation</a:t>
+              </a:r>
+            </a:p>
+          </p:txBody>
+        </p:sp>
+      </p:grpSp>
+      <p:sp>
+        <p:nvSpPr>
+          <p:cNvPr id="2" name="Title 1">
+            <a:extLst>
+              <a:ext uri="{FF2B5EF4-FFF2-40B4-BE49-F238E27FC236}">
+                <a16:creationId xmlns:a16="http://schemas.microsoft.com/office/drawing/2014/main" id="{33FEFC03-F492-A562-2068-0C457A022C6B}"/>
+              </a:ext>
+            </a:extLst>
+          </p:cNvPr>
+          <p:cNvSpPr>
+            <a:spLocks noGrp="1"/>
+          </p:cNvSpPr>
+          <p:nvPr>
+            <p:ph type="title"/>
+          </p:nvPr>
+        </p:nvSpPr>
+        <p:spPr>
+          <a:xfrm>
+            <a:off x="838200" y="5189"/>
+            <a:ext cx="10515600" cy="1325563"/>
+          </a:xfrm>
+        </p:spPr>
+        <p:txBody>
+          <a:bodyPr/>
+          <a:lstStyle/>
+          <a:p>
+            <a:r>
+              <a:rPr lang="fr-FR" dirty="0"/>
+              <a:t>L’apprentissage automatique</a:t>
+            </a:r>
+          </a:p>
+        </p:txBody>
+      </p:sp>
+      <p:grpSp>
+        <p:nvGrpSpPr>
+          <p:cNvPr id="10" name="Group 9">
+            <a:extLst>
+              <a:ext uri="{FF2B5EF4-FFF2-40B4-BE49-F238E27FC236}">
+                <a16:creationId xmlns:a16="http://schemas.microsoft.com/office/drawing/2014/main" id="{2E8A95D9-A87B-8345-925B-58940232C440}"/>
+              </a:ext>
+            </a:extLst>
+          </p:cNvPr>
+          <p:cNvGrpSpPr/>
+          <p:nvPr/>
+        </p:nvGrpSpPr>
+        <p:grpSpPr>
+          <a:xfrm>
+            <a:off x="229437" y="897483"/>
+            <a:ext cx="6023113" cy="3684588"/>
+            <a:chOff x="1848678" y="1043015"/>
+            <a:chExt cx="6023113" cy="3684588"/>
+          </a:xfrm>
+        </p:grpSpPr>
+        <p:sp>
+          <p:nvSpPr>
+            <p:cNvPr id="8" name="Rectangle 7">
+              <a:extLst>
+                <a:ext uri="{FF2B5EF4-FFF2-40B4-BE49-F238E27FC236}">
+                  <a16:creationId xmlns:a16="http://schemas.microsoft.com/office/drawing/2014/main" id="{7B201F99-E307-27C8-8996-E79718A3F9F3}"/>
+                </a:ext>
+              </a:extLst>
+            </p:cNvPr>
+            <p:cNvSpPr/>
+            <p:nvPr/>
+          </p:nvSpPr>
+          <p:spPr>
+            <a:xfrm>
+              <a:off x="1848678" y="1500809"/>
+              <a:ext cx="6023113" cy="2882348"/>
+            </a:xfrm>
+            <a:prstGeom prst="rect">
+              <a:avLst/>
+            </a:prstGeom>
+            <a:solidFill>
+              <a:schemeClr val="accent1">
+                <a:lumMod val="20000"/>
+                <a:lumOff val="80000"/>
+              </a:schemeClr>
+            </a:solidFill>
+            <a:ln>
+              <a:noFill/>
+            </a:ln>
+          </p:spPr>
+          <p:style>
+            <a:lnRef idx="2">
+              <a:schemeClr val="accent1">
+                <a:shade val="15000"/>
+              </a:schemeClr>
+            </a:lnRef>
+            <a:fillRef idx="1">
+              <a:schemeClr val="accent1"/>
+            </a:fillRef>
+            <a:effectRef idx="0">
+              <a:schemeClr val="accent1"/>
+            </a:effectRef>
+            <a:fontRef idx="minor">
+              <a:schemeClr val="lt1"/>
+            </a:fontRef>
+          </p:style>
+          <p:txBody>
+            <a:bodyPr rtlCol="0" anchor="ctr"/>
+            <a:lstStyle/>
+            <a:p>
+              <a:pPr algn="ctr"/>
+              <a:endParaRPr lang="en-US"/>
+            </a:p>
+          </p:txBody>
+        </p:sp>
+        <p:pic>
+          <p:nvPicPr>
+            <p:cNvPr id="6" name="Picture 5">
+              <a:extLst>
+                <a:ext uri="{FF2B5EF4-FFF2-40B4-BE49-F238E27FC236}">
+                  <a16:creationId xmlns:a16="http://schemas.microsoft.com/office/drawing/2014/main" id="{D45B05B1-2715-43A4-B78F-481377B4DED9}"/>
+                </a:ext>
+              </a:extLst>
+            </p:cNvPr>
+            <p:cNvPicPr>
+              <a:picLocks noChangeAspect="1"/>
+            </p:cNvPicPr>
+            <p:nvPr/>
+          </p:nvPicPr>
+          <p:blipFill>
+            <a:blip r:embed="rId2"/>
+            <a:stretch>
+              <a:fillRect/>
+            </a:stretch>
+          </p:blipFill>
+          <p:spPr>
+            <a:xfrm>
+              <a:off x="2341019" y="1987826"/>
+              <a:ext cx="1648437" cy="1794965"/>
+            </a:xfrm>
+            <a:prstGeom prst="rect">
+              <a:avLst/>
+            </a:prstGeom>
+          </p:spPr>
+        </p:pic>
+        <p:pic>
+          <p:nvPicPr>
+            <p:cNvPr id="7" name="Content Placeholder 11">
+              <a:extLst>
+                <a:ext uri="{FF2B5EF4-FFF2-40B4-BE49-F238E27FC236}">
+                  <a16:creationId xmlns:a16="http://schemas.microsoft.com/office/drawing/2014/main" id="{F7868538-4F4C-725B-5E7F-82075140D289}"/>
+                </a:ext>
+              </a:extLst>
+            </p:cNvPr>
+            <p:cNvPicPr>
+              <a:picLocks noChangeAspect="1"/>
+            </p:cNvPicPr>
+            <p:nvPr/>
+          </p:nvPicPr>
+          <p:blipFill>
+            <a:blip r:embed="rId3">
+              <a:extLst>
+                <a:ext uri="{28A0092B-C50C-407E-A947-70E740481C1C}">
+                  <a14:useLocalDpi xmlns:a14="http://schemas.microsoft.com/office/drawing/2010/main" val="0"/>
+                </a:ext>
+                <a:ext uri="{96DAC541-7B7A-43D3-8B79-37D633B846F1}">
+                  <asvg:svgBlip xmlns:asvg="http://schemas.microsoft.com/office/drawing/2016/SVG/main" r:embed="rId4"/>
+                </a:ext>
+              </a:extLst>
+            </a:blip>
+            <a:stretch>
+              <a:fillRect/>
+            </a:stretch>
+          </p:blipFill>
+          <p:spPr>
+            <a:xfrm>
+              <a:off x="3989456" y="1043015"/>
+              <a:ext cx="3684588" cy="3684588"/>
+            </a:xfrm>
+            <a:prstGeom prst="rect">
+              <a:avLst/>
+            </a:prstGeom>
+          </p:spPr>
+        </p:pic>
+        <p:sp>
+          <p:nvSpPr>
+            <p:cNvPr id="9" name="TextBox 8">
+              <a:extLst>
+                <a:ext uri="{FF2B5EF4-FFF2-40B4-BE49-F238E27FC236}">
+                  <a16:creationId xmlns:a16="http://schemas.microsoft.com/office/drawing/2014/main" id="{D88F95EF-F350-4DC1-72B9-5BC289948C6A}"/>
+                </a:ext>
+              </a:extLst>
+            </p:cNvPr>
+            <p:cNvSpPr txBox="1"/>
+            <p:nvPr/>
+          </p:nvSpPr>
+          <p:spPr>
+            <a:xfrm>
+              <a:off x="3693761" y="3959988"/>
+              <a:ext cx="2332946" cy="369332"/>
+            </a:xfrm>
+            <a:prstGeom prst="rect">
+              <a:avLst/>
+            </a:prstGeom>
+            <a:noFill/>
+          </p:spPr>
+          <p:txBody>
+            <a:bodyPr wrap="none" rtlCol="0">
+              <a:spAutoFit/>
+            </a:bodyPr>
+            <a:lstStyle/>
+            <a:p>
+              <a:r>
+                <a:rPr lang="fr-FR" dirty="0"/>
+                <a:t>Etape 1: Apprentissage</a:t>
+              </a:r>
+            </a:p>
+          </p:txBody>
+        </p:sp>
+      </p:grpSp>
+    </p:spTree>
+    <p:extLst>
+      <p:ext uri="{BB962C8B-B14F-4D97-AF65-F5344CB8AC3E}">
+        <p14:creationId xmlns:p14="http://schemas.microsoft.com/office/powerpoint/2010/main" val="1384342250"/>
       </p:ext>
     </p:extLst>
   </p:cSld>

</xml_diff>

<commit_message>
added emphasis on machine param
</commit_message>
<xml_diff>
--- a/slides.pptx
+++ b/slides.pptx
@@ -4456,6 +4456,68 @@
           </a:prstGeom>
         </p:spPr>
       </p:pic>
+      <p:sp>
+        <p:nvSpPr>
+          <p:cNvPr id="15" name="Speech Bubble: Rectangle 14">
+            <a:extLst>
+              <a:ext uri="{FF2B5EF4-FFF2-40B4-BE49-F238E27FC236}">
+                <a16:creationId xmlns:a16="http://schemas.microsoft.com/office/drawing/2014/main" id="{B8B2C5AB-C150-FAF0-1621-A4796E338CF5}"/>
+              </a:ext>
+            </a:extLst>
+          </p:cNvPr>
+          <p:cNvSpPr/>
+          <p:nvPr/>
+        </p:nvSpPr>
+        <p:spPr>
+          <a:xfrm>
+            <a:off x="3781425" y="5024437"/>
+            <a:ext cx="2847975" cy="1247775"/>
+          </a:xfrm>
+          <a:prstGeom prst="wedgeRectCallout">
+            <a:avLst>
+              <a:gd name="adj1" fmla="val -19564"/>
+              <a:gd name="adj2" fmla="val -116675"/>
+            </a:avLst>
+          </a:prstGeom>
+          <a:noFill/>
+          <a:ln w="76200">
+            <a:solidFill>
+              <a:srgbClr val="C00000"/>
+            </a:solidFill>
+          </a:ln>
+        </p:spPr>
+        <p:style>
+          <a:lnRef idx="2">
+            <a:schemeClr val="accent1">
+              <a:shade val="15000"/>
+            </a:schemeClr>
+          </a:lnRef>
+          <a:fillRef idx="1">
+            <a:schemeClr val="accent1"/>
+          </a:fillRef>
+          <a:effectRef idx="0">
+            <a:schemeClr val="accent1"/>
+          </a:effectRef>
+          <a:fontRef idx="minor">
+            <a:schemeClr val="lt1"/>
+          </a:fontRef>
+        </p:style>
+        <p:txBody>
+          <a:bodyPr rtlCol="0" anchor="ctr"/>
+          <a:lstStyle/>
+          <a:p>
+            <a:pPr algn="ctr"/>
+            <a:r>
+              <a:rPr lang="fr-FR" sz="3200" b="1" dirty="0">
+                <a:solidFill>
+                  <a:srgbClr val="C00000"/>
+                </a:solidFill>
+              </a:rPr>
+              <a:t>Paramètres de la machine</a:t>
+            </a:r>
+          </a:p>
+        </p:txBody>
+      </p:sp>
     </p:spTree>
     <p:extLst>
       <p:ext uri="{BB962C8B-B14F-4D97-AF65-F5344CB8AC3E}">
@@ -4730,6 +4792,59 @@
                       </p:childTnLst>
                     </p:cTn>
                   </p:par>
+                  <p:par>
+                    <p:cTn id="27" fill="hold">
+                      <p:stCondLst>
+                        <p:cond delay="indefinite"/>
+                      </p:stCondLst>
+                      <p:childTnLst>
+                        <p:par>
+                          <p:cTn id="28" fill="hold">
+                            <p:stCondLst>
+                              <p:cond delay="0"/>
+                            </p:stCondLst>
+                            <p:childTnLst>
+                              <p:par>
+                                <p:cTn id="29" presetID="10" presetClass="entr" presetSubtype="0" fill="hold" grpId="0" nodeType="clickEffect">
+                                  <p:stCondLst>
+                                    <p:cond delay="0"/>
+                                  </p:stCondLst>
+                                  <p:childTnLst>
+                                    <p:set>
+                                      <p:cBhvr>
+                                        <p:cTn id="30" dur="1" fill="hold">
+                                          <p:stCondLst>
+                                            <p:cond delay="0"/>
+                                          </p:stCondLst>
+                                        </p:cTn>
+                                        <p:tgtEl>
+                                          <p:spTgt spid="15"/>
+                                        </p:tgtEl>
+                                        <p:attrNameLst>
+                                          <p:attrName>style.visibility</p:attrName>
+                                        </p:attrNameLst>
+                                      </p:cBhvr>
+                                      <p:to>
+                                        <p:strVal val="visible"/>
+                                      </p:to>
+                                    </p:set>
+                                    <p:animEffect transition="in" filter="fade">
+                                      <p:cBhvr>
+                                        <p:cTn id="31" dur="500"/>
+                                        <p:tgtEl>
+                                          <p:spTgt spid="15"/>
+                                        </p:tgtEl>
+                                      </p:cBhvr>
+                                    </p:animEffect>
+                                  </p:childTnLst>
+                                </p:cTn>
+                              </p:par>
+                            </p:childTnLst>
+                          </p:cTn>
+                        </p:par>
+                      </p:childTnLst>
+                    </p:cTn>
+                  </p:par>
                 </p:childTnLst>
               </p:cTn>
               <p:prevCondLst>
@@ -4755,6 +4870,7 @@
       <p:bldP spid="6" grpId="0" animBg="1"/>
       <p:bldP spid="7" grpId="0" animBg="1"/>
       <p:bldP spid="8" grpId="0" animBg="1"/>
+      <p:bldP spid="15" grpId="0" animBg="1"/>
     </p:bldLst>
   </p:timing>
 </p:sld>
@@ -4800,7 +4916,7 @@
           <a:p>
             <a:r>
               <a:rPr lang="fr-FR" dirty="0"/>
-              <a:t>Trouver les règles à appliquer</a:t>
+              <a:t>Trouver les bon paramètres</a:t>
             </a:r>
             <a:endParaRPr lang="en-US" dirty="0"/>
           </a:p>

</xml_diff>

<commit_message>
added QR code black bos slide
</commit_message>
<xml_diff>
--- a/slides.pptx
+++ b/slides.pptx
@@ -5,7 +5,7 @@
     <p:sldMasterId id="2147483648" r:id="rId1"/>
   </p:sldMasterIdLst>
   <p:notesMasterIdLst>
-    <p:notesMasterId r:id="rId16"/>
+    <p:notesMasterId r:id="rId17"/>
   </p:notesMasterIdLst>
   <p:sldIdLst>
     <p:sldId id="256" r:id="rId2"/>
@@ -20,8 +20,9 @@
     <p:sldId id="266" r:id="rId11"/>
     <p:sldId id="268" r:id="rId12"/>
     <p:sldId id="269" r:id="rId13"/>
-    <p:sldId id="270" r:id="rId14"/>
-    <p:sldId id="267" r:id="rId15"/>
+    <p:sldId id="271" r:id="rId14"/>
+    <p:sldId id="270" r:id="rId15"/>
+    <p:sldId id="267" r:id="rId16"/>
   </p:sldIdLst>
   <p:sldSz cx="12192000" cy="6858000"/>
   <p:notesSz cx="6858000" cy="9144000"/>
@@ -6320,6 +6321,148 @@
           <p:cNvPr id="2" name="Title 1">
             <a:extLst>
               <a:ext uri="{FF2B5EF4-FFF2-40B4-BE49-F238E27FC236}">
+                <a16:creationId xmlns:a16="http://schemas.microsoft.com/office/drawing/2014/main" id="{29BB1EE7-65B0-AF50-9E3A-87E23E115459}"/>
+              </a:ext>
+            </a:extLst>
+          </p:cNvPr>
+          <p:cNvSpPr>
+            <a:spLocks noGrp="1"/>
+          </p:cNvSpPr>
+          <p:nvPr>
+            <p:ph type="title"/>
+          </p:nvPr>
+        </p:nvSpPr>
+        <p:spPr/>
+        <p:txBody>
+          <a:bodyPr/>
+          <a:lstStyle/>
+          <a:p>
+            <a:r>
+              <a:rPr lang="fr-FR" dirty="0"/>
+              <a:t>A vous d’essayer!</a:t>
+            </a:r>
+          </a:p>
+        </p:txBody>
+      </p:sp>
+      <p:pic>
+        <p:nvPicPr>
+          <p:cNvPr id="5" name="Content Placeholder 4">
+            <a:extLst>
+              <a:ext uri="{FF2B5EF4-FFF2-40B4-BE49-F238E27FC236}">
+                <a16:creationId xmlns:a16="http://schemas.microsoft.com/office/drawing/2014/main" id="{615CE2F8-C690-2BB7-74E6-7B1334B1AADD}"/>
+              </a:ext>
+            </a:extLst>
+          </p:cNvPr>
+          <p:cNvPicPr>
+            <a:picLocks noGrp="1" noChangeAspect="1"/>
+          </p:cNvPicPr>
+          <p:nvPr>
+            <p:ph idx="1"/>
+          </p:nvPr>
+        </p:nvPicPr>
+        <p:blipFill>
+          <a:blip r:embed="rId2"/>
+          <a:stretch>
+            <a:fillRect/>
+          </a:stretch>
+        </p:blipFill>
+        <p:spPr>
+          <a:xfrm>
+            <a:off x="4061791" y="1967085"/>
+            <a:ext cx="4068418" cy="4068418"/>
+          </a:xfrm>
+        </p:spPr>
+      </p:pic>
+      <p:sp>
+        <p:nvSpPr>
+          <p:cNvPr id="6" name="TextBox 5">
+            <a:extLst>
+              <a:ext uri="{FF2B5EF4-FFF2-40B4-BE49-F238E27FC236}">
+                <a16:creationId xmlns:a16="http://schemas.microsoft.com/office/drawing/2014/main" id="{3365CD69-8653-ACB5-0A69-42EE9E7D6EA8}"/>
+              </a:ext>
+            </a:extLst>
+          </p:cNvPr>
+          <p:cNvSpPr txBox="1"/>
+          <p:nvPr/>
+        </p:nvSpPr>
+        <p:spPr>
+          <a:xfrm>
+            <a:off x="3268239" y="6162261"/>
+            <a:ext cx="5655523" cy="369332"/>
+          </a:xfrm>
+          <a:prstGeom prst="rect">
+            <a:avLst/>
+          </a:prstGeom>
+          <a:noFill/>
+        </p:spPr>
+        <p:txBody>
+          <a:bodyPr wrap="none" rtlCol="0">
+            <a:spAutoFit/>
+          </a:bodyPr>
+          <a:lstStyle/>
+          <a:p>
+            <a:r>
+              <a:rPr lang="en-US" i="1" dirty="0">
+                <a:solidFill>
+                  <a:schemeClr val="bg1">
+                    <a:lumMod val="50000"/>
+                  </a:schemeClr>
+                </a:solidFill>
+                <a:hlinkClick r:id="rId3">
+                  <a:extLst>
+                    <a:ext uri="{A12FA001-AC4F-418D-AE19-62706E023703}">
+                      <ahyp:hlinkClr xmlns:ahyp="http://schemas.microsoft.com/office/drawing/2018/hyperlinkcolor" val="tx"/>
+                    </a:ext>
+                  </a:extLst>
+                </a:hlinkClick>
+              </a:rPr>
+              <a:t>https://pauldubois98.github.io/AI-MythsReality/BlackBox</a:t>
+            </a:r>
+            <a:endParaRPr lang="en-US" i="1" dirty="0">
+              <a:solidFill>
+                <a:schemeClr val="bg1">
+                  <a:lumMod val="50000"/>
+                </a:schemeClr>
+              </a:solidFill>
+            </a:endParaRPr>
+          </a:p>
+        </p:txBody>
+      </p:sp>
+    </p:spTree>
+    <p:extLst>
+      <p:ext uri="{BB962C8B-B14F-4D97-AF65-F5344CB8AC3E}">
+        <p14:creationId xmlns:p14="http://schemas.microsoft.com/office/powerpoint/2010/main" val="215089395"/>
+      </p:ext>
+    </p:extLst>
+  </p:cSld>
+  <p:clrMapOvr>
+    <a:masterClrMapping/>
+  </p:clrMapOvr>
+</p:sld>
+</file>
+
+<file path=ppt/slides/slide14.xml><?xml version="1.0" encoding="utf-8"?>
+<p:sld xmlns:a="http://schemas.openxmlformats.org/drawingml/2006/main" xmlns:r="http://schemas.openxmlformats.org/officeDocument/2006/relationships" xmlns:p="http://schemas.openxmlformats.org/presentationml/2006/main">
+  <p:cSld>
+    <p:spTree>
+      <p:nvGrpSpPr>
+        <p:cNvPr id="1" name=""/>
+        <p:cNvGrpSpPr/>
+        <p:nvPr/>
+      </p:nvGrpSpPr>
+      <p:grpSpPr>
+        <a:xfrm>
+          <a:off x="0" y="0"/>
+          <a:ext cx="0" cy="0"/>
+          <a:chOff x="0" y="0"/>
+          <a:chExt cx="0" cy="0"/>
+        </a:xfrm>
+      </p:grpSpPr>
+      <p:sp>
+        <p:nvSpPr>
+          <p:cNvPr id="2" name="Title 1">
+            <a:extLst>
+              <a:ext uri="{FF2B5EF4-FFF2-40B4-BE49-F238E27FC236}">
                 <a16:creationId xmlns:a16="http://schemas.microsoft.com/office/drawing/2014/main" id="{4DD5AE43-0497-4618-B452-770BAE7E2649}"/>
               </a:ext>
             </a:extLst>
@@ -6959,7 +7102,7 @@
 </p:sld>
 </file>
 
-<file path=ppt/slides/slide14.xml><?xml version="1.0" encoding="utf-8"?>
+<file path=ppt/slides/slide15.xml><?xml version="1.0" encoding="utf-8"?>
 <p:sld xmlns:a="http://schemas.openxmlformats.org/drawingml/2006/main" xmlns:r="http://schemas.openxmlformats.org/officeDocument/2006/relationships" xmlns:p="http://schemas.openxmlformats.org/presentationml/2006/main">
   <p:cSld>
     <p:spTree>

</xml_diff>

<commit_message>
added fake to DL recap' slide
</commit_message>
<xml_diff>
--- a/slides.pptx
+++ b/slides.pptx
@@ -5,7 +5,7 @@
     <p:sldMasterId id="2147483648" r:id="rId1"/>
   </p:sldMasterIdLst>
   <p:notesMasterIdLst>
-    <p:notesMasterId r:id="rId17"/>
+    <p:notesMasterId r:id="rId18"/>
   </p:notesMasterIdLst>
   <p:sldIdLst>
     <p:sldId id="256" r:id="rId2"/>
@@ -23,6 +23,7 @@
     <p:sldId id="271" r:id="rId14"/>
     <p:sldId id="270" r:id="rId15"/>
     <p:sldId id="267" r:id="rId16"/>
+    <p:sldId id="272" r:id="rId17"/>
   </p:sldIdLst>
   <p:sldSz cx="12192000" cy="6858000"/>
   <p:notesSz cx="6858000" cy="9144000"/>
@@ -7477,10 +7478,231 @@
           </p:txBody>
         </p:sp>
       </p:grpSp>
+      <p:sp>
+        <p:nvSpPr>
+          <p:cNvPr id="18" name="Oval 17">
+            <a:extLst>
+              <a:ext uri="{FF2B5EF4-FFF2-40B4-BE49-F238E27FC236}">
+                <a16:creationId xmlns:a16="http://schemas.microsoft.com/office/drawing/2014/main" id="{9DF5FF8D-F75A-FEFC-56A3-14484CE002A3}"/>
+              </a:ext>
+            </a:extLst>
+          </p:cNvPr>
+          <p:cNvSpPr/>
+          <p:nvPr/>
+        </p:nvSpPr>
+        <p:spPr>
+          <a:xfrm>
+            <a:off x="4765267" y="2229641"/>
+            <a:ext cx="3616326" cy="3616326"/>
+          </a:xfrm>
+          <a:prstGeom prst="ellipse">
+            <a:avLst/>
+          </a:prstGeom>
+          <a:solidFill>
+            <a:srgbClr val="C00000"/>
+          </a:solidFill>
+          <a:ln>
+            <a:noFill/>
+          </a:ln>
+        </p:spPr>
+        <p:style>
+          <a:lnRef idx="2">
+            <a:schemeClr val="accent2">
+              <a:shade val="15000"/>
+            </a:schemeClr>
+          </a:lnRef>
+          <a:fillRef idx="1">
+            <a:schemeClr val="accent2"/>
+          </a:fillRef>
+          <a:effectRef idx="0">
+            <a:schemeClr val="accent2"/>
+          </a:effectRef>
+          <a:fontRef idx="minor">
+            <a:schemeClr val="lt1"/>
+          </a:fontRef>
+        </p:style>
+        <p:txBody>
+          <a:bodyPr rtlCol="0" anchor="ctr"/>
+          <a:lstStyle/>
+          <a:p>
+            <a:pPr algn="ctr"/>
+            <a:r>
+              <a:rPr lang="en-US" sz="8000" b="1" dirty="0"/>
+              <a:t>Fake!</a:t>
+            </a:r>
+          </a:p>
+        </p:txBody>
+      </p:sp>
     </p:spTree>
     <p:extLst>
       <p:ext uri="{BB962C8B-B14F-4D97-AF65-F5344CB8AC3E}">
         <p14:creationId xmlns:p14="http://schemas.microsoft.com/office/powerpoint/2010/main" val="1384342250"/>
+      </p:ext>
+    </p:extLst>
+  </p:cSld>
+  <p:clrMapOvr>
+    <a:masterClrMapping/>
+  </p:clrMapOvr>
+  <p:timing>
+    <p:tnLst>
+      <p:par>
+        <p:cTn id="1" dur="indefinite" restart="never" nodeType="tmRoot">
+          <p:childTnLst>
+            <p:seq concurrent="1" nextAc="seek">
+              <p:cTn id="2" dur="indefinite" nodeType="mainSeq">
+                <p:childTnLst>
+                  <p:par>
+                    <p:cTn id="3" fill="hold">
+                      <p:stCondLst>
+                        <p:cond delay="indefinite"/>
+                      </p:stCondLst>
+                      <p:childTnLst>
+                        <p:par>
+                          <p:cTn id="4" fill="hold">
+                            <p:stCondLst>
+                              <p:cond delay="0"/>
+                            </p:stCondLst>
+                            <p:childTnLst>
+                              <p:par>
+                                <p:cTn id="5" presetID="10" presetClass="entr" presetSubtype="0" fill="hold" grpId="0" nodeType="clickEffect">
+                                  <p:stCondLst>
+                                    <p:cond delay="0"/>
+                                  </p:stCondLst>
+                                  <p:childTnLst>
+                                    <p:set>
+                                      <p:cBhvr>
+                                        <p:cTn id="6" dur="1" fill="hold">
+                                          <p:stCondLst>
+                                            <p:cond delay="0"/>
+                                          </p:stCondLst>
+                                        </p:cTn>
+                                        <p:tgtEl>
+                                          <p:spTgt spid="18"/>
+                                        </p:tgtEl>
+                                        <p:attrNameLst>
+                                          <p:attrName>style.visibility</p:attrName>
+                                        </p:attrNameLst>
+                                      </p:cBhvr>
+                                      <p:to>
+                                        <p:strVal val="visible"/>
+                                      </p:to>
+                                    </p:set>
+                                    <p:animEffect transition="in" filter="fade">
+                                      <p:cBhvr>
+                                        <p:cTn id="7" dur="500"/>
+                                        <p:tgtEl>
+                                          <p:spTgt spid="18"/>
+                                        </p:tgtEl>
+                                      </p:cBhvr>
+                                    </p:animEffect>
+                                  </p:childTnLst>
+                                </p:cTn>
+                              </p:par>
+                            </p:childTnLst>
+                          </p:cTn>
+                        </p:par>
+                      </p:childTnLst>
+                    </p:cTn>
+                  </p:par>
+                </p:childTnLst>
+              </p:cTn>
+              <p:prevCondLst>
+                <p:cond evt="onPrev" delay="0">
+                  <p:tgtEl>
+                    <p:sldTgt/>
+                  </p:tgtEl>
+                </p:cond>
+              </p:prevCondLst>
+              <p:nextCondLst>
+                <p:cond evt="onNext" delay="0">
+                  <p:tgtEl>
+                    <p:sldTgt/>
+                  </p:tgtEl>
+                </p:cond>
+              </p:nextCondLst>
+            </p:seq>
+          </p:childTnLst>
+        </p:cTn>
+      </p:par>
+    </p:tnLst>
+    <p:bldLst>
+      <p:bldP spid="18" grpId="0" animBg="1"/>
+    </p:bldLst>
+  </p:timing>
+</p:sld>
+</file>
+
+<file path=ppt/slides/slide16.xml><?xml version="1.0" encoding="utf-8"?>
+<p:sld xmlns:a="http://schemas.openxmlformats.org/drawingml/2006/main" xmlns:r="http://schemas.openxmlformats.org/officeDocument/2006/relationships" xmlns:p="http://schemas.openxmlformats.org/presentationml/2006/main">
+  <p:cSld>
+    <p:spTree>
+      <p:nvGrpSpPr>
+        <p:cNvPr id="1" name=""/>
+        <p:cNvGrpSpPr/>
+        <p:nvPr/>
+      </p:nvGrpSpPr>
+      <p:grpSpPr>
+        <a:xfrm>
+          <a:off x="0" y="0"/>
+          <a:ext cx="0" cy="0"/>
+          <a:chOff x="0" y="0"/>
+          <a:chExt cx="0" cy="0"/>
+        </a:xfrm>
+      </p:grpSpPr>
+      <p:sp>
+        <p:nvSpPr>
+          <p:cNvPr id="2" name="Title 1">
+            <a:extLst>
+              <a:ext uri="{FF2B5EF4-FFF2-40B4-BE49-F238E27FC236}">
+                <a16:creationId xmlns:a16="http://schemas.microsoft.com/office/drawing/2014/main" id="{D74FCEA3-FFFA-FB9C-6458-16F9AEE9E65A}"/>
+              </a:ext>
+            </a:extLst>
+          </p:cNvPr>
+          <p:cNvSpPr>
+            <a:spLocks noGrp="1"/>
+          </p:cNvSpPr>
+          <p:nvPr>
+            <p:ph type="title"/>
+          </p:nvPr>
+        </p:nvSpPr>
+        <p:spPr/>
+        <p:txBody>
+          <a:bodyPr/>
+          <a:lstStyle/>
+          <a:p>
+            <a:endParaRPr lang="en-US" dirty="0"/>
+          </a:p>
+        </p:txBody>
+      </p:sp>
+      <p:sp>
+        <p:nvSpPr>
+          <p:cNvPr id="3" name="Content Placeholder 2">
+            <a:extLst>
+              <a:ext uri="{FF2B5EF4-FFF2-40B4-BE49-F238E27FC236}">
+                <a16:creationId xmlns:a16="http://schemas.microsoft.com/office/drawing/2014/main" id="{B52A09DC-2717-34CE-4E56-F75B603321E4}"/>
+              </a:ext>
+            </a:extLst>
+          </p:cNvPr>
+          <p:cNvSpPr>
+            <a:spLocks noGrp="1"/>
+          </p:cNvSpPr>
+          <p:nvPr>
+            <p:ph idx="1"/>
+          </p:nvPr>
+        </p:nvSpPr>
+        <p:spPr/>
+        <p:txBody>
+          <a:bodyPr/>
+          <a:lstStyle/>
+          <a:p>
+            <a:endParaRPr lang="en-US" dirty="0"/>
+          </a:p>
+        </p:txBody>
+      </p:sp>
+    </p:spTree>
+    <p:extLst>
+      <p:ext uri="{BB962C8B-B14F-4D97-AF65-F5344CB8AC3E}">
+        <p14:creationId xmlns:p14="http://schemas.microsoft.com/office/powerpoint/2010/main" val="221738528"/>
       </p:ext>
     </p:extLst>
   </p:cSld>

</xml_diff>

<commit_message>
classical algo comp slide
</commit_message>
<xml_diff>
--- a/slides.pptx
+++ b/slides.pptx
@@ -7670,32 +7670,94 @@
           <a:bodyPr/>
           <a:lstStyle/>
           <a:p>
-            <a:endParaRPr lang="en-US" dirty="0"/>
+            <a:r>
+              <a:rPr lang="fr-FR" dirty="0"/>
+              <a:t>Paramétrage d’un algorithme classique</a:t>
+            </a:r>
           </a:p>
         </p:txBody>
       </p:sp>
-      <p:sp>
-        <p:nvSpPr>
-          <p:cNvPr id="3" name="Content Placeholder 2">
+      <p:pic>
+        <p:nvPicPr>
+          <p:cNvPr id="5" name="Content Placeholder 4">
             <a:extLst>
               <a:ext uri="{FF2B5EF4-FFF2-40B4-BE49-F238E27FC236}">
-                <a16:creationId xmlns:a16="http://schemas.microsoft.com/office/drawing/2014/main" id="{B52A09DC-2717-34CE-4E56-F75B603321E4}"/>
+                <a16:creationId xmlns:a16="http://schemas.microsoft.com/office/drawing/2014/main" id="{5C572951-B173-6665-9223-2328F1D869F0}"/>
               </a:ext>
             </a:extLst>
           </p:cNvPr>
-          <p:cNvSpPr>
-            <a:spLocks noGrp="1"/>
-          </p:cNvSpPr>
+          <p:cNvPicPr>
+            <a:picLocks noGrp="1" noChangeAspect="1"/>
+          </p:cNvPicPr>
           <p:nvPr>
             <p:ph idx="1"/>
           </p:nvPr>
+        </p:nvPicPr>
+        <p:blipFill>
+          <a:blip r:embed="rId2"/>
+          <a:stretch>
+            <a:fillRect/>
+          </a:stretch>
+        </p:blipFill>
+        <p:spPr>
+          <a:xfrm>
+            <a:off x="4061460" y="1919288"/>
+            <a:ext cx="4069080" cy="4069080"/>
+          </a:xfrm>
+        </p:spPr>
+      </p:pic>
+      <p:sp>
+        <p:nvSpPr>
+          <p:cNvPr id="6" name="TextBox 5">
+            <a:extLst>
+              <a:ext uri="{FF2B5EF4-FFF2-40B4-BE49-F238E27FC236}">
+                <a16:creationId xmlns:a16="http://schemas.microsoft.com/office/drawing/2014/main" id="{AF6E1D82-67D8-E5C8-6E7E-A8719EDBF34C}"/>
+              </a:ext>
+            </a:extLst>
+          </p:cNvPr>
+          <p:cNvSpPr txBox="1"/>
+          <p:nvPr/>
         </p:nvSpPr>
-        <p:spPr/>
+        <p:spPr>
+          <a:xfrm>
+            <a:off x="3268239" y="6162261"/>
+            <a:ext cx="5655523" cy="369332"/>
+          </a:xfrm>
+          <a:prstGeom prst="rect">
+            <a:avLst/>
+          </a:prstGeom>
+          <a:noFill/>
+        </p:spPr>
         <p:txBody>
-          <a:bodyPr/>
+          <a:bodyPr wrap="none" rtlCol="0">
+            <a:spAutoFit/>
+          </a:bodyPr>
           <a:lstStyle/>
           <a:p>
-            <a:endParaRPr lang="en-US" dirty="0"/>
+            <a:r>
+              <a:rPr lang="en-US" i="1" dirty="0">
+                <a:solidFill>
+                  <a:schemeClr val="bg1">
+                    <a:lumMod val="50000"/>
+                  </a:schemeClr>
+                </a:solidFill>
+                <a:hlinkClick r:id="rId3">
+                  <a:extLst>
+                    <a:ext uri="{A12FA001-AC4F-418D-AE19-62706E023703}">
+                      <ahyp:hlinkClr xmlns:ahyp="http://schemas.microsoft.com/office/drawing/2018/hyperlinkcolor" val="tx"/>
+                    </a:ext>
+                  </a:extLst>
+                </a:hlinkClick>
+              </a:rPr>
+              <a:t>https://pauldubois98.github.io/AI-MythsReality/WhiteBox</a:t>
+            </a:r>
+            <a:endParaRPr lang="en-US" i="1" dirty="0">
+              <a:solidFill>
+                <a:schemeClr val="bg1">
+                  <a:lumMod val="50000"/>
+                </a:schemeClr>
+              </a:solidFill>
+            </a:endParaRPr>
           </a:p>
         </p:txBody>
       </p:sp>

</xml_diff>

<commit_message>
added how to create complex machines
</commit_message>
<xml_diff>
--- a/slides.pptx
+++ b/slides.pptx
@@ -5,7 +5,7 @@
     <p:sldMasterId id="2147483648" r:id="rId1"/>
   </p:sldMasterIdLst>
   <p:notesMasterIdLst>
-    <p:notesMasterId r:id="rId18"/>
+    <p:notesMasterId r:id="rId19"/>
   </p:notesMasterIdLst>
   <p:sldIdLst>
     <p:sldId id="256" r:id="rId2"/>
@@ -24,6 +24,7 @@
     <p:sldId id="270" r:id="rId15"/>
     <p:sldId id="267" r:id="rId16"/>
     <p:sldId id="272" r:id="rId17"/>
+    <p:sldId id="273" r:id="rId18"/>
   </p:sldIdLst>
   <p:sldSz cx="12192000" cy="6858000"/>
   <p:notesSz cx="6858000" cy="9144000"/>
@@ -7765,6 +7766,1202 @@
     <p:extLst>
       <p:ext uri="{BB962C8B-B14F-4D97-AF65-F5344CB8AC3E}">
         <p14:creationId xmlns:p14="http://schemas.microsoft.com/office/powerpoint/2010/main" val="221738528"/>
+      </p:ext>
+    </p:extLst>
+  </p:cSld>
+  <p:clrMapOvr>
+    <a:masterClrMapping/>
+  </p:clrMapOvr>
+</p:sld>
+</file>
+
+<file path=ppt/slides/slide17.xml><?xml version="1.0" encoding="utf-8"?>
+<p:sld xmlns:a="http://schemas.openxmlformats.org/drawingml/2006/main" xmlns:r="http://schemas.openxmlformats.org/officeDocument/2006/relationships" xmlns:p="http://schemas.openxmlformats.org/presentationml/2006/main">
+  <p:cSld>
+    <p:bg>
+      <p:bgPr>
+        <a:solidFill>
+          <a:schemeClr val="bg1"/>
+        </a:solidFill>
+        <a:effectLst/>
+      </p:bgPr>
+    </p:bg>
+    <p:spTree>
+      <p:nvGrpSpPr>
+        <p:cNvPr id="1" name=""/>
+        <p:cNvGrpSpPr/>
+        <p:nvPr/>
+      </p:nvGrpSpPr>
+      <p:grpSpPr>
+        <a:xfrm>
+          <a:off x="0" y="0"/>
+          <a:ext cx="0" cy="0"/>
+          <a:chOff x="0" y="0"/>
+          <a:chExt cx="0" cy="0"/>
+        </a:xfrm>
+      </p:grpSpPr>
+      <p:sp useBgFill="1">
+        <p:nvSpPr>
+          <p:cNvPr id="10" name="Rectangle 9">
+            <a:extLst>
+              <a:ext uri="{FF2B5EF4-FFF2-40B4-BE49-F238E27FC236}">
+                <a16:creationId xmlns:a16="http://schemas.microsoft.com/office/drawing/2014/main" id="{B7BD7FCF-A254-4A97-A15C-319B67622677}"/>
+              </a:ext>
+              <a:ext uri="{C183D7F6-B498-43B3-948B-1728B52AA6E4}">
+                <adec:decorative xmlns:adec="http://schemas.microsoft.com/office/drawing/2017/decorative" val="1"/>
+              </a:ext>
+            </a:extLst>
+          </p:cNvPr>
+          <p:cNvSpPr>
+            <a:spLocks noGrp="1" noRot="1" noChangeAspect="1" noMove="1" noResize="1" noEditPoints="1" noAdjustHandles="1" noChangeArrowheads="1" noChangeShapeType="1" noTextEdit="1"/>
+          </p:cNvSpPr>
+          <p:nvPr>
+            <p:extLst>
+              <p:ext uri="{386F3935-93C4-4BCD-93E2-E3B085C9AB24}">
+                <p16:designElem xmlns:p16="http://schemas.microsoft.com/office/powerpoint/2015/main" val="1"/>
+              </p:ext>
+            </p:extLst>
+          </p:nvPr>
+        </p:nvSpPr>
+        <p:spPr>
+          <a:xfrm>
+            <a:off x="0" y="0"/>
+            <a:ext cx="12188952" cy="6858000"/>
+          </a:xfrm>
+          <a:prstGeom prst="rect">
+            <a:avLst/>
+          </a:prstGeom>
+          <a:ln>
+            <a:noFill/>
+          </a:ln>
+        </p:spPr>
+        <p:style>
+          <a:lnRef idx="2">
+            <a:schemeClr val="accent1">
+              <a:shade val="50000"/>
+            </a:schemeClr>
+          </a:lnRef>
+          <a:fillRef idx="1">
+            <a:schemeClr val="accent1"/>
+          </a:fillRef>
+          <a:effectRef idx="0">
+            <a:schemeClr val="accent1"/>
+          </a:effectRef>
+          <a:fontRef idx="minor">
+            <a:schemeClr val="lt1"/>
+          </a:fontRef>
+        </p:style>
+        <p:txBody>
+          <a:bodyPr rtlCol="0" anchor="ctr"/>
+          <a:lstStyle/>
+          <a:p>
+            <a:pPr algn="ctr"/>
+            <a:endParaRPr lang="en-US"/>
+          </a:p>
+        </p:txBody>
+      </p:sp>
+      <p:sp>
+        <p:nvSpPr>
+          <p:cNvPr id="12" name="Freeform: Shape 11">
+            <a:extLst>
+              <a:ext uri="{FF2B5EF4-FFF2-40B4-BE49-F238E27FC236}">
+                <a16:creationId xmlns:a16="http://schemas.microsoft.com/office/drawing/2014/main" id="{52FFAF72-6204-4676-9C6F-9A4CC4D91805}"/>
+              </a:ext>
+              <a:ext uri="{C183D7F6-B498-43B3-948B-1728B52AA6E4}">
+                <adec:decorative xmlns:adec="http://schemas.microsoft.com/office/drawing/2017/decorative" val="1"/>
+              </a:ext>
+            </a:extLst>
+          </p:cNvPr>
+          <p:cNvSpPr>
+            <a:spLocks noGrp="1" noRot="1" noChangeAspect="1" noMove="1" noResize="1" noEditPoints="1" noAdjustHandles="1" noChangeArrowheads="1" noChangeShapeType="1" noTextEdit="1"/>
+          </p:cNvSpPr>
+          <p:nvPr>
+            <p:extLst>
+              <p:ext uri="{386F3935-93C4-4BCD-93E2-E3B085C9AB24}">
+                <p16:designElem xmlns:p16="http://schemas.microsoft.com/office/powerpoint/2015/main" val="1"/>
+              </p:ext>
+            </p:extLst>
+          </p:nvPr>
+        </p:nvSpPr>
+        <p:spPr>
+          <a:xfrm flipH="1">
+            <a:off x="0" y="0"/>
+            <a:ext cx="5962785" cy="6858000"/>
+          </a:xfrm>
+          <a:custGeom>
+            <a:avLst/>
+            <a:gdLst>
+              <a:gd name="connsiteX0" fmla="*/ 1044839 w 5962785"/>
+              <a:gd name="connsiteY0" fmla="*/ 0 h 6858000"/>
+              <a:gd name="connsiteX1" fmla="*/ 5962785 w 5962785"/>
+              <a:gd name="connsiteY1" fmla="*/ 0 h 6858000"/>
+              <a:gd name="connsiteX2" fmla="*/ 5962785 w 5962785"/>
+              <a:gd name="connsiteY2" fmla="*/ 6858000 h 6858000"/>
+              <a:gd name="connsiteX3" fmla="*/ 1469886 w 5962785"/>
+              <a:gd name="connsiteY3" fmla="*/ 6858000 h 6858000"/>
+              <a:gd name="connsiteX4" fmla="*/ 1416006 w 5962785"/>
+              <a:gd name="connsiteY4" fmla="*/ 6823984 h 6858000"/>
+              <a:gd name="connsiteX5" fmla="*/ 1232473 w 5962785"/>
+              <a:gd name="connsiteY5" fmla="*/ 6733873 h 6858000"/>
+              <a:gd name="connsiteX6" fmla="*/ 1075471 w 5962785"/>
+              <a:gd name="connsiteY6" fmla="*/ 6503186 h 6858000"/>
+              <a:gd name="connsiteX7" fmla="*/ 1020229 w 5962785"/>
+              <a:gd name="connsiteY7" fmla="*/ 6438306 h 6858000"/>
+              <a:gd name="connsiteX8" fmla="*/ 883579 w 5962785"/>
+              <a:gd name="connsiteY8" fmla="*/ 6351798 h 6858000"/>
+              <a:gd name="connsiteX9" fmla="*/ 645167 w 5962785"/>
+              <a:gd name="connsiteY9" fmla="*/ 6167969 h 6858000"/>
+              <a:gd name="connsiteX10" fmla="*/ 732391 w 5962785"/>
+              <a:gd name="connsiteY10" fmla="*/ 6124716 h 6858000"/>
+              <a:gd name="connsiteX11" fmla="*/ 985339 w 5962785"/>
+              <a:gd name="connsiteY11" fmla="*/ 6236455 h 6858000"/>
+              <a:gd name="connsiteX12" fmla="*/ 1168509 w 5962785"/>
+              <a:gd name="connsiteY12" fmla="*/ 6265291 h 6858000"/>
+              <a:gd name="connsiteX13" fmla="*/ 909746 w 5962785"/>
+              <a:gd name="connsiteY13" fmla="*/ 6070649 h 6858000"/>
+              <a:gd name="connsiteX14" fmla="*/ 659704 w 5962785"/>
+              <a:gd name="connsiteY14" fmla="*/ 5818335 h 6858000"/>
+              <a:gd name="connsiteX15" fmla="*/ 851597 w 5962785"/>
+              <a:gd name="connsiteY15" fmla="*/ 5865193 h 6858000"/>
+              <a:gd name="connsiteX16" fmla="*/ 860319 w 5962785"/>
+              <a:gd name="connsiteY16" fmla="*/ 5832753 h 6858000"/>
+              <a:gd name="connsiteX17" fmla="*/ 691686 w 5962785"/>
+              <a:gd name="connsiteY17" fmla="*/ 5533581 h 6858000"/>
+              <a:gd name="connsiteX18" fmla="*/ 610278 w 5962785"/>
+              <a:gd name="connsiteY18" fmla="*/ 5411029 h 6858000"/>
+              <a:gd name="connsiteX19" fmla="*/ 238123 w 5962785"/>
+              <a:gd name="connsiteY19" fmla="*/ 5046976 h 6858000"/>
+              <a:gd name="connsiteX20" fmla="*/ 592833 w 5962785"/>
+              <a:gd name="connsiteY20" fmla="*/ 5209177 h 6858000"/>
+              <a:gd name="connsiteX21" fmla="*/ 226494 w 5962785"/>
+              <a:gd name="connsiteY21" fmla="*/ 4855939 h 6858000"/>
+              <a:gd name="connsiteX22" fmla="*/ 49139 w 5962785"/>
+              <a:gd name="connsiteY22" fmla="*/ 4726177 h 6858000"/>
+              <a:gd name="connsiteX23" fmla="*/ 5527 w 5962785"/>
+              <a:gd name="connsiteY23" fmla="*/ 4650483 h 6858000"/>
+              <a:gd name="connsiteX24" fmla="*/ 84029 w 5962785"/>
+              <a:gd name="connsiteY24" fmla="*/ 4632460 h 6858000"/>
+              <a:gd name="connsiteX25" fmla="*/ 325347 w 5962785"/>
+              <a:gd name="connsiteY25" fmla="*/ 4661296 h 6858000"/>
+              <a:gd name="connsiteX26" fmla="*/ 25879 w 5962785"/>
+              <a:gd name="connsiteY26" fmla="*/ 4423401 h 6858000"/>
+              <a:gd name="connsiteX27" fmla="*/ 249753 w 5962785"/>
+              <a:gd name="connsiteY27" fmla="*/ 4459446 h 6858000"/>
+              <a:gd name="connsiteX28" fmla="*/ 313718 w 5962785"/>
+              <a:gd name="connsiteY28" fmla="*/ 4365729 h 6858000"/>
+              <a:gd name="connsiteX29" fmla="*/ 418386 w 5962785"/>
+              <a:gd name="connsiteY29" fmla="*/ 4214341 h 6858000"/>
+              <a:gd name="connsiteX30" fmla="*/ 491072 w 5962785"/>
+              <a:gd name="connsiteY30" fmla="*/ 4131438 h 6858000"/>
+              <a:gd name="connsiteX31" fmla="*/ 520147 w 5962785"/>
+              <a:gd name="connsiteY31" fmla="*/ 3864706 h 6858000"/>
+              <a:gd name="connsiteX32" fmla="*/ 459090 w 5962785"/>
+              <a:gd name="connsiteY32" fmla="*/ 3572743 h 6858000"/>
+              <a:gd name="connsiteX33" fmla="*/ 290458 w 5962785"/>
+              <a:gd name="connsiteY33" fmla="*/ 3424959 h 6858000"/>
+              <a:gd name="connsiteX34" fmla="*/ 339884 w 5962785"/>
+              <a:gd name="connsiteY34" fmla="*/ 3259153 h 6858000"/>
+              <a:gd name="connsiteX35" fmla="*/ 697501 w 5962785"/>
+              <a:gd name="connsiteY35" fmla="*/ 3360078 h 6858000"/>
+              <a:gd name="connsiteX36" fmla="*/ 165437 w 5962785"/>
+              <a:gd name="connsiteY36" fmla="*/ 2967190 h 6858000"/>
+              <a:gd name="connsiteX37" fmla="*/ 255568 w 5962785"/>
+              <a:gd name="connsiteY37" fmla="*/ 2949167 h 6858000"/>
+              <a:gd name="connsiteX38" fmla="*/ 578296 w 5962785"/>
+              <a:gd name="connsiteY38" fmla="*/ 2725691 h 6858000"/>
+              <a:gd name="connsiteX39" fmla="*/ 595740 w 5962785"/>
+              <a:gd name="connsiteY39" fmla="*/ 2714876 h 6858000"/>
+              <a:gd name="connsiteX40" fmla="*/ 650982 w 5962785"/>
+              <a:gd name="connsiteY40" fmla="*/ 2574301 h 6858000"/>
+              <a:gd name="connsiteX41" fmla="*/ 825429 w 5962785"/>
+              <a:gd name="connsiteY41" fmla="*/ 2552674 h 6858000"/>
+              <a:gd name="connsiteX42" fmla="*/ 970802 w 5962785"/>
+              <a:gd name="connsiteY42" fmla="*/ 2585115 h 6858000"/>
+              <a:gd name="connsiteX43" fmla="*/ 1127805 w 5962785"/>
+              <a:gd name="connsiteY43" fmla="*/ 2545465 h 6858000"/>
+              <a:gd name="connsiteX44" fmla="*/ 1267362 w 5962785"/>
+              <a:gd name="connsiteY44" fmla="*/ 2563488 h 6858000"/>
+              <a:gd name="connsiteX45" fmla="*/ 1386568 w 5962785"/>
+              <a:gd name="connsiteY45" fmla="*/ 2538257 h 6858000"/>
+              <a:gd name="connsiteX46" fmla="*/ 1270270 w 5962785"/>
+              <a:gd name="connsiteY46" fmla="*/ 2419309 h 6858000"/>
+              <a:gd name="connsiteX47" fmla="*/ 1107453 w 5962785"/>
+              <a:gd name="connsiteY47" fmla="*/ 2419309 h 6858000"/>
+              <a:gd name="connsiteX48" fmla="*/ 991154 w 5962785"/>
+              <a:gd name="connsiteY48" fmla="*/ 2343615 h 6858000"/>
+              <a:gd name="connsiteX49" fmla="*/ 880671 w 5962785"/>
+              <a:gd name="connsiteY49" fmla="*/ 2206645 h 6858000"/>
+              <a:gd name="connsiteX50" fmla="*/ 491072 w 5962785"/>
+              <a:gd name="connsiteY50" fmla="*/ 1986771 h 6858000"/>
+              <a:gd name="connsiteX51" fmla="*/ 421293 w 5962785"/>
+              <a:gd name="connsiteY51" fmla="*/ 1903868 h 6858000"/>
+              <a:gd name="connsiteX52" fmla="*/ 1531941 w 5962785"/>
+              <a:gd name="connsiteY52" fmla="*/ 2224667 h 6858000"/>
+              <a:gd name="connsiteX53" fmla="*/ 1188861 w 5962785"/>
+              <a:gd name="connsiteY53" fmla="*/ 2091301 h 6858000"/>
+              <a:gd name="connsiteX54" fmla="*/ 1421458 w 5962785"/>
+              <a:gd name="connsiteY54" fmla="*/ 2116532 h 6858000"/>
+              <a:gd name="connsiteX55" fmla="*/ 1549386 w 5962785"/>
+              <a:gd name="connsiteY55" fmla="*/ 2026420 h 6858000"/>
+              <a:gd name="connsiteX56" fmla="*/ 1549386 w 5962785"/>
+              <a:gd name="connsiteY56" fmla="*/ 1997584 h 6858000"/>
+              <a:gd name="connsiteX57" fmla="*/ 1453440 w 5962785"/>
+              <a:gd name="connsiteY57" fmla="*/ 1914682 h 6858000"/>
+              <a:gd name="connsiteX58" fmla="*/ 1398198 w 5962785"/>
+              <a:gd name="connsiteY58" fmla="*/ 1860614 h 6858000"/>
+              <a:gd name="connsiteX59" fmla="*/ 1247011 w 5962785"/>
+              <a:gd name="connsiteY59" fmla="*/ 1665972 h 6858000"/>
+              <a:gd name="connsiteX60" fmla="*/ 1354586 w 5962785"/>
+              <a:gd name="connsiteY60" fmla="*/ 1644345 h 6858000"/>
+              <a:gd name="connsiteX61" fmla="*/ 1395290 w 5962785"/>
+              <a:gd name="connsiteY61" fmla="*/ 1604696 h 6858000"/>
+              <a:gd name="connsiteX62" fmla="*/ 1366216 w 5962785"/>
+              <a:gd name="connsiteY62" fmla="*/ 1547025 h 6858000"/>
+              <a:gd name="connsiteX63" fmla="*/ 1031858 w 5962785"/>
+              <a:gd name="connsiteY63" fmla="*/ 1370405 h 6858000"/>
+              <a:gd name="connsiteX64" fmla="*/ 1005692 w 5962785"/>
+              <a:gd name="connsiteY64" fmla="*/ 1233435 h 6858000"/>
+              <a:gd name="connsiteX65" fmla="*/ 1069655 w 5962785"/>
+              <a:gd name="connsiteY65" fmla="*/ 1211808 h 6858000"/>
+              <a:gd name="connsiteX66" fmla="*/ 1142342 w 5962785"/>
+              <a:gd name="connsiteY66" fmla="*/ 1222621 h 6858000"/>
+              <a:gd name="connsiteX67" fmla="*/ 1084193 w 5962785"/>
+              <a:gd name="connsiteY67" fmla="*/ 1114487 h 6858000"/>
+              <a:gd name="connsiteX68" fmla="*/ 848689 w 5962785"/>
+              <a:gd name="connsiteY68" fmla="*/ 1006353 h 6858000"/>
+              <a:gd name="connsiteX69" fmla="*/ 805077 w 5962785"/>
+              <a:gd name="connsiteY69" fmla="*/ 948681 h 6858000"/>
+              <a:gd name="connsiteX70" fmla="*/ 863226 w 5962785"/>
+              <a:gd name="connsiteY70" fmla="*/ 919844 h 6858000"/>
+              <a:gd name="connsiteX71" fmla="*/ 906838 w 5962785"/>
+              <a:gd name="connsiteY71" fmla="*/ 909031 h 6858000"/>
+              <a:gd name="connsiteX72" fmla="*/ 5527 w 5962785"/>
+              <a:gd name="connsiteY72" fmla="*/ 458471 h 6858000"/>
+              <a:gd name="connsiteX73" fmla="*/ 209049 w 5962785"/>
+              <a:gd name="connsiteY73" fmla="*/ 454867 h 6858000"/>
+              <a:gd name="connsiteX74" fmla="*/ 409664 w 5962785"/>
+              <a:gd name="connsiteY74" fmla="*/ 526956 h 6858000"/>
+              <a:gd name="connsiteX75" fmla="*/ 621908 w 5962785"/>
+              <a:gd name="connsiteY75" fmla="*/ 516143 h 6858000"/>
+              <a:gd name="connsiteX76" fmla="*/ 822522 w 5962785"/>
+              <a:gd name="connsiteY76" fmla="*/ 552188 h 6858000"/>
+              <a:gd name="connsiteX77" fmla="*/ 996969 w 5962785"/>
+              <a:gd name="connsiteY77" fmla="*/ 552188 h 6858000"/>
+              <a:gd name="connsiteX78" fmla="*/ 834151 w 5962785"/>
+              <a:gd name="connsiteY78" fmla="*/ 498120 h 6858000"/>
+              <a:gd name="connsiteX79" fmla="*/ 773095 w 5962785"/>
+              <a:gd name="connsiteY79" fmla="*/ 408008 h 6858000"/>
+              <a:gd name="connsiteX80" fmla="*/ 793447 w 5962785"/>
+              <a:gd name="connsiteY80" fmla="*/ 325106 h 6858000"/>
+              <a:gd name="connsiteX81" fmla="*/ 860319 w 5962785"/>
+              <a:gd name="connsiteY81" fmla="*/ 350336 h 6858000"/>
+              <a:gd name="connsiteX82" fmla="*/ 938820 w 5962785"/>
+              <a:gd name="connsiteY82" fmla="*/ 444054 h 6858000"/>
+              <a:gd name="connsiteX83" fmla="*/ 956265 w 5962785"/>
+              <a:gd name="connsiteY83" fmla="*/ 386381 h 6858000"/>
+              <a:gd name="connsiteX84" fmla="*/ 1002784 w 5962785"/>
+              <a:gd name="connsiteY84" fmla="*/ 343127 h 6858000"/>
+              <a:gd name="connsiteX85" fmla="*/ 1270270 w 5962785"/>
+              <a:gd name="connsiteY85" fmla="*/ 364755 h 6858000"/>
+              <a:gd name="connsiteX86" fmla="*/ 1092915 w 5962785"/>
+              <a:gd name="connsiteY86" fmla="*/ 180926 h 6858000"/>
+              <a:gd name="connsiteX87" fmla="*/ 979525 w 5962785"/>
+              <a:gd name="connsiteY87" fmla="*/ 152090 h 6858000"/>
+              <a:gd name="connsiteX88" fmla="*/ 953358 w 5962785"/>
+              <a:gd name="connsiteY88" fmla="*/ 76396 h 6858000"/>
+              <a:gd name="connsiteX89" fmla="*/ 1005692 w 5962785"/>
+              <a:gd name="connsiteY89" fmla="*/ 58373 h 6858000"/>
+              <a:gd name="connsiteX90" fmla="*/ 1267362 w 5962785"/>
+              <a:gd name="connsiteY90" fmla="*/ 123254 h 6858000"/>
+              <a:gd name="connsiteX91" fmla="*/ 1310975 w 5962785"/>
+              <a:gd name="connsiteY91" fmla="*/ 98023 h 6858000"/>
+              <a:gd name="connsiteX92" fmla="*/ 1159787 w 5962785"/>
+              <a:gd name="connsiteY92" fmla="*/ 43505 h 6858000"/>
+            </a:gdLst>
+            <a:ahLst/>
+            <a:cxnLst>
+              <a:cxn ang="0">
+                <a:pos x="connsiteX0" y="connsiteY0"/>
+              </a:cxn>
+              <a:cxn ang="0">
+                <a:pos x="connsiteX1" y="connsiteY1"/>
+              </a:cxn>
+              <a:cxn ang="0">
+                <a:pos x="connsiteX2" y="connsiteY2"/>
+              </a:cxn>
+              <a:cxn ang="0">
+                <a:pos x="connsiteX3" y="connsiteY3"/>
+              </a:cxn>
+              <a:cxn ang="0">
+                <a:pos x="connsiteX4" y="connsiteY4"/>
+              </a:cxn>
+              <a:cxn ang="0">
+                <a:pos x="connsiteX5" y="connsiteY5"/>
+              </a:cxn>
+              <a:cxn ang="0">
+                <a:pos x="connsiteX6" y="connsiteY6"/>
+              </a:cxn>
+              <a:cxn ang="0">
+                <a:pos x="connsiteX7" y="connsiteY7"/>
+              </a:cxn>
+              <a:cxn ang="0">
+                <a:pos x="connsiteX8" y="connsiteY8"/>
+              </a:cxn>
+              <a:cxn ang="0">
+                <a:pos x="connsiteX9" y="connsiteY9"/>
+              </a:cxn>
+              <a:cxn ang="0">
+                <a:pos x="connsiteX10" y="connsiteY10"/>
+              </a:cxn>
+              <a:cxn ang="0">
+                <a:pos x="connsiteX11" y="connsiteY11"/>
+              </a:cxn>
+              <a:cxn ang="0">
+                <a:pos x="connsiteX12" y="connsiteY12"/>
+              </a:cxn>
+              <a:cxn ang="0">
+                <a:pos x="connsiteX13" y="connsiteY13"/>
+              </a:cxn>
+              <a:cxn ang="0">
+                <a:pos x="connsiteX14" y="connsiteY14"/>
+              </a:cxn>
+              <a:cxn ang="0">
+                <a:pos x="connsiteX15" y="connsiteY15"/>
+              </a:cxn>
+              <a:cxn ang="0">
+                <a:pos x="connsiteX16" y="connsiteY16"/>
+              </a:cxn>
+              <a:cxn ang="0">
+                <a:pos x="connsiteX17" y="connsiteY17"/>
+              </a:cxn>
+              <a:cxn ang="0">
+                <a:pos x="connsiteX18" y="connsiteY18"/>
+              </a:cxn>
+              <a:cxn ang="0">
+                <a:pos x="connsiteX19" y="connsiteY19"/>
+              </a:cxn>
+              <a:cxn ang="0">
+                <a:pos x="connsiteX20" y="connsiteY20"/>
+              </a:cxn>
+              <a:cxn ang="0">
+                <a:pos x="connsiteX21" y="connsiteY21"/>
+              </a:cxn>
+              <a:cxn ang="0">
+                <a:pos x="connsiteX22" y="connsiteY22"/>
+              </a:cxn>
+              <a:cxn ang="0">
+                <a:pos x="connsiteX23" y="connsiteY23"/>
+              </a:cxn>
+              <a:cxn ang="0">
+                <a:pos x="connsiteX24" y="connsiteY24"/>
+              </a:cxn>
+              <a:cxn ang="0">
+                <a:pos x="connsiteX25" y="connsiteY25"/>
+              </a:cxn>
+              <a:cxn ang="0">
+                <a:pos x="connsiteX26" y="connsiteY26"/>
+              </a:cxn>
+              <a:cxn ang="0">
+                <a:pos x="connsiteX27" y="connsiteY27"/>
+              </a:cxn>
+              <a:cxn ang="0">
+                <a:pos x="connsiteX28" y="connsiteY28"/>
+              </a:cxn>
+              <a:cxn ang="0">
+                <a:pos x="connsiteX29" y="connsiteY29"/>
+              </a:cxn>
+              <a:cxn ang="0">
+                <a:pos x="connsiteX30" y="connsiteY30"/>
+              </a:cxn>
+              <a:cxn ang="0">
+                <a:pos x="connsiteX31" y="connsiteY31"/>
+              </a:cxn>
+              <a:cxn ang="0">
+                <a:pos x="connsiteX32" y="connsiteY32"/>
+              </a:cxn>
+              <a:cxn ang="0">
+                <a:pos x="connsiteX33" y="connsiteY33"/>
+              </a:cxn>
+              <a:cxn ang="0">
+                <a:pos x="connsiteX34" y="connsiteY34"/>
+              </a:cxn>
+              <a:cxn ang="0">
+                <a:pos x="connsiteX35" y="connsiteY35"/>
+              </a:cxn>
+              <a:cxn ang="0">
+                <a:pos x="connsiteX36" y="connsiteY36"/>
+              </a:cxn>
+              <a:cxn ang="0">
+                <a:pos x="connsiteX37" y="connsiteY37"/>
+              </a:cxn>
+              <a:cxn ang="0">
+                <a:pos x="connsiteX38" y="connsiteY38"/>
+              </a:cxn>
+              <a:cxn ang="0">
+                <a:pos x="connsiteX39" y="connsiteY39"/>
+              </a:cxn>
+              <a:cxn ang="0">
+                <a:pos x="connsiteX40" y="connsiteY40"/>
+              </a:cxn>
+              <a:cxn ang="0">
+                <a:pos x="connsiteX41" y="connsiteY41"/>
+              </a:cxn>
+              <a:cxn ang="0">
+                <a:pos x="connsiteX42" y="connsiteY42"/>
+              </a:cxn>
+              <a:cxn ang="0">
+                <a:pos x="connsiteX43" y="connsiteY43"/>
+              </a:cxn>
+              <a:cxn ang="0">
+                <a:pos x="connsiteX44" y="connsiteY44"/>
+              </a:cxn>
+              <a:cxn ang="0">
+                <a:pos x="connsiteX45" y="connsiteY45"/>
+              </a:cxn>
+              <a:cxn ang="0">
+                <a:pos x="connsiteX46" y="connsiteY46"/>
+              </a:cxn>
+              <a:cxn ang="0">
+                <a:pos x="connsiteX47" y="connsiteY47"/>
+              </a:cxn>
+              <a:cxn ang="0">
+                <a:pos x="connsiteX48" y="connsiteY48"/>
+              </a:cxn>
+              <a:cxn ang="0">
+                <a:pos x="connsiteX49" y="connsiteY49"/>
+              </a:cxn>
+              <a:cxn ang="0">
+                <a:pos x="connsiteX50" y="connsiteY50"/>
+              </a:cxn>
+              <a:cxn ang="0">
+                <a:pos x="connsiteX51" y="connsiteY51"/>
+              </a:cxn>
+              <a:cxn ang="0">
+                <a:pos x="connsiteX52" y="connsiteY52"/>
+              </a:cxn>
+              <a:cxn ang="0">
+                <a:pos x="connsiteX53" y="connsiteY53"/>
+              </a:cxn>
+              <a:cxn ang="0">
+                <a:pos x="connsiteX54" y="connsiteY54"/>
+              </a:cxn>
+              <a:cxn ang="0">
+                <a:pos x="connsiteX55" y="connsiteY55"/>
+              </a:cxn>
+              <a:cxn ang="0">
+                <a:pos x="connsiteX56" y="connsiteY56"/>
+              </a:cxn>
+              <a:cxn ang="0">
+                <a:pos x="connsiteX57" y="connsiteY57"/>
+              </a:cxn>
+              <a:cxn ang="0">
+                <a:pos x="connsiteX58" y="connsiteY58"/>
+              </a:cxn>
+              <a:cxn ang="0">
+                <a:pos x="connsiteX59" y="connsiteY59"/>
+              </a:cxn>
+              <a:cxn ang="0">
+                <a:pos x="connsiteX60" y="connsiteY60"/>
+              </a:cxn>
+              <a:cxn ang="0">
+                <a:pos x="connsiteX61" y="connsiteY61"/>
+              </a:cxn>
+              <a:cxn ang="0">
+                <a:pos x="connsiteX62" y="connsiteY62"/>
+              </a:cxn>
+              <a:cxn ang="0">
+                <a:pos x="connsiteX63" y="connsiteY63"/>
+              </a:cxn>
+              <a:cxn ang="0">
+                <a:pos x="connsiteX64" y="connsiteY64"/>
+              </a:cxn>
+              <a:cxn ang="0">
+                <a:pos x="connsiteX65" y="connsiteY65"/>
+              </a:cxn>
+              <a:cxn ang="0">
+                <a:pos x="connsiteX66" y="connsiteY66"/>
+              </a:cxn>
+              <a:cxn ang="0">
+                <a:pos x="connsiteX67" y="connsiteY67"/>
+              </a:cxn>
+              <a:cxn ang="0">
+                <a:pos x="connsiteX68" y="connsiteY68"/>
+              </a:cxn>
+              <a:cxn ang="0">
+                <a:pos x="connsiteX69" y="connsiteY69"/>
+              </a:cxn>
+              <a:cxn ang="0">
+                <a:pos x="connsiteX70" y="connsiteY70"/>
+              </a:cxn>
+              <a:cxn ang="0">
+                <a:pos x="connsiteX71" y="connsiteY71"/>
+              </a:cxn>
+              <a:cxn ang="0">
+                <a:pos x="connsiteX72" y="connsiteY72"/>
+              </a:cxn>
+              <a:cxn ang="0">
+                <a:pos x="connsiteX73" y="connsiteY73"/>
+              </a:cxn>
+              <a:cxn ang="0">
+                <a:pos x="connsiteX74" y="connsiteY74"/>
+              </a:cxn>
+              <a:cxn ang="0">
+                <a:pos x="connsiteX75" y="connsiteY75"/>
+              </a:cxn>
+              <a:cxn ang="0">
+                <a:pos x="connsiteX76" y="connsiteY76"/>
+              </a:cxn>
+              <a:cxn ang="0">
+                <a:pos x="connsiteX77" y="connsiteY77"/>
+              </a:cxn>
+              <a:cxn ang="0">
+                <a:pos x="connsiteX78" y="connsiteY78"/>
+              </a:cxn>
+              <a:cxn ang="0">
+                <a:pos x="connsiteX79" y="connsiteY79"/>
+              </a:cxn>
+              <a:cxn ang="0">
+                <a:pos x="connsiteX80" y="connsiteY80"/>
+              </a:cxn>
+              <a:cxn ang="0">
+                <a:pos x="connsiteX81" y="connsiteY81"/>
+              </a:cxn>
+              <a:cxn ang="0">
+                <a:pos x="connsiteX82" y="connsiteY82"/>
+              </a:cxn>
+              <a:cxn ang="0">
+                <a:pos x="connsiteX83" y="connsiteY83"/>
+              </a:cxn>
+              <a:cxn ang="0">
+                <a:pos x="connsiteX84" y="connsiteY84"/>
+              </a:cxn>
+              <a:cxn ang="0">
+                <a:pos x="connsiteX85" y="connsiteY85"/>
+              </a:cxn>
+              <a:cxn ang="0">
+                <a:pos x="connsiteX86" y="connsiteY86"/>
+              </a:cxn>
+              <a:cxn ang="0">
+                <a:pos x="connsiteX87" y="connsiteY87"/>
+              </a:cxn>
+              <a:cxn ang="0">
+                <a:pos x="connsiteX88" y="connsiteY88"/>
+              </a:cxn>
+              <a:cxn ang="0">
+                <a:pos x="connsiteX89" y="connsiteY89"/>
+              </a:cxn>
+              <a:cxn ang="0">
+                <a:pos x="connsiteX90" y="connsiteY90"/>
+              </a:cxn>
+              <a:cxn ang="0">
+                <a:pos x="connsiteX91" y="connsiteY91"/>
+              </a:cxn>
+              <a:cxn ang="0">
+                <a:pos x="connsiteX92" y="connsiteY92"/>
+              </a:cxn>
+            </a:cxnLst>
+            <a:rect l="l" t="t" r="r" b="b"/>
+            <a:pathLst>
+              <a:path w="5962785" h="6858000">
+                <a:moveTo>
+                  <a:pt x="1044839" y="0"/>
+                </a:moveTo>
+                <a:lnTo>
+                  <a:pt x="5962785" y="0"/>
+                </a:lnTo>
+                <a:lnTo>
+                  <a:pt x="5962785" y="6858000"/>
+                </a:lnTo>
+                <a:lnTo>
+                  <a:pt x="1469886" y="6858000"/>
+                </a:lnTo>
+                <a:lnTo>
+                  <a:pt x="1416006" y="6823984"/>
+                </a:lnTo>
+                <a:cubicBezTo>
+                  <a:pt x="1356767" y="6787940"/>
+                  <a:pt x="1296437" y="6755500"/>
+                  <a:pt x="1232473" y="6733873"/>
+                </a:cubicBezTo>
+                <a:cubicBezTo>
+                  <a:pt x="1145250" y="6705037"/>
+                  <a:pt x="1060933" y="6654575"/>
+                  <a:pt x="1075471" y="6503186"/>
+                </a:cubicBezTo>
+                <a:cubicBezTo>
+                  <a:pt x="1078378" y="6459932"/>
+                  <a:pt x="1055118" y="6427493"/>
+                  <a:pt x="1020229" y="6438306"/>
+                </a:cubicBezTo>
+                <a:cubicBezTo>
+                  <a:pt x="953358" y="6459932"/>
+                  <a:pt x="921375" y="6398656"/>
+                  <a:pt x="883579" y="6351798"/>
+                </a:cubicBezTo>
+                <a:cubicBezTo>
+                  <a:pt x="816707" y="6268895"/>
+                  <a:pt x="752743" y="6182387"/>
+                  <a:pt x="645167" y="6167969"/>
+                </a:cubicBezTo>
+                <a:cubicBezTo>
+                  <a:pt x="665519" y="6103088"/>
+                  <a:pt x="700408" y="6110298"/>
+                  <a:pt x="732391" y="6124716"/>
+                </a:cubicBezTo>
+                <a:cubicBezTo>
+                  <a:pt x="816707" y="6160761"/>
+                  <a:pt x="901023" y="6200410"/>
+                  <a:pt x="985339" y="6236455"/>
+                </a:cubicBezTo>
+                <a:cubicBezTo>
+                  <a:pt x="1040581" y="6258081"/>
+                  <a:pt x="1095822" y="6290522"/>
+                  <a:pt x="1168509" y="6265291"/>
+                </a:cubicBezTo>
+                <a:cubicBezTo>
+                  <a:pt x="1104545" y="6135530"/>
+                  <a:pt x="996969" y="6110298"/>
+                  <a:pt x="909746" y="6070649"/>
+                </a:cubicBezTo>
+                <a:cubicBezTo>
+                  <a:pt x="802169" y="6020185"/>
+                  <a:pt x="738206" y="5926470"/>
+                  <a:pt x="659704" y="5818335"/>
+                </a:cubicBezTo>
+                <a:cubicBezTo>
+                  <a:pt x="738206" y="5789500"/>
+                  <a:pt x="787632" y="5868798"/>
+                  <a:pt x="851597" y="5865193"/>
+                </a:cubicBezTo>
+                <a:cubicBezTo>
+                  <a:pt x="854504" y="5854380"/>
+                  <a:pt x="860319" y="5832753"/>
+                  <a:pt x="860319" y="5832753"/>
+                </a:cubicBezTo>
+                <a:cubicBezTo>
+                  <a:pt x="755650" y="5775081"/>
+                  <a:pt x="709132" y="5666947"/>
+                  <a:pt x="691686" y="5533581"/>
+                </a:cubicBezTo>
+                <a:cubicBezTo>
+                  <a:pt x="685872" y="5465095"/>
+                  <a:pt x="648075" y="5443468"/>
+                  <a:pt x="610278" y="5411029"/>
+                </a:cubicBezTo>
+                <a:cubicBezTo>
+                  <a:pt x="482350" y="5299289"/>
+                  <a:pt x="345700" y="5198364"/>
+                  <a:pt x="238123" y="5046976"/>
+                </a:cubicBezTo>
+                <a:cubicBezTo>
+                  <a:pt x="363144" y="5064998"/>
+                  <a:pt x="461997" y="5165924"/>
+                  <a:pt x="592833" y="5209177"/>
+                </a:cubicBezTo>
+                <a:cubicBezTo>
+                  <a:pt x="488165" y="5043371"/>
+                  <a:pt x="351514" y="4956864"/>
+                  <a:pt x="226494" y="4855939"/>
+                </a:cubicBezTo>
+                <a:cubicBezTo>
+                  <a:pt x="168344" y="4809081"/>
+                  <a:pt x="116011" y="4751408"/>
+                  <a:pt x="49139" y="4726177"/>
+                </a:cubicBezTo>
+                <a:cubicBezTo>
+                  <a:pt x="25879" y="4718968"/>
+                  <a:pt x="-14825" y="4700947"/>
+                  <a:pt x="5527" y="4650483"/>
+                </a:cubicBezTo>
+                <a:cubicBezTo>
+                  <a:pt x="22972" y="4607230"/>
+                  <a:pt x="54954" y="4621648"/>
+                  <a:pt x="84029" y="4632460"/>
+                </a:cubicBezTo>
+                <a:cubicBezTo>
+                  <a:pt x="153807" y="4661296"/>
+                  <a:pt x="229401" y="4661296"/>
+                  <a:pt x="325347" y="4661296"/>
+                </a:cubicBezTo>
+                <a:cubicBezTo>
+                  <a:pt x="243939" y="4524326"/>
+                  <a:pt x="95658" y="4567580"/>
+                  <a:pt x="25879" y="4423401"/>
+                </a:cubicBezTo>
+                <a:cubicBezTo>
+                  <a:pt x="113103" y="4398170"/>
+                  <a:pt x="179975" y="4448632"/>
+                  <a:pt x="249753" y="4459446"/>
+                </a:cubicBezTo>
+                <a:cubicBezTo>
+                  <a:pt x="313718" y="4470259"/>
+                  <a:pt x="328254" y="4445028"/>
+                  <a:pt x="313718" y="4365729"/>
+                </a:cubicBezTo>
+                <a:cubicBezTo>
+                  <a:pt x="290458" y="4243177"/>
+                  <a:pt x="325347" y="4181900"/>
+                  <a:pt x="418386" y="4214341"/>
+                </a:cubicBezTo>
+                <a:cubicBezTo>
+                  <a:pt x="505609" y="4246781"/>
+                  <a:pt x="514332" y="4199922"/>
+                  <a:pt x="491072" y="4131438"/>
+                </a:cubicBezTo>
+                <a:cubicBezTo>
+                  <a:pt x="456183" y="4030512"/>
+                  <a:pt x="493979" y="3951214"/>
+                  <a:pt x="520147" y="3864706"/>
+                </a:cubicBezTo>
+                <a:cubicBezTo>
+                  <a:pt x="560851" y="3734945"/>
+                  <a:pt x="543407" y="3670064"/>
+                  <a:pt x="459090" y="3572743"/>
+                </a:cubicBezTo>
+                <a:cubicBezTo>
+                  <a:pt x="409664" y="3518676"/>
+                  <a:pt x="360236" y="3471818"/>
+                  <a:pt x="290458" y="3424959"/>
+                </a:cubicBezTo>
+                <a:cubicBezTo>
+                  <a:pt x="450368" y="3399728"/>
+                  <a:pt x="284643" y="3313221"/>
+                  <a:pt x="339884" y="3259153"/>
+                </a:cubicBezTo>
+                <a:cubicBezTo>
+                  <a:pt x="453275" y="3237527"/>
+                  <a:pt x="543407" y="3410542"/>
+                  <a:pt x="697501" y="3360078"/>
+                </a:cubicBezTo>
+                <a:cubicBezTo>
+                  <a:pt x="511425" y="3212294"/>
+                  <a:pt x="302087" y="3165436"/>
+                  <a:pt x="165437" y="2967190"/>
+                </a:cubicBezTo>
+                <a:cubicBezTo>
+                  <a:pt x="197419" y="2923937"/>
+                  <a:pt x="229401" y="2967190"/>
+                  <a:pt x="255568" y="2949167"/>
+                </a:cubicBezTo>
+                <a:cubicBezTo>
+                  <a:pt x="255568" y="2938354"/>
+                  <a:pt x="560851" y="3006840"/>
+                  <a:pt x="578296" y="2725691"/>
+                </a:cubicBezTo>
+                <a:cubicBezTo>
+                  <a:pt x="584111" y="2725691"/>
+                  <a:pt x="589926" y="2725691"/>
+                  <a:pt x="595740" y="2714876"/>
+                </a:cubicBezTo>
+                <a:cubicBezTo>
+                  <a:pt x="627722" y="2675228"/>
+                  <a:pt x="598648" y="2581510"/>
+                  <a:pt x="650982" y="2574301"/>
+                </a:cubicBezTo>
+                <a:cubicBezTo>
+                  <a:pt x="709132" y="2567092"/>
+                  <a:pt x="764373" y="2534653"/>
+                  <a:pt x="825429" y="2552674"/>
+                </a:cubicBezTo>
+                <a:cubicBezTo>
+                  <a:pt x="871949" y="2567092"/>
+                  <a:pt x="921375" y="2585115"/>
+                  <a:pt x="970802" y="2585115"/>
+                </a:cubicBezTo>
+                <a:cubicBezTo>
+                  <a:pt x="1023136" y="2585115"/>
+                  <a:pt x="1095822" y="2707668"/>
+                  <a:pt x="1127805" y="2545465"/>
+                </a:cubicBezTo>
+                <a:cubicBezTo>
+                  <a:pt x="1127805" y="2538257"/>
+                  <a:pt x="1217936" y="2556280"/>
+                  <a:pt x="1267362" y="2563488"/>
+                </a:cubicBezTo>
+                <a:cubicBezTo>
+                  <a:pt x="1308067" y="2570698"/>
+                  <a:pt x="1357494" y="2603137"/>
+                  <a:pt x="1386568" y="2538257"/>
+                </a:cubicBezTo>
+                <a:cubicBezTo>
+                  <a:pt x="1401105" y="2498607"/>
+                  <a:pt x="1331326" y="2426518"/>
+                  <a:pt x="1270270" y="2419309"/>
+                </a:cubicBezTo>
+                <a:cubicBezTo>
+                  <a:pt x="1215029" y="2412101"/>
+                  <a:pt x="1159787" y="2404892"/>
+                  <a:pt x="1107453" y="2419309"/>
+                </a:cubicBezTo>
+                <a:cubicBezTo>
+                  <a:pt x="1043489" y="2437331"/>
+                  <a:pt x="1008599" y="2408495"/>
+                  <a:pt x="991154" y="2343615"/>
+                </a:cubicBezTo>
+                <a:cubicBezTo>
+                  <a:pt x="970802" y="2275131"/>
+                  <a:pt x="933005" y="2239085"/>
+                  <a:pt x="880671" y="2206645"/>
+                </a:cubicBezTo>
+                <a:cubicBezTo>
+                  <a:pt x="752743" y="2127346"/>
+                  <a:pt x="630630" y="2033629"/>
+                  <a:pt x="491072" y="1986771"/>
+                </a:cubicBezTo>
+                <a:cubicBezTo>
+                  <a:pt x="464905" y="1979562"/>
+                  <a:pt x="432923" y="1965145"/>
+                  <a:pt x="421293" y="1903868"/>
+                </a:cubicBezTo>
+                <a:cubicBezTo>
+                  <a:pt x="799262" y="1997584"/>
+                  <a:pt x="1142342" y="2239085"/>
+                  <a:pt x="1531941" y="2224667"/>
+                </a:cubicBezTo>
+                <a:cubicBezTo>
+                  <a:pt x="1427272" y="2148974"/>
+                  <a:pt x="1302252" y="2145369"/>
+                  <a:pt x="1188861" y="2091301"/>
+                </a:cubicBezTo>
+                <a:cubicBezTo>
+                  <a:pt x="1270270" y="2051652"/>
+                  <a:pt x="1345864" y="2094906"/>
+                  <a:pt x="1421458" y="2116532"/>
+                </a:cubicBezTo>
+                <a:cubicBezTo>
+                  <a:pt x="1485422" y="2134554"/>
+                  <a:pt x="1543571" y="2138160"/>
+                  <a:pt x="1549386" y="2026420"/>
+                </a:cubicBezTo>
+                <a:cubicBezTo>
+                  <a:pt x="1549386" y="2015607"/>
+                  <a:pt x="1549386" y="2008398"/>
+                  <a:pt x="1549386" y="1997584"/>
+                </a:cubicBezTo>
+                <a:cubicBezTo>
+                  <a:pt x="1526126" y="1950727"/>
+                  <a:pt x="1494144" y="1929099"/>
+                  <a:pt x="1453440" y="1914682"/>
+                </a:cubicBezTo>
+                <a:cubicBezTo>
+                  <a:pt x="1430180" y="1907473"/>
+                  <a:pt x="1398198" y="1893056"/>
+                  <a:pt x="1398198" y="1860614"/>
+                </a:cubicBezTo>
+                <a:cubicBezTo>
+                  <a:pt x="1401105" y="1738063"/>
+                  <a:pt x="1322604" y="1702018"/>
+                  <a:pt x="1247011" y="1665972"/>
+                </a:cubicBezTo>
+                <a:cubicBezTo>
+                  <a:pt x="1287715" y="1604696"/>
+                  <a:pt x="1322604" y="1647950"/>
+                  <a:pt x="1354586" y="1644345"/>
+                </a:cubicBezTo>
+                <a:cubicBezTo>
+                  <a:pt x="1374939" y="1640741"/>
+                  <a:pt x="1395290" y="1637138"/>
+                  <a:pt x="1395290" y="1604696"/>
+                </a:cubicBezTo>
+                <a:cubicBezTo>
+                  <a:pt x="1395290" y="1579465"/>
+                  <a:pt x="1386568" y="1547025"/>
+                  <a:pt x="1366216" y="1547025"/>
+                </a:cubicBezTo>
+                <a:cubicBezTo>
+                  <a:pt x="1238288" y="1543420"/>
+                  <a:pt x="1165601" y="1370405"/>
+                  <a:pt x="1031858" y="1370405"/>
+                </a:cubicBezTo>
+                <a:cubicBezTo>
+                  <a:pt x="950450" y="1370405"/>
+                  <a:pt x="1072563" y="1273083"/>
+                  <a:pt x="1005692" y="1233435"/>
+                </a:cubicBezTo>
+                <a:cubicBezTo>
+                  <a:pt x="991154" y="1222621"/>
+                  <a:pt x="1046396" y="1208203"/>
+                  <a:pt x="1069655" y="1211808"/>
+                </a:cubicBezTo>
+                <a:cubicBezTo>
+                  <a:pt x="1092915" y="1215412"/>
+                  <a:pt x="1113268" y="1240644"/>
+                  <a:pt x="1142342" y="1222621"/>
+                </a:cubicBezTo>
+                <a:cubicBezTo>
+                  <a:pt x="1156879" y="1157741"/>
+                  <a:pt x="1119082" y="1132510"/>
+                  <a:pt x="1084193" y="1114487"/>
+                </a:cubicBezTo>
+                <a:cubicBezTo>
+                  <a:pt x="1008599" y="1071234"/>
+                  <a:pt x="933005" y="1020771"/>
+                  <a:pt x="848689" y="1006353"/>
+                </a:cubicBezTo>
+                <a:cubicBezTo>
+                  <a:pt x="819615" y="1002748"/>
+                  <a:pt x="802169" y="984726"/>
+                  <a:pt x="805077" y="948681"/>
+                </a:cubicBezTo>
+                <a:cubicBezTo>
+                  <a:pt x="810892" y="901822"/>
+                  <a:pt x="839967" y="916240"/>
+                  <a:pt x="863226" y="919844"/>
+                </a:cubicBezTo>
+                <a:cubicBezTo>
+                  <a:pt x="877764" y="923450"/>
+                  <a:pt x="892301" y="934263"/>
+                  <a:pt x="906838" y="909031"/>
+                </a:cubicBezTo>
+                <a:cubicBezTo>
+                  <a:pt x="566666" y="653113"/>
+                  <a:pt x="386404" y="667532"/>
+                  <a:pt x="5527" y="458471"/>
+                </a:cubicBezTo>
+                <a:cubicBezTo>
+                  <a:pt x="89843" y="418822"/>
+                  <a:pt x="150900" y="447658"/>
+                  <a:pt x="209049" y="454867"/>
+                </a:cubicBezTo>
+                <a:cubicBezTo>
+                  <a:pt x="354422" y="472890"/>
+                  <a:pt x="264290" y="505329"/>
+                  <a:pt x="409664" y="526956"/>
+                </a:cubicBezTo>
+                <a:cubicBezTo>
+                  <a:pt x="479443" y="537770"/>
+                  <a:pt x="543407" y="573815"/>
+                  <a:pt x="621908" y="516143"/>
+                </a:cubicBezTo>
+                <a:cubicBezTo>
+                  <a:pt x="674242" y="476494"/>
+                  <a:pt x="758558" y="519747"/>
+                  <a:pt x="822522" y="552188"/>
+                </a:cubicBezTo>
+                <a:cubicBezTo>
+                  <a:pt x="874856" y="581024"/>
+                  <a:pt x="927190" y="588232"/>
+                  <a:pt x="996969" y="552188"/>
+                </a:cubicBezTo>
+                <a:cubicBezTo>
+                  <a:pt x="933005" y="530562"/>
+                  <a:pt x="883579" y="512539"/>
+                  <a:pt x="834151" y="498120"/>
+                </a:cubicBezTo>
+                <a:cubicBezTo>
+                  <a:pt x="793447" y="487307"/>
+                  <a:pt x="770187" y="462076"/>
+                  <a:pt x="773095" y="408008"/>
+                </a:cubicBezTo>
+                <a:cubicBezTo>
+                  <a:pt x="773095" y="379172"/>
+                  <a:pt x="764373" y="339523"/>
+                  <a:pt x="793447" y="325106"/>
+                </a:cubicBezTo>
+                <a:cubicBezTo>
+                  <a:pt x="816707" y="310688"/>
+                  <a:pt x="848689" y="325106"/>
+                  <a:pt x="860319" y="350336"/>
+                </a:cubicBezTo>
+                <a:cubicBezTo>
+                  <a:pt x="874856" y="397195"/>
+                  <a:pt x="889393" y="440449"/>
+                  <a:pt x="938820" y="444054"/>
+                </a:cubicBezTo>
+                <a:cubicBezTo>
+                  <a:pt x="1005692" y="451262"/>
+                  <a:pt x="967894" y="422426"/>
+                  <a:pt x="956265" y="386381"/>
+                </a:cubicBezTo>
+                <a:cubicBezTo>
+                  <a:pt x="944635" y="346733"/>
+                  <a:pt x="979525" y="335919"/>
+                  <a:pt x="1002784" y="343127"/>
+                </a:cubicBezTo>
+                <a:cubicBezTo>
+                  <a:pt x="1090008" y="375569"/>
+                  <a:pt x="1180139" y="317897"/>
+                  <a:pt x="1270270" y="364755"/>
+                </a:cubicBezTo>
+                <a:cubicBezTo>
+                  <a:pt x="1247011" y="249411"/>
+                  <a:pt x="1197583" y="198949"/>
+                  <a:pt x="1092915" y="180926"/>
+                </a:cubicBezTo>
+                <a:cubicBezTo>
+                  <a:pt x="1055118" y="177322"/>
+                  <a:pt x="1014414" y="184530"/>
+                  <a:pt x="979525" y="152090"/>
+                </a:cubicBezTo>
+                <a:cubicBezTo>
+                  <a:pt x="959172" y="134068"/>
+                  <a:pt x="938820" y="112441"/>
+                  <a:pt x="953358" y="76396"/>
+                </a:cubicBezTo>
+                <a:cubicBezTo>
+                  <a:pt x="962080" y="51165"/>
+                  <a:pt x="985339" y="51165"/>
+                  <a:pt x="1005692" y="58373"/>
+                </a:cubicBezTo>
+                <a:cubicBezTo>
+                  <a:pt x="1090008" y="98023"/>
+                  <a:pt x="1180139" y="108837"/>
+                  <a:pt x="1267362" y="123254"/>
+                </a:cubicBezTo>
+                <a:cubicBezTo>
+                  <a:pt x="1281900" y="126859"/>
+                  <a:pt x="1296437" y="134068"/>
+                  <a:pt x="1310975" y="98023"/>
+                </a:cubicBezTo>
+                <a:cubicBezTo>
+                  <a:pt x="1260095" y="81803"/>
+                  <a:pt x="1209941" y="62879"/>
+                  <a:pt x="1159787" y="43505"/>
+                </a:cubicBezTo>
+                <a:close/>
+              </a:path>
+            </a:pathLst>
+          </a:custGeom>
+          <a:solidFill>
+            <a:schemeClr val="bg2">
+              <a:alpha val="50000"/>
+            </a:schemeClr>
+          </a:solidFill>
+          <a:ln w="32707" cap="flat">
+            <a:noFill/>
+            <a:prstDash val="solid"/>
+            <a:miter/>
+          </a:ln>
+        </p:spPr>
+        <p:txBody>
+          <a:bodyPr wrap="square" rtlCol="0" anchor="ctr">
+            <a:noAutofit/>
+          </a:bodyPr>
+          <a:lstStyle/>
+          <a:p>
+            <a:pPr algn="ctr"/>
+            <a:endParaRPr lang="en-US"/>
+          </a:p>
+        </p:txBody>
+      </p:sp>
+      <p:sp>
+        <p:nvSpPr>
+          <p:cNvPr id="2" name="Title 1">
+            <a:extLst>
+              <a:ext uri="{FF2B5EF4-FFF2-40B4-BE49-F238E27FC236}">
+                <a16:creationId xmlns:a16="http://schemas.microsoft.com/office/drawing/2014/main" id="{9C3D3E1D-80B5-F81E-F13A-B076D27CA355}"/>
+              </a:ext>
+            </a:extLst>
+          </p:cNvPr>
+          <p:cNvSpPr>
+            <a:spLocks noGrp="1"/>
+          </p:cNvSpPr>
+          <p:nvPr>
+            <p:ph type="title"/>
+          </p:nvPr>
+        </p:nvSpPr>
+        <p:spPr>
+          <a:xfrm>
+            <a:off x="643468" y="643467"/>
+            <a:ext cx="4620584" cy="4567137"/>
+          </a:xfrm>
+        </p:spPr>
+        <p:txBody>
+          <a:bodyPr vert="horz" lIns="91440" tIns="45720" rIns="91440" bIns="45720" rtlCol="0" anchor="b">
+            <a:normAutofit/>
+          </a:bodyPr>
+          <a:lstStyle/>
+          <a:p>
+            <a:r>
+              <a:rPr lang="fr-FR" sz="4400" kern="1200" dirty="0">
+                <a:solidFill>
+                  <a:schemeClr val="tx1"/>
+                </a:solidFill>
+                <a:latin typeface="+mj-lt"/>
+                <a:ea typeface="+mj-ea"/>
+                <a:cs typeface="+mj-cs"/>
+              </a:rPr>
+              <a:t>Comment fabriquer des “machines à tout faire”?</a:t>
+            </a:r>
+          </a:p>
+        </p:txBody>
+      </p:sp>
+      <p:sp>
+        <p:nvSpPr>
+          <p:cNvPr id="4" name="Text Placeholder 3">
+            <a:extLst>
+              <a:ext uri="{FF2B5EF4-FFF2-40B4-BE49-F238E27FC236}">
+                <a16:creationId xmlns:a16="http://schemas.microsoft.com/office/drawing/2014/main" id="{309EDBF1-016B-FC95-2CE5-961BDBFA34CF}"/>
+              </a:ext>
+            </a:extLst>
+          </p:cNvPr>
+          <p:cNvSpPr>
+            <a:spLocks noGrp="1"/>
+          </p:cNvSpPr>
+          <p:nvPr>
+            <p:ph type="body" idx="1"/>
+          </p:nvPr>
+        </p:nvSpPr>
+        <p:spPr>
+          <a:xfrm>
+            <a:off x="643467" y="5277684"/>
+            <a:ext cx="4620584" cy="775494"/>
+          </a:xfrm>
+        </p:spPr>
+        <p:txBody>
+          <a:bodyPr vert="horz" lIns="91440" tIns="45720" rIns="91440" bIns="45720" rtlCol="0">
+            <a:normAutofit/>
+          </a:bodyPr>
+          <a:lstStyle/>
+          <a:p>
+            <a:r>
+              <a:rPr lang="en-US" kern="1200">
+                <a:solidFill>
+                  <a:schemeClr val="tx1"/>
+                </a:solidFill>
+                <a:latin typeface="+mn-lt"/>
+                <a:ea typeface="+mn-ea"/>
+                <a:cs typeface="+mn-cs"/>
+              </a:rPr>
+              <a:t>Avec des “paramètres” à fine-tuner.</a:t>
+            </a:r>
+          </a:p>
+        </p:txBody>
+      </p:sp>
+      <p:pic>
+        <p:nvPicPr>
+          <p:cNvPr id="5" name="Picture 4">
+            <a:extLst>
+              <a:ext uri="{FF2B5EF4-FFF2-40B4-BE49-F238E27FC236}">
+                <a16:creationId xmlns:a16="http://schemas.microsoft.com/office/drawing/2014/main" id="{F6483F35-E541-4BB1-B4EE-43E7C2A413FB}"/>
+              </a:ext>
+            </a:extLst>
+          </p:cNvPr>
+          <p:cNvPicPr>
+            <a:picLocks noChangeAspect="1"/>
+          </p:cNvPicPr>
+          <p:nvPr/>
+        </p:nvPicPr>
+        <p:blipFill>
+          <a:blip r:embed="rId2"/>
+          <a:stretch>
+            <a:fillRect/>
+          </a:stretch>
+        </p:blipFill>
+        <p:spPr>
+          <a:xfrm>
+            <a:off x="6606253" y="957860"/>
+            <a:ext cx="4942280" cy="4942280"/>
+          </a:xfrm>
+          <a:prstGeom prst="rect">
+            <a:avLst/>
+          </a:prstGeom>
+        </p:spPr>
+      </p:pic>
+    </p:spTree>
+    <p:extLst>
+      <p:ext uri="{BB962C8B-B14F-4D97-AF65-F5344CB8AC3E}">
+        <p14:creationId xmlns:p14="http://schemas.microsoft.com/office/powerpoint/2010/main" val="3496325424"/>
       </p:ext>
     </p:extLst>
   </p:cSld>

</xml_diff>